<commit_message>
Revising image storage in data-viz-02
</commit_message>
<xml_diff>
--- a/data-viz-02/component/tutorial-colors.pptx
+++ b/data-viz-02/component/tutorial-colors.pptx
@@ -3311,7 +3311,7 @@
       </p:sp>
       <p:pic>
         <p:nvPicPr>
-          <p:cNvPr descr="tutorial-colors_files/figure-pptx/rgb-gradient-3-1.png" id="0" name="Picture 1"/>
+          <p:cNvPr descr="../images/r/rgb-gradient-3.png" id="0" name="Picture 1"/>
           <p:cNvPicPr>
             <a:picLocks noGrp="1" noChangeAspect="1"/>
           </p:cNvPicPr>
@@ -3325,8 +3325,8 @@
         </p:blipFill>
         <p:spPr bwMode="auto">
           <a:xfrm>
-            <a:off x="1752600" y="1600200"/>
-            <a:ext cx="5651500" cy="4521200"/>
+            <a:off x="2311400" y="1600200"/>
+            <a:ext cx="4521200" cy="4521200"/>
           </a:xfrm>
           <a:prstGeom prst="rect">
             <a:avLst/>
@@ -3404,7 +3404,7 @@
       </p:sp>
       <p:pic>
         <p:nvPicPr>
-          <p:cNvPr descr="tutorial-colors_files/figure-pptx/rgb-gradient-4-1.png" id="0" name="Picture 1"/>
+          <p:cNvPr descr="../images/r/rgb-gradient-4.png" id="0" name="Picture 1"/>
           <p:cNvPicPr>
             <a:picLocks noGrp="1" noChangeAspect="1"/>
           </p:cNvPicPr>
@@ -3418,8 +3418,8 @@
         </p:blipFill>
         <p:spPr bwMode="auto">
           <a:xfrm>
-            <a:off x="1752600" y="1600200"/>
-            <a:ext cx="5651500" cy="4521200"/>
+            <a:off x="2311400" y="1600200"/>
+            <a:ext cx="4521200" cy="4521200"/>
           </a:xfrm>
           <a:prstGeom prst="rect">
             <a:avLst/>
@@ -3497,7 +3497,7 @@
       </p:sp>
       <p:pic>
         <p:nvPicPr>
-          <p:cNvPr descr="tutorial-colors_files/figure-pptx/rgb-gradient-5-1.png" id="0" name="Picture 1"/>
+          <p:cNvPr descr="../images/r/rgb-gradient-5.png" id="0" name="Picture 1"/>
           <p:cNvPicPr>
             <a:picLocks noGrp="1" noChangeAspect="1"/>
           </p:cNvPicPr>
@@ -3511,8 +3511,8 @@
         </p:blipFill>
         <p:spPr bwMode="auto">
           <a:xfrm>
-            <a:off x="1752600" y="1600200"/>
-            <a:ext cx="5651500" cy="4521200"/>
+            <a:off x="2311400" y="1600200"/>
+            <a:ext cx="4521200" cy="4521200"/>
           </a:xfrm>
           <a:prstGeom prst="rect">
             <a:avLst/>
@@ -3718,7 +3718,7 @@
       </p:sp>
       <p:pic>
         <p:nvPicPr>
-          <p:cNvPr descr="tutorial-colors_files/figure-pptx/intense-1.png" id="0" name="Picture 1"/>
+          <p:cNvPr descr="../images/r/intense.png" id="0" name="Picture 1"/>
           <p:cNvPicPr>
             <a:picLocks noGrp="1" noChangeAspect="1"/>
           </p:cNvPicPr>
@@ -3732,8 +3732,8 @@
         </p:blipFill>
         <p:spPr bwMode="auto">
           <a:xfrm>
-            <a:off x="1752600" y="1600200"/>
-            <a:ext cx="5651500" cy="4521200"/>
+            <a:off x="2311400" y="1600200"/>
+            <a:ext cx="4521200" cy="4521200"/>
           </a:xfrm>
           <a:prstGeom prst="rect">
             <a:avLst/>
@@ -3827,7 +3827,7 @@
       </p:sp>
       <p:pic>
         <p:nvPicPr>
-          <p:cNvPr descr="tutorial-colors_files/figure-pptx/both-1.png" id="0" name="Picture 1"/>
+          <p:cNvPr descr="../images/r/both.png" id="0" name="Picture 1"/>
           <p:cNvPicPr>
             <a:picLocks noGrp="1" noChangeAspect="1"/>
           </p:cNvPicPr>
@@ -3841,8 +3841,8 @@
         </p:blipFill>
         <p:spPr bwMode="auto">
           <a:xfrm>
-            <a:off x="1752600" y="1600200"/>
-            <a:ext cx="5651500" cy="4521200"/>
+            <a:off x="2311400" y="1600200"/>
+            <a:ext cx="4521200" cy="4521200"/>
           </a:xfrm>
           <a:prstGeom prst="rect">
             <a:avLst/>
@@ -3928,7 +3928,7 @@
       </p:sp>
       <p:pic>
         <p:nvPicPr>
-          <p:cNvPr descr="tutorial-colors_files/figure-pptx/reverse-1.png" id="0" name="Picture 1"/>
+          <p:cNvPr descr="../images/r/reverse.png" id="0" name="Picture 1"/>
           <p:cNvPicPr>
             <a:picLocks noGrp="1" noChangeAspect="1"/>
           </p:cNvPicPr>
@@ -3942,8 +3942,8 @@
         </p:blipFill>
         <p:spPr bwMode="auto">
           <a:xfrm>
-            <a:off x="1752600" y="1600200"/>
-            <a:ext cx="5651500" cy="4521200"/>
+            <a:off x="2311400" y="1600200"/>
+            <a:ext cx="4521200" cy="4521200"/>
           </a:xfrm>
           <a:prstGeom prst="rect">
             <a:avLst/>
@@ -4269,7 +4269,7 @@
       </p:sp>
       <p:pic>
         <p:nvPicPr>
-          <p:cNvPr descr="../images/julias-colour-wheel1.jpg" id="0" name="Picture 1"/>
+          <p:cNvPr descr="../images/external/julias-colour-wheel1.jpg" id="0" name="Picture 1"/>
           <p:cNvPicPr>
             <a:picLocks noGrp="1" noChangeAspect="1"/>
           </p:cNvPicPr>
@@ -4893,7 +4893,7 @@
       </p:sp>
       <p:pic>
         <p:nvPicPr>
-          <p:cNvPr descr="tutorial-colors_files/figure-pptx/color-cube-1-1.png" id="0" name="Picture 1"/>
+          <p:cNvPr descr="../images/r/color-cube-1.png" id="0" name="Picture 1"/>
           <p:cNvPicPr>
             <a:picLocks noGrp="1" noChangeAspect="1"/>
           </p:cNvPicPr>
@@ -4907,8 +4907,8 @@
         </p:blipFill>
         <p:spPr bwMode="auto">
           <a:xfrm>
-            <a:off x="1752600" y="1600200"/>
-            <a:ext cx="5651500" cy="4521200"/>
+            <a:off x="2311400" y="1600200"/>
+            <a:ext cx="4521200" cy="4521200"/>
           </a:xfrm>
           <a:prstGeom prst="rect">
             <a:avLst/>
@@ -5002,7 +5002,7 @@
       </p:sp>
       <p:pic>
         <p:nvPicPr>
-          <p:cNvPr descr="tutorial-colors_files/figure-pptx/color-cube-2-1.png" id="0" name="Picture 1"/>
+          <p:cNvPr descr="../images/r/color-cube-2.png" id="0" name="Picture 1"/>
           <p:cNvPicPr>
             <a:picLocks noGrp="1" noChangeAspect="1"/>
           </p:cNvPicPr>
@@ -5016,8 +5016,8 @@
         </p:blipFill>
         <p:spPr bwMode="auto">
           <a:xfrm>
-            <a:off x="1752600" y="1600200"/>
-            <a:ext cx="5651500" cy="4521200"/>
+            <a:off x="2311400" y="1600200"/>
+            <a:ext cx="4521200" cy="4521200"/>
           </a:xfrm>
           <a:prstGeom prst="rect">
             <a:avLst/>
@@ -5095,7 +5095,7 @@
       </p:sp>
       <p:pic>
         <p:nvPicPr>
-          <p:cNvPr descr="tutorial-colors_files/figure-pptx/rgb-gradient-1-1.png" id="0" name="Picture 1"/>
+          <p:cNvPr descr="../images/r/rgb-gradient-1.png" id="0" name="Picture 1"/>
           <p:cNvPicPr>
             <a:picLocks noGrp="1" noChangeAspect="1"/>
           </p:cNvPicPr>
@@ -5109,8 +5109,8 @@
         </p:blipFill>
         <p:spPr bwMode="auto">
           <a:xfrm>
-            <a:off x="1752600" y="1600200"/>
-            <a:ext cx="5651500" cy="4521200"/>
+            <a:off x="2311400" y="1600200"/>
+            <a:ext cx="4521200" cy="4521200"/>
           </a:xfrm>
           <a:prstGeom prst="rect">
             <a:avLst/>
@@ -5188,7 +5188,7 @@
       </p:sp>
       <p:pic>
         <p:nvPicPr>
-          <p:cNvPr descr="tutorial-colors_files/figure-pptx/rgb-gradient-2-1.png" id="0" name="Picture 1"/>
+          <p:cNvPr descr="../images/r/rgb-gradient-2.png" id="0" name="Picture 1"/>
           <p:cNvPicPr>
             <a:picLocks noGrp="1" noChangeAspect="1"/>
           </p:cNvPicPr>
@@ -5202,8 +5202,8 @@
         </p:blipFill>
         <p:spPr bwMode="auto">
           <a:xfrm>
-            <a:off x="1752600" y="1600200"/>
-            <a:ext cx="5651500" cy="4521200"/>
+            <a:off x="2311400" y="1600200"/>
+            <a:ext cx="4521200" cy="4521200"/>
           </a:xfrm>
           <a:prstGeom prst="rect">
             <a:avLst/>

</xml_diff>

<commit_message>
Clean up stray files
</commit_message>
<xml_diff>
--- a/data-viz-02/component/tutorial-colors.pptx
+++ b/data-viz-02/component/tutorial-colors.pptx
@@ -5,7 +5,7 @@
     <p:sldMasterId id="2147483648" r:id="rId1"/>
   </p:sldMasterIdLst>
   <p:notesMasterIdLst>
-    <p:NotesMasterId r:id="rId43"/>
+    <p:NotesMasterId r:id="rId49"/>
   </p:notesMasterIdLst>
   <p:sldIdLst>
     <p:sldId id="256" r:id="rId2"/>
@@ -49,6 +49,12 @@
     <p:sldId id="294" r:id="rId40"/>
     <p:sldId id="295" r:id="rId41"/>
     <p:sldId id="296" r:id="rId42"/>
+    <p:sldId id="297" r:id="rId43"/>
+    <p:sldId id="298" r:id="rId44"/>
+    <p:sldId id="299" r:id="rId45"/>
+    <p:sldId id="300" r:id="rId46"/>
+    <p:sldId id="301" r:id="rId47"/>
+    <p:sldId id="302" r:id="rId48"/>
   </p:sldIdLst>
   <p:sldSz cx="9144000" cy="6858000" type="screen4x3"/>
   <p:notesSz cx="6858000" cy="9144000"/>
@@ -6459,7 +6465,7 @@
           <a:p>
             <a:fld id="{18BDFEC3-8487-43E8-A154-7C12CBC1FFF2}" type="slidenum">
               <a:rPr lang="en-US"/>
-              <a:t>26</a:t>
+              <a:t>31</a:t>
             </a:fld>
             <a:endParaRPr lang="en-US"/>
           </a:p>
@@ -6541,7 +6547,7 @@
           <a:p>
             <a:fld id="{18BDFEC3-8487-43E8-A154-7C12CBC1FFF2}" type="slidenum">
               <a:rPr lang="en-US"/>
-              <a:t>27</a:t>
+              <a:t>32</a:t>
             </a:fld>
             <a:endParaRPr lang="en-US"/>
           </a:p>
@@ -6601,519 +6607,7 @@
             </a:pPr>
             <a:r>
               <a:rPr/>
-              <a:t>When</a:t>
-            </a:r>
-            <a:r>
-              <a:rPr/>
-              <a:t> </a:t>
-            </a:r>
-            <a:r>
-              <a:rPr/>
-              <a:t>you</a:t>
-            </a:r>
-            <a:r>
-              <a:rPr/>
-              <a:t> </a:t>
-            </a:r>
-            <a:r>
-              <a:rPr/>
-              <a:t>are</a:t>
-            </a:r>
-            <a:r>
-              <a:rPr/>
-              <a:t> </a:t>
-            </a:r>
-            <a:r>
-              <a:rPr/>
-              <a:t>printing,</a:t>
-            </a:r>
-            <a:r>
-              <a:rPr/>
-              <a:t> </a:t>
-            </a:r>
-            <a:r>
-              <a:rPr/>
-              <a:t>more</a:t>
-            </a:r>
-            <a:r>
-              <a:rPr/>
-              <a:t> </a:t>
-            </a:r>
-            <a:r>
-              <a:rPr/>
-              <a:t>of</a:t>
-            </a:r>
-            <a:r>
-              <a:rPr/>
-              <a:t> </a:t>
-            </a:r>
-            <a:r>
-              <a:rPr/>
-              <a:t>something</a:t>
-            </a:r>
-            <a:r>
-              <a:rPr/>
-              <a:t> </a:t>
-            </a:r>
-            <a:r>
-              <a:rPr/>
-              <a:t>makes</a:t>
-            </a:r>
-            <a:r>
-              <a:rPr/>
-              <a:t> </a:t>
-            </a:r>
-            <a:r>
-              <a:rPr/>
-              <a:t>things</a:t>
-            </a:r>
-            <a:r>
-              <a:rPr/>
-              <a:t> </a:t>
-            </a:r>
-            <a:r>
-              <a:rPr/>
-              <a:t>darker.</a:t>
-            </a:r>
-            <a:r>
-              <a:rPr/>
-              <a:t> </a:t>
-            </a:r>
-            <a:r>
-              <a:rPr/>
-              <a:t>This</a:t>
-            </a:r>
-            <a:r>
-              <a:rPr/>
-              <a:t> </a:t>
-            </a:r>
-            <a:r>
-              <a:rPr/>
-              <a:t>is</a:t>
-            </a:r>
-            <a:r>
-              <a:rPr/>
-              <a:t> </a:t>
-            </a:r>
-            <a:r>
-              <a:rPr/>
-              <a:t>the</a:t>
-            </a:r>
-            <a:r>
-              <a:rPr/>
-              <a:t> </a:t>
-            </a:r>
-            <a:r>
-              <a:rPr/>
-              <a:t>exact</a:t>
-            </a:r>
-            <a:r>
-              <a:rPr/>
-              <a:t> </a:t>
-            </a:r>
-            <a:r>
-              <a:rPr/>
-              <a:t>opposite</a:t>
-            </a:r>
-            <a:r>
-              <a:rPr/>
-              <a:t> </a:t>
-            </a:r>
-            <a:r>
-              <a:rPr/>
-              <a:t>of</a:t>
-            </a:r>
-            <a:r>
-              <a:rPr/>
-              <a:t> </a:t>
-            </a:r>
-            <a:r>
-              <a:rPr/>
-              <a:t>a</a:t>
-            </a:r>
-            <a:r>
-              <a:rPr/>
-              <a:t> </a:t>
-            </a:r>
-            <a:r>
-              <a:rPr/>
-              <a:t>computer</a:t>
-            </a:r>
-            <a:r>
-              <a:rPr/>
-              <a:t> </a:t>
-            </a:r>
-            <a:r>
-              <a:rPr/>
-              <a:t>monitor,</a:t>
-            </a:r>
-            <a:r>
-              <a:rPr/>
-              <a:t> </a:t>
-            </a:r>
-            <a:r>
-              <a:rPr/>
-              <a:t>where</a:t>
-            </a:r>
-            <a:r>
-              <a:rPr/>
-              <a:t> </a:t>
-            </a:r>
-            <a:r>
-              <a:rPr/>
-              <a:t>more</a:t>
-            </a:r>
-            <a:r>
-              <a:rPr/>
-              <a:t> </a:t>
-            </a:r>
-            <a:r>
-              <a:rPr/>
-              <a:t>of</a:t>
-            </a:r>
-            <a:r>
-              <a:rPr/>
-              <a:t> </a:t>
-            </a:r>
-            <a:r>
-              <a:rPr/>
-              <a:t>something</a:t>
-            </a:r>
-            <a:r>
-              <a:rPr/>
-              <a:t> </a:t>
-            </a:r>
-            <a:r>
-              <a:rPr/>
-              <a:t>makes</a:t>
-            </a:r>
-            <a:r>
-              <a:rPr/>
-              <a:t> </a:t>
-            </a:r>
-            <a:r>
-              <a:rPr/>
-              <a:t>things</a:t>
-            </a:r>
-            <a:r>
-              <a:rPr/>
-              <a:t> </a:t>
-            </a:r>
-            <a:r>
-              <a:rPr/>
-              <a:t>lighter.</a:t>
-            </a:r>
-            <a:r>
-              <a:rPr/>
-              <a:t> </a:t>
-            </a:r>
-            <a:r>
-              <a:rPr/>
-              <a:t>Also,</a:t>
-            </a:r>
-            <a:r>
-              <a:rPr/>
-              <a:t> </a:t>
-            </a:r>
-            <a:r>
-              <a:rPr/>
-              <a:t>printing</a:t>
-            </a:r>
-            <a:r>
-              <a:rPr/>
-              <a:t> </a:t>
-            </a:r>
-            <a:r>
-              <a:rPr/>
-              <a:t>is</a:t>
-            </a:r>
-            <a:r>
-              <a:rPr/>
-              <a:t> </a:t>
-            </a:r>
-            <a:r>
-              <a:rPr/>
-              <a:t>typically</a:t>
-            </a:r>
-            <a:r>
-              <a:rPr/>
-              <a:t> </a:t>
-            </a:r>
-            <a:r>
-              <a:rPr/>
-              <a:t>done</a:t>
-            </a:r>
-            <a:r>
-              <a:rPr/>
-              <a:t> </a:t>
-            </a:r>
-            <a:r>
-              <a:rPr/>
-              <a:t>on</a:t>
-            </a:r>
-            <a:r>
-              <a:rPr/>
-              <a:t> </a:t>
-            </a:r>
-            <a:r>
-              <a:rPr/>
-              <a:t>a</a:t>
-            </a:r>
-            <a:r>
-              <a:rPr/>
-              <a:t> </a:t>
-            </a:r>
-            <a:r>
-              <a:rPr/>
-              <a:t>sheet</a:t>
-            </a:r>
-            <a:r>
-              <a:rPr/>
-              <a:t> </a:t>
-            </a:r>
-            <a:r>
-              <a:rPr/>
-              <a:t>of</a:t>
-            </a:r>
-            <a:r>
-              <a:rPr/>
-              <a:t> </a:t>
-            </a:r>
-            <a:r>
-              <a:rPr/>
-              <a:t>white</a:t>
-            </a:r>
-            <a:r>
-              <a:rPr/>
-              <a:t> </a:t>
-            </a:r>
-            <a:r>
-              <a:rPr/>
-              <a:t>paper,</a:t>
-            </a:r>
-            <a:r>
-              <a:rPr/>
-              <a:t> </a:t>
-            </a:r>
-            <a:r>
-              <a:rPr/>
-              <a:t>so</a:t>
-            </a:r>
-            <a:r>
-              <a:rPr/>
-              <a:t> </a:t>
-            </a:r>
-            <a:r>
-              <a:rPr/>
-              <a:t>you</a:t>
-            </a:r>
-            <a:r>
-              <a:rPr/>
-              <a:t> </a:t>
-            </a:r>
-            <a:r>
-              <a:rPr/>
-              <a:t>don’t</a:t>
-            </a:r>
-            <a:r>
-              <a:rPr/>
-              <a:t> </a:t>
-            </a:r>
-            <a:r>
-              <a:rPr/>
-              <a:t>need</a:t>
-            </a:r>
-            <a:r>
-              <a:rPr/>
-              <a:t> </a:t>
-            </a:r>
-            <a:r>
-              <a:rPr/>
-              <a:t>to</a:t>
-            </a:r>
-            <a:r>
-              <a:rPr/>
-              <a:t> </a:t>
-            </a:r>
-            <a:r>
-              <a:rPr/>
-              <a:t>put</a:t>
-            </a:r>
-            <a:r>
-              <a:rPr/>
-              <a:t> </a:t>
-            </a:r>
-            <a:r>
-              <a:rPr/>
-              <a:t>any</a:t>
-            </a:r>
-            <a:r>
-              <a:rPr/>
-              <a:t> </a:t>
-            </a:r>
-            <a:r>
-              <a:rPr/>
-              <a:t>ink</a:t>
-            </a:r>
-            <a:r>
-              <a:rPr/>
-              <a:t> </a:t>
-            </a:r>
-            <a:r>
-              <a:rPr/>
-              <a:t>down</a:t>
-            </a:r>
-            <a:r>
-              <a:rPr/>
-              <a:t> </a:t>
-            </a:r>
-            <a:r>
-              <a:rPr/>
-              <a:t>in</a:t>
-            </a:r>
-            <a:r>
-              <a:rPr/>
-              <a:t> </a:t>
-            </a:r>
-            <a:r>
-              <a:rPr/>
-              <a:t>areas</a:t>
-            </a:r>
-            <a:r>
-              <a:rPr/>
-              <a:t> </a:t>
-            </a:r>
-            <a:r>
-              <a:rPr/>
-              <a:t>that</a:t>
-            </a:r>
-            <a:r>
-              <a:rPr/>
-              <a:t> </a:t>
-            </a:r>
-            <a:r>
-              <a:rPr/>
-              <a:t>are</a:t>
-            </a:r>
-            <a:r>
-              <a:rPr/>
-              <a:t> </a:t>
-            </a:r>
-            <a:r>
-              <a:rPr/>
-              <a:t>pure</a:t>
-            </a:r>
-            <a:r>
-              <a:rPr/>
-              <a:t> </a:t>
-            </a:r>
-            <a:r>
-              <a:rPr/>
-              <a:t>white</a:t>
-            </a:r>
-            <a:r>
-              <a:rPr/>
-              <a:t> </a:t>
-            </a:r>
-            <a:r>
-              <a:rPr/>
-              <a:t>and</a:t>
-            </a:r>
-            <a:r>
-              <a:rPr/>
-              <a:t> </a:t>
-            </a:r>
-            <a:r>
-              <a:rPr/>
-              <a:t>you</a:t>
-            </a:r>
-            <a:r>
-              <a:rPr/>
-              <a:t> </a:t>
-            </a:r>
-            <a:r>
-              <a:rPr/>
-              <a:t>put</a:t>
-            </a:r>
-            <a:r>
-              <a:rPr/>
-              <a:t> </a:t>
-            </a:r>
-            <a:r>
-              <a:rPr/>
-              <a:t>very</a:t>
-            </a:r>
-            <a:r>
-              <a:rPr/>
-              <a:t> </a:t>
-            </a:r>
-            <a:r>
-              <a:rPr/>
-              <a:t>little</a:t>
-            </a:r>
-            <a:r>
-              <a:rPr/>
-              <a:t> </a:t>
-            </a:r>
-            <a:r>
-              <a:rPr/>
-              <a:t>ink</a:t>
-            </a:r>
-            <a:r>
-              <a:rPr/>
-              <a:t> </a:t>
-            </a:r>
-            <a:r>
-              <a:rPr/>
-              <a:t>down</a:t>
-            </a:r>
-            <a:r>
-              <a:rPr/>
-              <a:t> </a:t>
-            </a:r>
-            <a:r>
-              <a:rPr/>
-              <a:t>in</a:t>
-            </a:r>
-            <a:r>
-              <a:rPr/>
-              <a:t> </a:t>
-            </a:r>
-            <a:r>
-              <a:rPr/>
-              <a:t>areas</a:t>
-            </a:r>
-            <a:r>
-              <a:rPr/>
-              <a:t> </a:t>
-            </a:r>
-            <a:r>
-              <a:rPr/>
-              <a:t>that</a:t>
-            </a:r>
-            <a:r>
-              <a:rPr/>
-              <a:t> </a:t>
-            </a:r>
-            <a:r>
-              <a:rPr/>
-              <a:t>are</a:t>
-            </a:r>
-            <a:r>
-              <a:rPr/>
-              <a:t> </a:t>
-            </a:r>
-            <a:r>
-              <a:rPr/>
-              <a:t>nearly</a:t>
-            </a:r>
-            <a:r>
-              <a:rPr/>
-              <a:t> </a:t>
-            </a:r>
-            <a:r>
-              <a:rPr/>
-              <a:t>white.</a:t>
+              <a:t>https://help.tableau.com/current/pro/desktop/en-us/viewparts_marks_markproperties_color.htm</a:t>
             </a:r>
           </a:p>
         </p:txBody>
@@ -7135,7 +6629,7 @@
           <a:p>
             <a:fld id="{18BDFEC3-8487-43E8-A154-7C12CBC1FFF2}" type="slidenum">
               <a:rPr lang="en-US"/>
-              <a:t>38</a:t>
+              <a:t>33</a:t>
             </a:fld>
             <a:endParaRPr lang="en-US"/>
           </a:p>
@@ -7195,103 +6689,149 @@
             </a:pPr>
             <a:r>
               <a:rPr/>
-              <a:t>The</a:t>
-            </a:r>
-            <a:r>
-              <a:rPr/>
-              <a:t> </a:t>
-            </a:r>
-            <a:r>
-              <a:rPr/>
-              <a:t>kindergarten</a:t>
-            </a:r>
-            <a:r>
-              <a:rPr/>
-              <a:t> </a:t>
-            </a:r>
-            <a:r>
-              <a:rPr/>
-              <a:t>view</a:t>
-            </a:r>
-            <a:r>
-              <a:rPr/>
-              <a:t> </a:t>
-            </a:r>
-            <a:r>
-              <a:rPr/>
-              <a:t>of</a:t>
-            </a:r>
-            <a:r>
-              <a:rPr/>
-              <a:t> </a:t>
-            </a:r>
-            <a:r>
-              <a:rPr/>
-              <a:t>colors</a:t>
-            </a:r>
-            <a:r>
-              <a:rPr/>
-              <a:t> </a:t>
-            </a:r>
-            <a:r>
-              <a:rPr/>
-              <a:t>(red</a:t>
-            </a:r>
-            <a:r>
-              <a:rPr/>
-              <a:t> </a:t>
-            </a:r>
-            <a:r>
-              <a:rPr/>
-              <a:t>plus</a:t>
-            </a:r>
-            <a:r>
-              <a:rPr/>
-              <a:t> </a:t>
-            </a:r>
-            <a:r>
-              <a:rPr/>
-              <a:t>yellow</a:t>
-            </a:r>
-            <a:r>
-              <a:rPr/>
-              <a:t> </a:t>
-            </a:r>
-            <a:r>
-              <a:rPr/>
-              <a:t>equals</a:t>
-            </a:r>
-            <a:r>
-              <a:rPr/>
-              <a:t> </a:t>
-            </a:r>
-            <a:r>
-              <a:rPr/>
-              <a:t>orange)</a:t>
-            </a:r>
-            <a:r>
-              <a:rPr/>
-              <a:t> </a:t>
-            </a:r>
-            <a:r>
-              <a:rPr/>
-              <a:t>doesn’t</a:t>
-            </a:r>
-            <a:r>
-              <a:rPr/>
-              <a:t> </a:t>
-            </a:r>
-            <a:r>
-              <a:rPr/>
-              <a:t>work</a:t>
-            </a:r>
-            <a:r>
-              <a:rPr/>
-              <a:t> </a:t>
-            </a:r>
-            <a:r>
-              <a:rPr/>
-              <a:t>on</a:t>
+              <a:t>Another</a:t>
+            </a:r>
+            <a:r>
+              <a:rPr/>
+              <a:t> </a:t>
+            </a:r>
+            <a:r>
+              <a:rPr/>
+              <a:t>color</a:t>
+            </a:r>
+            <a:r>
+              <a:rPr/>
+              <a:t> </a:t>
+            </a:r>
+            <a:r>
+              <a:rPr/>
+              <a:t>system</a:t>
+            </a:r>
+            <a:r>
+              <a:rPr/>
+              <a:t> </a:t>
+            </a:r>
+            <a:r>
+              <a:rPr/>
+              <a:t>is</a:t>
+            </a:r>
+            <a:r>
+              <a:rPr/>
+              <a:t> </a:t>
+            </a:r>
+            <a:r>
+              <a:rPr/>
+              <a:t>the</a:t>
+            </a:r>
+            <a:r>
+              <a:rPr/>
+              <a:t> </a:t>
+            </a:r>
+            <a:r>
+              <a:rPr/>
+              <a:t>HCL</a:t>
+            </a:r>
+            <a:r>
+              <a:rPr/>
+              <a:t> </a:t>
+            </a:r>
+            <a:r>
+              <a:rPr/>
+              <a:t>system.</a:t>
+            </a:r>
+            <a:r>
+              <a:rPr/>
+              <a:t> </a:t>
+            </a:r>
+            <a:r>
+              <a:rPr/>
+              <a:t>It</a:t>
+            </a:r>
+            <a:r>
+              <a:rPr/>
+              <a:t> </a:t>
+            </a:r>
+            <a:r>
+              <a:rPr/>
+              <a:t>is</a:t>
+            </a:r>
+            <a:r>
+              <a:rPr/>
+              <a:t> </a:t>
+            </a:r>
+            <a:r>
+              <a:rPr/>
+              <a:t>very</a:t>
+            </a:r>
+            <a:r>
+              <a:rPr/>
+              <a:t> </a:t>
+            </a:r>
+            <a:r>
+              <a:rPr/>
+              <a:t>similar</a:t>
+            </a:r>
+            <a:r>
+              <a:rPr/>
+              <a:t> </a:t>
+            </a:r>
+            <a:r>
+              <a:rPr/>
+              <a:t>to</a:t>
+            </a:r>
+            <a:r>
+              <a:rPr/>
+              <a:t> </a:t>
+            </a:r>
+            <a:r>
+              <a:rPr/>
+              <a:t>standards</a:t>
+            </a:r>
+            <a:r>
+              <a:rPr/>
+              <a:t> </a:t>
+            </a:r>
+            <a:r>
+              <a:rPr/>
+              <a:t>CIE-LUV</a:t>
+            </a:r>
+            <a:r>
+              <a:rPr/>
+              <a:t> </a:t>
+            </a:r>
+            <a:r>
+              <a:rPr/>
+              <a:t>and</a:t>
+            </a:r>
+            <a:r>
+              <a:rPr/>
+              <a:t> </a:t>
+            </a:r>
+            <a:r>
+              <a:rPr/>
+              <a:t>CIE-LAB.</a:t>
+            </a:r>
+          </a:p>
+          <a:p>
+            <a:pPr lvl="0" marL="0" indent="0">
+              <a:buNone/>
+            </a:pPr>
+          </a:p>
+          <a:p>
+            <a:pPr lvl="0" marL="0" indent="0">
+              <a:buNone/>
+            </a:pPr>
+            <a:r>
+              <a:rPr/>
+              <a:t>It</a:t>
+            </a:r>
+            <a:r>
+              <a:rPr/>
+              <a:t> </a:t>
+            </a:r>
+            <a:r>
+              <a:rPr/>
+              <a:t>has</a:t>
             </a:r>
             <a:r>
               <a:rPr/>
@@ -7307,383 +6847,31 @@
             </a:r>
             <a:r>
               <a:rPr/>
-              <a:t>computer</a:t>
-            </a:r>
-            <a:r>
-              <a:rPr/>
-              <a:t> </a:t>
-            </a:r>
-            <a:r>
-              <a:rPr/>
-              <a:t>screen</a:t>
-            </a:r>
-            <a:r>
-              <a:rPr/>
-              <a:t> </a:t>
-            </a:r>
-            <a:r>
-              <a:rPr/>
-              <a:t>because</a:t>
-            </a:r>
-            <a:r>
-              <a:rPr/>
-              <a:t> </a:t>
-            </a:r>
-            <a:r>
-              <a:rPr/>
-              <a:t>the</a:t>
-            </a:r>
-            <a:r>
-              <a:rPr/>
-              <a:t> </a:t>
-            </a:r>
-            <a:r>
-              <a:rPr/>
-              <a:t>screen</a:t>
-            </a:r>
-            <a:r>
-              <a:rPr/>
-              <a:t> </a:t>
-            </a:r>
-            <a:r>
-              <a:rPr/>
-              <a:t>uses</a:t>
-            </a:r>
-            <a:r>
-              <a:rPr/>
-              <a:t> </a:t>
-            </a:r>
-            <a:r>
-              <a:rPr/>
-              <a:t>mixtures</a:t>
-            </a:r>
-            <a:r>
-              <a:rPr/>
-              <a:t> </a:t>
-            </a:r>
-            <a:r>
-              <a:rPr/>
-              <a:t>of</a:t>
-            </a:r>
-            <a:r>
-              <a:rPr/>
-              <a:t> </a:t>
-            </a:r>
-            <a:r>
-              <a:rPr/>
-              <a:t>light</a:t>
-            </a:r>
-            <a:r>
-              <a:rPr/>
-              <a:t> </a:t>
-            </a:r>
-            <a:r>
-              <a:rPr/>
-              <a:t>to</a:t>
-            </a:r>
-            <a:r>
-              <a:rPr/>
-              <a:t> </a:t>
-            </a:r>
-            <a:r>
-              <a:rPr/>
-              <a:t>combine</a:t>
-            </a:r>
-            <a:r>
-              <a:rPr/>
-              <a:t> </a:t>
-            </a:r>
-            <a:r>
-              <a:rPr/>
-              <a:t>colors.</a:t>
-            </a:r>
-            <a:r>
-              <a:rPr/>
-              <a:t> </a:t>
-            </a:r>
-            <a:r>
-              <a:rPr/>
-              <a:t>We</a:t>
-            </a:r>
-            <a:r>
-              <a:rPr/>
-              <a:t> </a:t>
-            </a:r>
-            <a:r>
-              <a:rPr/>
-              <a:t>covered</a:t>
-            </a:r>
-            <a:r>
-              <a:rPr/>
-              <a:t> </a:t>
-            </a:r>
-            <a:r>
-              <a:rPr/>
-              <a:t>the</a:t>
-            </a:r>
-            <a:r>
-              <a:rPr/>
-              <a:t> </a:t>
-            </a:r>
-            <a:r>
-              <a:rPr/>
-              <a:t>RGB</a:t>
-            </a:r>
-            <a:r>
-              <a:rPr/>
-              <a:t> </a:t>
-            </a:r>
-            <a:r>
-              <a:rPr/>
-              <a:t>system</a:t>
-            </a:r>
-            <a:r>
-              <a:rPr/>
-              <a:t> </a:t>
-            </a:r>
-            <a:r>
-              <a:rPr/>
-              <a:t>including</a:t>
-            </a:r>
-            <a:r>
-              <a:rPr/>
-              <a:t> </a:t>
-            </a:r>
-            <a:r>
-              <a:rPr/>
-              <a:t>how</a:t>
-            </a:r>
-            <a:r>
-              <a:rPr/>
-              <a:t> </a:t>
-            </a:r>
-            <a:r>
-              <a:rPr/>
-              <a:t>to</a:t>
-            </a:r>
-            <a:r>
-              <a:rPr/>
-              <a:t> </a:t>
-            </a:r>
-            <a:r>
-              <a:rPr/>
-              <a:t>create</a:t>
-            </a:r>
-            <a:r>
-              <a:rPr/>
-              <a:t> </a:t>
-            </a:r>
-            <a:r>
-              <a:rPr/>
-              <a:t>gradients.</a:t>
-            </a:r>
-            <a:r>
-              <a:rPr/>
-              <a:t> </a:t>
-            </a:r>
-            <a:r>
-              <a:rPr/>
-              <a:t>The</a:t>
-            </a:r>
-            <a:r>
-              <a:rPr/>
-              <a:t> </a:t>
-            </a:r>
-            <a:r>
-              <a:rPr/>
-              <a:t>HSV</a:t>
-            </a:r>
-            <a:r>
-              <a:rPr/>
-              <a:t> </a:t>
-            </a:r>
-            <a:r>
-              <a:rPr/>
-              <a:t>system</a:t>
-            </a:r>
-            <a:r>
-              <a:rPr/>
-              <a:t> </a:t>
-            </a:r>
-            <a:r>
-              <a:rPr/>
-              <a:t>provides</a:t>
-            </a:r>
-            <a:r>
-              <a:rPr/>
-              <a:t> </a:t>
-            </a:r>
-            <a:r>
-              <a:rPr/>
-              <a:t>a</a:t>
-            </a:r>
-            <a:r>
-              <a:rPr/>
-              <a:t> </a:t>
-            </a:r>
-            <a:r>
-              <a:rPr/>
-              <a:t>more</a:t>
-            </a:r>
-            <a:r>
-              <a:rPr/>
-              <a:t> </a:t>
-            </a:r>
-            <a:r>
-              <a:rPr/>
-              <a:t>intuitive</a:t>
-            </a:r>
-            <a:r>
-              <a:rPr/>
-              <a:t> </a:t>
-            </a:r>
-            <a:r>
-              <a:rPr/>
-              <a:t>description</a:t>
-            </a:r>
-            <a:r>
-              <a:rPr/>
-              <a:t> </a:t>
-            </a:r>
-            <a:r>
-              <a:rPr/>
-              <a:t>of</a:t>
-            </a:r>
-            <a:r>
-              <a:rPr/>
-              <a:t> </a:t>
-            </a:r>
-            <a:r>
-              <a:rPr/>
-              <a:t>colors,</a:t>
-            </a:r>
-            <a:r>
-              <a:rPr/>
-              <a:t> </a:t>
-            </a:r>
-            <a:r>
-              <a:rPr/>
-              <a:t>while</a:t>
-            </a:r>
-            <a:r>
-              <a:rPr/>
-              <a:t> </a:t>
-            </a:r>
-            <a:r>
-              <a:rPr/>
-              <a:t>CMYK</a:t>
-            </a:r>
-            <a:r>
-              <a:rPr/>
-              <a:t> </a:t>
-            </a:r>
-            <a:r>
-              <a:rPr/>
-              <a:t>is</a:t>
-            </a:r>
-            <a:r>
-              <a:rPr/>
-              <a:t> </a:t>
-            </a:r>
-            <a:r>
-              <a:rPr/>
-              <a:t>used</a:t>
-            </a:r>
-            <a:r>
-              <a:rPr/>
-              <a:t> </a:t>
-            </a:r>
-            <a:r>
-              <a:rPr/>
-              <a:t>when</a:t>
-            </a:r>
-            <a:r>
-              <a:rPr/>
-              <a:t> </a:t>
-            </a:r>
-            <a:r>
-              <a:rPr/>
-              <a:t>printing,</a:t>
-            </a:r>
-            <a:r>
-              <a:rPr/>
-              <a:t> </a:t>
-            </a:r>
-            <a:r>
-              <a:rPr/>
-              <a:t>where</a:t>
-            </a:r>
-            <a:r>
-              <a:rPr/>
-              <a:t> </a:t>
-            </a:r>
-            <a:r>
-              <a:rPr/>
-              <a:t>a</a:t>
-            </a:r>
-            <a:r>
-              <a:rPr/>
-              <a:t> </a:t>
-            </a:r>
-            <a:r>
-              <a:rPr/>
-              <a:t>substractive</a:t>
-            </a:r>
-            <a:r>
-              <a:rPr/>
-              <a:t> </a:t>
-            </a:r>
-            <a:r>
-              <a:rPr/>
-              <a:t>rather</a:t>
-            </a:r>
-            <a:r>
-              <a:rPr/>
-              <a:t> </a:t>
-            </a:r>
-            <a:r>
-              <a:rPr/>
-              <a:t>than</a:t>
-            </a:r>
-            <a:r>
-              <a:rPr/>
-              <a:t> </a:t>
-            </a:r>
-            <a:r>
-              <a:rPr/>
-              <a:t>additive</a:t>
-            </a:r>
-            <a:r>
-              <a:rPr/>
-              <a:t> </a:t>
-            </a:r>
-            <a:r>
-              <a:rPr/>
-              <a:t>color</a:t>
-            </a:r>
-            <a:r>
-              <a:rPr/>
-              <a:t> </a:t>
-            </a:r>
-            <a:r>
-              <a:rPr/>
-              <a:t>system</a:t>
-            </a:r>
-            <a:r>
-              <a:rPr/>
-              <a:t> </a:t>
-            </a:r>
-            <a:r>
-              <a:rPr/>
-              <a:t>is</a:t>
-            </a:r>
-            <a:r>
-              <a:rPr/>
-              <a:t> </a:t>
-            </a:r>
-            <a:r>
-              <a:rPr/>
-              <a:t>needed.</a:t>
+              <a:t>hue</a:t>
+            </a:r>
+            <a:r>
+              <a:rPr/>
+              <a:t> </a:t>
+            </a:r>
+            <a:r>
+              <a:rPr/>
+              <a:t>value,</a:t>
+            </a:r>
+            <a:r>
+              <a:rPr/>
+              <a:t> </a:t>
+            </a:r>
+            <a:r>
+              <a:rPr/>
+              <a:t>just</a:t>
+            </a:r>
+            <a:r>
+              <a:rPr/>
+              <a:t> </a:t>
+            </a:r>
+            <a:r>
+              <a:rPr/>
+              <a:t>like</a:t>
             </a:r>
           </a:p>
         </p:txBody>
@@ -7705,7 +6893,1171 @@
           <a:p>
             <a:fld id="{18BDFEC3-8487-43E8-A154-7C12CBC1FFF2}" type="slidenum">
               <a:rPr lang="en-US"/>
-              <a:t>41</a:t>
+              <a:t>39</a:t>
+            </a:fld>
+            <a:endParaRPr lang="en-US"/>
+          </a:p>
+        </p:txBody>
+      </p:sp>
+    </p:spTree>
+  </p:cSld>
+</p:notes>
+</file>
+
+<file path=ppt/notesSlides/notesSlide28.xml><?xml version="1.0" encoding="utf-8"?>
+<p:notes xmlns:a="http://schemas.openxmlformats.org/drawingml/2006/main" xmlns:r="http://schemas.openxmlformats.org/officeDocument/2006/relationships" xmlns:p="http://schemas.openxmlformats.org/presentationml/2006/main">
+  <p:cSld>
+    <p:spTree>
+      <p:nvGrpSpPr>
+        <p:cNvPr id="1" name=""/>
+        <p:cNvGrpSpPr/>
+        <p:nvPr/>
+      </p:nvGrpSpPr>
+      <p:grpSpPr>
+        <a:xfrm>
+          <a:off x="0" y="0"/>
+          <a:ext cx="0" cy="0"/>
+          <a:chOff x="0" y="0"/>
+          <a:chExt cx="0" cy="0"/>
+        </a:xfrm>
+      </p:grpSpPr>
+      <p:sp>
+        <p:nvSpPr>
+          <p:cNvPr id="2" name="Slide Image Placeholder 1"/>
+          <p:cNvSpPr>
+            <a:spLocks noGrp="1" noRot="1" noChangeAspect="1"/>
+          </p:cNvSpPr>
+          <p:nvPr>
+            <p:ph type="sldImg"/>
+          </p:nvPr>
+        </p:nvSpPr>
+        <p:spPr/>
+      </p:sp>
+      <p:sp>
+        <p:nvSpPr>
+          <p:cNvPr id="3" name="Notes Placeholder 2"/>
+          <p:cNvSpPr>
+            <a:spLocks noGrp="1"/>
+          </p:cNvSpPr>
+          <p:nvPr>
+            <p:ph type="body" idx="1"/>
+          </p:nvPr>
+        </p:nvSpPr>
+        <p:spPr/>
+        <p:txBody>
+          <a:bodyPr/>
+          <a:lstStyle/>
+          <a:p>
+            <a:pPr lvl="0" marL="0" indent="0">
+              <a:buNone/>
+            </a:pPr>
+            <a:r>
+              <a:rPr/>
+              <a:t>When</a:t>
+            </a:r>
+            <a:r>
+              <a:rPr/>
+              <a:t> </a:t>
+            </a:r>
+            <a:r>
+              <a:rPr/>
+              <a:t>you</a:t>
+            </a:r>
+            <a:r>
+              <a:rPr/>
+              <a:t> </a:t>
+            </a:r>
+            <a:r>
+              <a:rPr/>
+              <a:t>are</a:t>
+            </a:r>
+            <a:r>
+              <a:rPr/>
+              <a:t> </a:t>
+            </a:r>
+            <a:r>
+              <a:rPr/>
+              <a:t>printing,</a:t>
+            </a:r>
+            <a:r>
+              <a:rPr/>
+              <a:t> </a:t>
+            </a:r>
+            <a:r>
+              <a:rPr/>
+              <a:t>more</a:t>
+            </a:r>
+            <a:r>
+              <a:rPr/>
+              <a:t> </a:t>
+            </a:r>
+            <a:r>
+              <a:rPr/>
+              <a:t>of</a:t>
+            </a:r>
+            <a:r>
+              <a:rPr/>
+              <a:t> </a:t>
+            </a:r>
+            <a:r>
+              <a:rPr/>
+              <a:t>something</a:t>
+            </a:r>
+            <a:r>
+              <a:rPr/>
+              <a:t> </a:t>
+            </a:r>
+            <a:r>
+              <a:rPr/>
+              <a:t>makes</a:t>
+            </a:r>
+            <a:r>
+              <a:rPr/>
+              <a:t> </a:t>
+            </a:r>
+            <a:r>
+              <a:rPr/>
+              <a:t>things</a:t>
+            </a:r>
+            <a:r>
+              <a:rPr/>
+              <a:t> </a:t>
+            </a:r>
+            <a:r>
+              <a:rPr/>
+              <a:t>darker.</a:t>
+            </a:r>
+            <a:r>
+              <a:rPr/>
+              <a:t> </a:t>
+            </a:r>
+            <a:r>
+              <a:rPr/>
+              <a:t>This</a:t>
+            </a:r>
+            <a:r>
+              <a:rPr/>
+              <a:t> </a:t>
+            </a:r>
+            <a:r>
+              <a:rPr/>
+              <a:t>is</a:t>
+            </a:r>
+            <a:r>
+              <a:rPr/>
+              <a:t> </a:t>
+            </a:r>
+            <a:r>
+              <a:rPr/>
+              <a:t>the</a:t>
+            </a:r>
+            <a:r>
+              <a:rPr/>
+              <a:t> </a:t>
+            </a:r>
+            <a:r>
+              <a:rPr/>
+              <a:t>exact</a:t>
+            </a:r>
+            <a:r>
+              <a:rPr/>
+              <a:t> </a:t>
+            </a:r>
+            <a:r>
+              <a:rPr/>
+              <a:t>opposite</a:t>
+            </a:r>
+            <a:r>
+              <a:rPr/>
+              <a:t> </a:t>
+            </a:r>
+            <a:r>
+              <a:rPr/>
+              <a:t>of</a:t>
+            </a:r>
+            <a:r>
+              <a:rPr/>
+              <a:t> </a:t>
+            </a:r>
+            <a:r>
+              <a:rPr/>
+              <a:t>a</a:t>
+            </a:r>
+            <a:r>
+              <a:rPr/>
+              <a:t> </a:t>
+            </a:r>
+            <a:r>
+              <a:rPr/>
+              <a:t>computer</a:t>
+            </a:r>
+            <a:r>
+              <a:rPr/>
+              <a:t> </a:t>
+            </a:r>
+            <a:r>
+              <a:rPr/>
+              <a:t>monitor,</a:t>
+            </a:r>
+            <a:r>
+              <a:rPr/>
+              <a:t> </a:t>
+            </a:r>
+            <a:r>
+              <a:rPr/>
+              <a:t>where</a:t>
+            </a:r>
+            <a:r>
+              <a:rPr/>
+              <a:t> </a:t>
+            </a:r>
+            <a:r>
+              <a:rPr/>
+              <a:t>more</a:t>
+            </a:r>
+            <a:r>
+              <a:rPr/>
+              <a:t> </a:t>
+            </a:r>
+            <a:r>
+              <a:rPr/>
+              <a:t>of</a:t>
+            </a:r>
+            <a:r>
+              <a:rPr/>
+              <a:t> </a:t>
+            </a:r>
+            <a:r>
+              <a:rPr/>
+              <a:t>something</a:t>
+            </a:r>
+            <a:r>
+              <a:rPr/>
+              <a:t> </a:t>
+            </a:r>
+            <a:r>
+              <a:rPr/>
+              <a:t>makes</a:t>
+            </a:r>
+            <a:r>
+              <a:rPr/>
+              <a:t> </a:t>
+            </a:r>
+            <a:r>
+              <a:rPr/>
+              <a:t>things</a:t>
+            </a:r>
+            <a:r>
+              <a:rPr/>
+              <a:t> </a:t>
+            </a:r>
+            <a:r>
+              <a:rPr/>
+              <a:t>lighter.</a:t>
+            </a:r>
+            <a:r>
+              <a:rPr/>
+              <a:t> </a:t>
+            </a:r>
+            <a:r>
+              <a:rPr/>
+              <a:t>Also,</a:t>
+            </a:r>
+            <a:r>
+              <a:rPr/>
+              <a:t> </a:t>
+            </a:r>
+            <a:r>
+              <a:rPr/>
+              <a:t>printing</a:t>
+            </a:r>
+            <a:r>
+              <a:rPr/>
+              <a:t> </a:t>
+            </a:r>
+            <a:r>
+              <a:rPr/>
+              <a:t>is</a:t>
+            </a:r>
+            <a:r>
+              <a:rPr/>
+              <a:t> </a:t>
+            </a:r>
+            <a:r>
+              <a:rPr/>
+              <a:t>typically</a:t>
+            </a:r>
+            <a:r>
+              <a:rPr/>
+              <a:t> </a:t>
+            </a:r>
+            <a:r>
+              <a:rPr/>
+              <a:t>done</a:t>
+            </a:r>
+            <a:r>
+              <a:rPr/>
+              <a:t> </a:t>
+            </a:r>
+            <a:r>
+              <a:rPr/>
+              <a:t>on</a:t>
+            </a:r>
+            <a:r>
+              <a:rPr/>
+              <a:t> </a:t>
+            </a:r>
+            <a:r>
+              <a:rPr/>
+              <a:t>a</a:t>
+            </a:r>
+            <a:r>
+              <a:rPr/>
+              <a:t> </a:t>
+            </a:r>
+            <a:r>
+              <a:rPr/>
+              <a:t>sheet</a:t>
+            </a:r>
+            <a:r>
+              <a:rPr/>
+              <a:t> </a:t>
+            </a:r>
+            <a:r>
+              <a:rPr/>
+              <a:t>of</a:t>
+            </a:r>
+            <a:r>
+              <a:rPr/>
+              <a:t> </a:t>
+            </a:r>
+            <a:r>
+              <a:rPr/>
+              <a:t>white</a:t>
+            </a:r>
+            <a:r>
+              <a:rPr/>
+              <a:t> </a:t>
+            </a:r>
+            <a:r>
+              <a:rPr/>
+              <a:t>paper,</a:t>
+            </a:r>
+            <a:r>
+              <a:rPr/>
+              <a:t> </a:t>
+            </a:r>
+            <a:r>
+              <a:rPr/>
+              <a:t>so</a:t>
+            </a:r>
+            <a:r>
+              <a:rPr/>
+              <a:t> </a:t>
+            </a:r>
+            <a:r>
+              <a:rPr/>
+              <a:t>you</a:t>
+            </a:r>
+            <a:r>
+              <a:rPr/>
+              <a:t> </a:t>
+            </a:r>
+            <a:r>
+              <a:rPr/>
+              <a:t>don’t</a:t>
+            </a:r>
+            <a:r>
+              <a:rPr/>
+              <a:t> </a:t>
+            </a:r>
+            <a:r>
+              <a:rPr/>
+              <a:t>need</a:t>
+            </a:r>
+            <a:r>
+              <a:rPr/>
+              <a:t> </a:t>
+            </a:r>
+            <a:r>
+              <a:rPr/>
+              <a:t>to</a:t>
+            </a:r>
+            <a:r>
+              <a:rPr/>
+              <a:t> </a:t>
+            </a:r>
+            <a:r>
+              <a:rPr/>
+              <a:t>put</a:t>
+            </a:r>
+            <a:r>
+              <a:rPr/>
+              <a:t> </a:t>
+            </a:r>
+            <a:r>
+              <a:rPr/>
+              <a:t>any</a:t>
+            </a:r>
+            <a:r>
+              <a:rPr/>
+              <a:t> </a:t>
+            </a:r>
+            <a:r>
+              <a:rPr/>
+              <a:t>ink</a:t>
+            </a:r>
+            <a:r>
+              <a:rPr/>
+              <a:t> </a:t>
+            </a:r>
+            <a:r>
+              <a:rPr/>
+              <a:t>down</a:t>
+            </a:r>
+            <a:r>
+              <a:rPr/>
+              <a:t> </a:t>
+            </a:r>
+            <a:r>
+              <a:rPr/>
+              <a:t>in</a:t>
+            </a:r>
+            <a:r>
+              <a:rPr/>
+              <a:t> </a:t>
+            </a:r>
+            <a:r>
+              <a:rPr/>
+              <a:t>areas</a:t>
+            </a:r>
+            <a:r>
+              <a:rPr/>
+              <a:t> </a:t>
+            </a:r>
+            <a:r>
+              <a:rPr/>
+              <a:t>that</a:t>
+            </a:r>
+            <a:r>
+              <a:rPr/>
+              <a:t> </a:t>
+            </a:r>
+            <a:r>
+              <a:rPr/>
+              <a:t>are</a:t>
+            </a:r>
+            <a:r>
+              <a:rPr/>
+              <a:t> </a:t>
+            </a:r>
+            <a:r>
+              <a:rPr/>
+              <a:t>pure</a:t>
+            </a:r>
+            <a:r>
+              <a:rPr/>
+              <a:t> </a:t>
+            </a:r>
+            <a:r>
+              <a:rPr/>
+              <a:t>white</a:t>
+            </a:r>
+            <a:r>
+              <a:rPr/>
+              <a:t> </a:t>
+            </a:r>
+            <a:r>
+              <a:rPr/>
+              <a:t>and</a:t>
+            </a:r>
+            <a:r>
+              <a:rPr/>
+              <a:t> </a:t>
+            </a:r>
+            <a:r>
+              <a:rPr/>
+              <a:t>you</a:t>
+            </a:r>
+            <a:r>
+              <a:rPr/>
+              <a:t> </a:t>
+            </a:r>
+            <a:r>
+              <a:rPr/>
+              <a:t>put</a:t>
+            </a:r>
+            <a:r>
+              <a:rPr/>
+              <a:t> </a:t>
+            </a:r>
+            <a:r>
+              <a:rPr/>
+              <a:t>very</a:t>
+            </a:r>
+            <a:r>
+              <a:rPr/>
+              <a:t> </a:t>
+            </a:r>
+            <a:r>
+              <a:rPr/>
+              <a:t>little</a:t>
+            </a:r>
+            <a:r>
+              <a:rPr/>
+              <a:t> </a:t>
+            </a:r>
+            <a:r>
+              <a:rPr/>
+              <a:t>ink</a:t>
+            </a:r>
+            <a:r>
+              <a:rPr/>
+              <a:t> </a:t>
+            </a:r>
+            <a:r>
+              <a:rPr/>
+              <a:t>down</a:t>
+            </a:r>
+            <a:r>
+              <a:rPr/>
+              <a:t> </a:t>
+            </a:r>
+            <a:r>
+              <a:rPr/>
+              <a:t>in</a:t>
+            </a:r>
+            <a:r>
+              <a:rPr/>
+              <a:t> </a:t>
+            </a:r>
+            <a:r>
+              <a:rPr/>
+              <a:t>areas</a:t>
+            </a:r>
+            <a:r>
+              <a:rPr/>
+              <a:t> </a:t>
+            </a:r>
+            <a:r>
+              <a:rPr/>
+              <a:t>that</a:t>
+            </a:r>
+            <a:r>
+              <a:rPr/>
+              <a:t> </a:t>
+            </a:r>
+            <a:r>
+              <a:rPr/>
+              <a:t>are</a:t>
+            </a:r>
+            <a:r>
+              <a:rPr/>
+              <a:t> </a:t>
+            </a:r>
+            <a:r>
+              <a:rPr/>
+              <a:t>nearly</a:t>
+            </a:r>
+            <a:r>
+              <a:rPr/>
+              <a:t> </a:t>
+            </a:r>
+            <a:r>
+              <a:rPr/>
+              <a:t>white.</a:t>
+            </a:r>
+          </a:p>
+        </p:txBody>
+      </p:sp>
+      <p:sp>
+        <p:nvSpPr>
+          <p:cNvPr id="4" name="Slide Number Placeholder 3"/>
+          <p:cNvSpPr>
+            <a:spLocks noGrp="1"/>
+          </p:cNvSpPr>
+          <p:nvPr>
+            <p:ph type="sldNum" sz="quarter" idx="10"/>
+          </p:nvPr>
+        </p:nvSpPr>
+        <p:spPr/>
+        <p:txBody>
+          <a:bodyPr/>
+          <a:lstStyle/>
+          <a:p>
+            <a:fld id="{18BDFEC3-8487-43E8-A154-7C12CBC1FFF2}" type="slidenum">
+              <a:rPr lang="en-US"/>
+              <a:t>44</a:t>
+            </a:fld>
+            <a:endParaRPr lang="en-US"/>
+          </a:p>
+        </p:txBody>
+      </p:sp>
+    </p:spTree>
+  </p:cSld>
+</p:notes>
+</file>
+
+<file path=ppt/notesSlides/notesSlide29.xml><?xml version="1.0" encoding="utf-8"?>
+<p:notes xmlns:a="http://schemas.openxmlformats.org/drawingml/2006/main" xmlns:r="http://schemas.openxmlformats.org/officeDocument/2006/relationships" xmlns:p="http://schemas.openxmlformats.org/presentationml/2006/main">
+  <p:cSld>
+    <p:spTree>
+      <p:nvGrpSpPr>
+        <p:cNvPr id="1" name=""/>
+        <p:cNvGrpSpPr/>
+        <p:nvPr/>
+      </p:nvGrpSpPr>
+      <p:grpSpPr>
+        <a:xfrm>
+          <a:off x="0" y="0"/>
+          <a:ext cx="0" cy="0"/>
+          <a:chOff x="0" y="0"/>
+          <a:chExt cx="0" cy="0"/>
+        </a:xfrm>
+      </p:grpSpPr>
+      <p:sp>
+        <p:nvSpPr>
+          <p:cNvPr id="2" name="Slide Image Placeholder 1"/>
+          <p:cNvSpPr>
+            <a:spLocks noGrp="1" noRot="1" noChangeAspect="1"/>
+          </p:cNvSpPr>
+          <p:nvPr>
+            <p:ph type="sldImg"/>
+          </p:nvPr>
+        </p:nvSpPr>
+        <p:spPr/>
+      </p:sp>
+      <p:sp>
+        <p:nvSpPr>
+          <p:cNvPr id="3" name="Notes Placeholder 2"/>
+          <p:cNvSpPr>
+            <a:spLocks noGrp="1"/>
+          </p:cNvSpPr>
+          <p:nvPr>
+            <p:ph type="body" idx="1"/>
+          </p:nvPr>
+        </p:nvSpPr>
+        <p:spPr/>
+        <p:txBody>
+          <a:bodyPr/>
+          <a:lstStyle/>
+          <a:p>
+            <a:pPr lvl="0" marL="0" indent="0">
+              <a:buNone/>
+            </a:pPr>
+            <a:r>
+              <a:rPr/>
+              <a:t>The</a:t>
+            </a:r>
+            <a:r>
+              <a:rPr/>
+              <a:t> </a:t>
+            </a:r>
+            <a:r>
+              <a:rPr/>
+              <a:t>kindergarten</a:t>
+            </a:r>
+            <a:r>
+              <a:rPr/>
+              <a:t> </a:t>
+            </a:r>
+            <a:r>
+              <a:rPr/>
+              <a:t>view</a:t>
+            </a:r>
+            <a:r>
+              <a:rPr/>
+              <a:t> </a:t>
+            </a:r>
+            <a:r>
+              <a:rPr/>
+              <a:t>of</a:t>
+            </a:r>
+            <a:r>
+              <a:rPr/>
+              <a:t> </a:t>
+            </a:r>
+            <a:r>
+              <a:rPr/>
+              <a:t>colors</a:t>
+            </a:r>
+            <a:r>
+              <a:rPr/>
+              <a:t> </a:t>
+            </a:r>
+            <a:r>
+              <a:rPr/>
+              <a:t>(red</a:t>
+            </a:r>
+            <a:r>
+              <a:rPr/>
+              <a:t> </a:t>
+            </a:r>
+            <a:r>
+              <a:rPr/>
+              <a:t>plus</a:t>
+            </a:r>
+            <a:r>
+              <a:rPr/>
+              <a:t> </a:t>
+            </a:r>
+            <a:r>
+              <a:rPr/>
+              <a:t>yellow</a:t>
+            </a:r>
+            <a:r>
+              <a:rPr/>
+              <a:t> </a:t>
+            </a:r>
+            <a:r>
+              <a:rPr/>
+              <a:t>equals</a:t>
+            </a:r>
+            <a:r>
+              <a:rPr/>
+              <a:t> </a:t>
+            </a:r>
+            <a:r>
+              <a:rPr/>
+              <a:t>orange)</a:t>
+            </a:r>
+            <a:r>
+              <a:rPr/>
+              <a:t> </a:t>
+            </a:r>
+            <a:r>
+              <a:rPr/>
+              <a:t>doesn’t</a:t>
+            </a:r>
+            <a:r>
+              <a:rPr/>
+              <a:t> </a:t>
+            </a:r>
+            <a:r>
+              <a:rPr/>
+              <a:t>work</a:t>
+            </a:r>
+            <a:r>
+              <a:rPr/>
+              <a:t> </a:t>
+            </a:r>
+            <a:r>
+              <a:rPr/>
+              <a:t>on</a:t>
+            </a:r>
+            <a:r>
+              <a:rPr/>
+              <a:t> </a:t>
+            </a:r>
+            <a:r>
+              <a:rPr/>
+              <a:t>a</a:t>
+            </a:r>
+            <a:r>
+              <a:rPr/>
+              <a:t> </a:t>
+            </a:r>
+            <a:r>
+              <a:rPr/>
+              <a:t>computer</a:t>
+            </a:r>
+            <a:r>
+              <a:rPr/>
+              <a:t> </a:t>
+            </a:r>
+            <a:r>
+              <a:rPr/>
+              <a:t>screen</a:t>
+            </a:r>
+            <a:r>
+              <a:rPr/>
+              <a:t> </a:t>
+            </a:r>
+            <a:r>
+              <a:rPr/>
+              <a:t>because</a:t>
+            </a:r>
+            <a:r>
+              <a:rPr/>
+              <a:t> </a:t>
+            </a:r>
+            <a:r>
+              <a:rPr/>
+              <a:t>the</a:t>
+            </a:r>
+            <a:r>
+              <a:rPr/>
+              <a:t> </a:t>
+            </a:r>
+            <a:r>
+              <a:rPr/>
+              <a:t>screen</a:t>
+            </a:r>
+            <a:r>
+              <a:rPr/>
+              <a:t> </a:t>
+            </a:r>
+            <a:r>
+              <a:rPr/>
+              <a:t>uses</a:t>
+            </a:r>
+            <a:r>
+              <a:rPr/>
+              <a:t> </a:t>
+            </a:r>
+            <a:r>
+              <a:rPr/>
+              <a:t>mixtures</a:t>
+            </a:r>
+            <a:r>
+              <a:rPr/>
+              <a:t> </a:t>
+            </a:r>
+            <a:r>
+              <a:rPr/>
+              <a:t>of</a:t>
+            </a:r>
+            <a:r>
+              <a:rPr/>
+              <a:t> </a:t>
+            </a:r>
+            <a:r>
+              <a:rPr/>
+              <a:t>light</a:t>
+            </a:r>
+            <a:r>
+              <a:rPr/>
+              <a:t> </a:t>
+            </a:r>
+            <a:r>
+              <a:rPr/>
+              <a:t>to</a:t>
+            </a:r>
+            <a:r>
+              <a:rPr/>
+              <a:t> </a:t>
+            </a:r>
+            <a:r>
+              <a:rPr/>
+              <a:t>combine</a:t>
+            </a:r>
+            <a:r>
+              <a:rPr/>
+              <a:t> </a:t>
+            </a:r>
+            <a:r>
+              <a:rPr/>
+              <a:t>colors.</a:t>
+            </a:r>
+            <a:r>
+              <a:rPr/>
+              <a:t> </a:t>
+            </a:r>
+            <a:r>
+              <a:rPr/>
+              <a:t>We</a:t>
+            </a:r>
+            <a:r>
+              <a:rPr/>
+              <a:t> </a:t>
+            </a:r>
+            <a:r>
+              <a:rPr/>
+              <a:t>covered</a:t>
+            </a:r>
+            <a:r>
+              <a:rPr/>
+              <a:t> </a:t>
+            </a:r>
+            <a:r>
+              <a:rPr/>
+              <a:t>the</a:t>
+            </a:r>
+            <a:r>
+              <a:rPr/>
+              <a:t> </a:t>
+            </a:r>
+            <a:r>
+              <a:rPr/>
+              <a:t>RGB</a:t>
+            </a:r>
+            <a:r>
+              <a:rPr/>
+              <a:t> </a:t>
+            </a:r>
+            <a:r>
+              <a:rPr/>
+              <a:t>system</a:t>
+            </a:r>
+            <a:r>
+              <a:rPr/>
+              <a:t> </a:t>
+            </a:r>
+            <a:r>
+              <a:rPr/>
+              <a:t>including</a:t>
+            </a:r>
+            <a:r>
+              <a:rPr/>
+              <a:t> </a:t>
+            </a:r>
+            <a:r>
+              <a:rPr/>
+              <a:t>how</a:t>
+            </a:r>
+            <a:r>
+              <a:rPr/>
+              <a:t> </a:t>
+            </a:r>
+            <a:r>
+              <a:rPr/>
+              <a:t>to</a:t>
+            </a:r>
+            <a:r>
+              <a:rPr/>
+              <a:t> </a:t>
+            </a:r>
+            <a:r>
+              <a:rPr/>
+              <a:t>create</a:t>
+            </a:r>
+            <a:r>
+              <a:rPr/>
+              <a:t> </a:t>
+            </a:r>
+            <a:r>
+              <a:rPr/>
+              <a:t>gradients.</a:t>
+            </a:r>
+            <a:r>
+              <a:rPr/>
+              <a:t> </a:t>
+            </a:r>
+            <a:r>
+              <a:rPr/>
+              <a:t>The</a:t>
+            </a:r>
+            <a:r>
+              <a:rPr/>
+              <a:t> </a:t>
+            </a:r>
+            <a:r>
+              <a:rPr/>
+              <a:t>HSV</a:t>
+            </a:r>
+            <a:r>
+              <a:rPr/>
+              <a:t> </a:t>
+            </a:r>
+            <a:r>
+              <a:rPr/>
+              <a:t>system</a:t>
+            </a:r>
+            <a:r>
+              <a:rPr/>
+              <a:t> </a:t>
+            </a:r>
+            <a:r>
+              <a:rPr/>
+              <a:t>provides</a:t>
+            </a:r>
+            <a:r>
+              <a:rPr/>
+              <a:t> </a:t>
+            </a:r>
+            <a:r>
+              <a:rPr/>
+              <a:t>a</a:t>
+            </a:r>
+            <a:r>
+              <a:rPr/>
+              <a:t> </a:t>
+            </a:r>
+            <a:r>
+              <a:rPr/>
+              <a:t>more</a:t>
+            </a:r>
+            <a:r>
+              <a:rPr/>
+              <a:t> </a:t>
+            </a:r>
+            <a:r>
+              <a:rPr/>
+              <a:t>intuitive</a:t>
+            </a:r>
+            <a:r>
+              <a:rPr/>
+              <a:t> </a:t>
+            </a:r>
+            <a:r>
+              <a:rPr/>
+              <a:t>description</a:t>
+            </a:r>
+            <a:r>
+              <a:rPr/>
+              <a:t> </a:t>
+            </a:r>
+            <a:r>
+              <a:rPr/>
+              <a:t>of</a:t>
+            </a:r>
+            <a:r>
+              <a:rPr/>
+              <a:t> </a:t>
+            </a:r>
+            <a:r>
+              <a:rPr/>
+              <a:t>colors,</a:t>
+            </a:r>
+            <a:r>
+              <a:rPr/>
+              <a:t> </a:t>
+            </a:r>
+            <a:r>
+              <a:rPr/>
+              <a:t>while</a:t>
+            </a:r>
+            <a:r>
+              <a:rPr/>
+              <a:t> </a:t>
+            </a:r>
+            <a:r>
+              <a:rPr/>
+              <a:t>CMYK</a:t>
+            </a:r>
+            <a:r>
+              <a:rPr/>
+              <a:t> </a:t>
+            </a:r>
+            <a:r>
+              <a:rPr/>
+              <a:t>is</a:t>
+            </a:r>
+            <a:r>
+              <a:rPr/>
+              <a:t> </a:t>
+            </a:r>
+            <a:r>
+              <a:rPr/>
+              <a:t>used</a:t>
+            </a:r>
+            <a:r>
+              <a:rPr/>
+              <a:t> </a:t>
+            </a:r>
+            <a:r>
+              <a:rPr/>
+              <a:t>when</a:t>
+            </a:r>
+            <a:r>
+              <a:rPr/>
+              <a:t> </a:t>
+            </a:r>
+            <a:r>
+              <a:rPr/>
+              <a:t>printing,</a:t>
+            </a:r>
+            <a:r>
+              <a:rPr/>
+              <a:t> </a:t>
+            </a:r>
+            <a:r>
+              <a:rPr/>
+              <a:t>where</a:t>
+            </a:r>
+            <a:r>
+              <a:rPr/>
+              <a:t> </a:t>
+            </a:r>
+            <a:r>
+              <a:rPr/>
+              <a:t>a</a:t>
+            </a:r>
+            <a:r>
+              <a:rPr/>
+              <a:t> </a:t>
+            </a:r>
+            <a:r>
+              <a:rPr/>
+              <a:t>substractive</a:t>
+            </a:r>
+            <a:r>
+              <a:rPr/>
+              <a:t> </a:t>
+            </a:r>
+            <a:r>
+              <a:rPr/>
+              <a:t>rather</a:t>
+            </a:r>
+            <a:r>
+              <a:rPr/>
+              <a:t> </a:t>
+            </a:r>
+            <a:r>
+              <a:rPr/>
+              <a:t>than</a:t>
+            </a:r>
+            <a:r>
+              <a:rPr/>
+              <a:t> </a:t>
+            </a:r>
+            <a:r>
+              <a:rPr/>
+              <a:t>additive</a:t>
+            </a:r>
+            <a:r>
+              <a:rPr/>
+              <a:t> </a:t>
+            </a:r>
+            <a:r>
+              <a:rPr/>
+              <a:t>color</a:t>
+            </a:r>
+            <a:r>
+              <a:rPr/>
+              <a:t> </a:t>
+            </a:r>
+            <a:r>
+              <a:rPr/>
+              <a:t>system</a:t>
+            </a:r>
+            <a:r>
+              <a:rPr/>
+              <a:t> </a:t>
+            </a:r>
+            <a:r>
+              <a:rPr/>
+              <a:t>is</a:t>
+            </a:r>
+            <a:r>
+              <a:rPr/>
+              <a:t> </a:t>
+            </a:r>
+            <a:r>
+              <a:rPr/>
+              <a:t>needed.</a:t>
+            </a:r>
+          </a:p>
+        </p:txBody>
+      </p:sp>
+      <p:sp>
+        <p:nvSpPr>
+          <p:cNvPr id="4" name="Slide Number Placeholder 3"/>
+          <p:cNvSpPr>
+            <a:spLocks noGrp="1"/>
+          </p:cNvSpPr>
+          <p:nvPr>
+            <p:ph type="sldNum" sz="quarter" idx="10"/>
+          </p:nvPr>
+        </p:nvSpPr>
+        <p:spPr/>
+        <p:txBody>
+          <a:bodyPr/>
+          <a:lstStyle/>
+          <a:p>
+            <a:fld id="{18BDFEC3-8487-43E8-A154-7C12CBC1FFF2}" type="slidenum">
+              <a:rPr lang="en-US"/>
+              <a:t>47</a:t>
             </a:fld>
             <a:endParaRPr lang="en-US"/>
           </a:p>
@@ -18158,48 +18510,131 @@
             </a:pPr>
             <a:r>
               <a:rPr/>
-              <a:t>Gradients</a:t>
-            </a:r>
-            <a:r>
-              <a:rPr/>
-              <a:t> </a:t>
-            </a:r>
-            <a:r>
-              <a:rPr/>
-              <a:t>in</a:t>
-            </a:r>
-            <a:r>
-              <a:rPr/>
-              <a:t> </a:t>
-            </a:r>
-            <a:r>
-              <a:rPr/>
-              <a:t>R</a:t>
+              <a:t>Python</a:t>
+            </a:r>
+            <a:r>
+              <a:rPr/>
+              <a:t> </a:t>
+            </a:r>
+            <a:r>
+              <a:rPr/>
+              <a:t>color</a:t>
+            </a:r>
+            <a:r>
+              <a:rPr/>
+              <a:t> </a:t>
+            </a:r>
+            <a:r>
+              <a:rPr/>
+              <a:t>schemes</a:t>
             </a:r>
           </a:p>
         </p:txBody>
       </p:sp>
+      <p:pic>
+        <p:nvPicPr>
+          <p:cNvPr descr="../images/python/color-schemes-1.png" id="0" name="Picture 1"/>
+          <p:cNvPicPr>
+            <a:picLocks noGrp="1" noChangeAspect="1"/>
+          </p:cNvPicPr>
+          <p:nvPr/>
+        </p:nvPicPr>
+        <p:blipFill>
+          <a:blip r:embed="rId2"/>
+          <a:stretch>
+            <a:fillRect/>
+          </a:stretch>
+        </p:blipFill>
+        <p:spPr bwMode="auto">
+          <a:xfrm>
+            <a:off x="2171700" y="1600200"/>
+            <a:ext cx="4787900" cy="4013200"/>
+          </a:xfrm>
+          <a:prstGeom prst="rect">
+            <a:avLst/>
+          </a:prstGeom>
+          <a:noFill/>
+          <a:ln w="9525">
+            <a:noFill/>
+            <a:headEnd/>
+            <a:tailEnd/>
+          </a:ln>
+        </p:spPr>
+      </p:pic>
       <p:sp>
         <p:nvSpPr>
-          <p:cNvPr id="3" name="Content Placeholder 2"/>
-          <p:cNvSpPr>
-            <a:spLocks noGrp="1"/>
-          </p:cNvSpPr>
-          <p:nvPr>
-            <p:ph idx="1"/>
-          </p:nvPr>
+          <p:cNvPr id="1" name="TextBox 3"/>
+          <p:cNvSpPr txBox="1"/>
+          <p:nvPr/>
         </p:nvSpPr>
-        <p:spPr/>
+        <p:spPr>
+          <a:xfrm>
+            <a:off x="457200" y="5613400"/>
+            <a:ext cx="8229600" cy="508000"/>
+          </a:xfrm>
+          <a:prstGeom prst="rect">
+            <a:avLst/>
+          </a:prstGeom>
+          <a:noFill/>
+        </p:spPr>
         <p:txBody>
           <a:bodyPr/>
           <a:lstStyle/>
           <a:p>
-            <a:pPr lvl="0" marL="0" indent="0">
+            <a:pPr lvl="0" marL="0" indent="0" algn="ctr">
               <a:buNone/>
             </a:pPr>
             <a:r>
               <a:rPr/>
-              <a:t>(To be added)</a:t>
+              <a:t>Listing</a:t>
+            </a:r>
+            <a:r>
+              <a:rPr/>
+              <a:t> </a:t>
+            </a:r>
+            <a:r>
+              <a:rPr/>
+              <a:t>of</a:t>
+            </a:r>
+            <a:r>
+              <a:rPr/>
+              <a:t> </a:t>
+            </a:r>
+            <a:r>
+              <a:rPr/>
+              <a:t>first</a:t>
+            </a:r>
+            <a:r>
+              <a:rPr/>
+              <a:t> </a:t>
+            </a:r>
+            <a:r>
+              <a:rPr/>
+              <a:t>few</a:t>
+            </a:r>
+            <a:r>
+              <a:rPr/>
+              <a:t> </a:t>
+            </a:r>
+            <a:r>
+              <a:rPr/>
+              <a:t>Altair</a:t>
+            </a:r>
+            <a:r>
+              <a:rPr/>
+              <a:t> </a:t>
+            </a:r>
+            <a:r>
+              <a:rPr/>
+              <a:t>color</a:t>
+            </a:r>
+            <a:r>
+              <a:rPr/>
+              <a:t> </a:t>
+            </a:r>
+            <a:r>
+              <a:rPr/>
+              <a:t>schemes</a:t>
             </a:r>
           </a:p>
         </p:txBody>
@@ -18246,48 +18681,131 @@
             </a:pPr>
             <a:r>
               <a:rPr/>
-              <a:t>Gradients</a:t>
-            </a:r>
-            <a:r>
-              <a:rPr/>
-              <a:t> </a:t>
-            </a:r>
-            <a:r>
-              <a:rPr/>
-              <a:t>in</a:t>
-            </a:r>
-            <a:r>
-              <a:rPr/>
-              <a:t> </a:t>
-            </a:r>
-            <a:r>
-              <a:rPr/>
-              <a:t>Tableau</a:t>
+              <a:t>Python</a:t>
+            </a:r>
+            <a:r>
+              <a:rPr/>
+              <a:t> </a:t>
+            </a:r>
+            <a:r>
+              <a:rPr/>
+              <a:t>color</a:t>
+            </a:r>
+            <a:r>
+              <a:rPr/>
+              <a:t> </a:t>
+            </a:r>
+            <a:r>
+              <a:rPr/>
+              <a:t>schemes</a:t>
             </a:r>
           </a:p>
         </p:txBody>
       </p:sp>
+      <p:pic>
+        <p:nvPicPr>
+          <p:cNvPr descr="../images/python/color-schemes-2.png" id="0" name="Picture 1"/>
+          <p:cNvPicPr>
+            <a:picLocks noGrp="1" noChangeAspect="1"/>
+          </p:cNvPicPr>
+          <p:nvPr/>
+        </p:nvPicPr>
+        <p:blipFill>
+          <a:blip r:embed="rId2"/>
+          <a:stretch>
+            <a:fillRect/>
+          </a:stretch>
+        </p:blipFill>
+        <p:spPr bwMode="auto">
+          <a:xfrm>
+            <a:off x="2171700" y="1600200"/>
+            <a:ext cx="4787900" cy="4013200"/>
+          </a:xfrm>
+          <a:prstGeom prst="rect">
+            <a:avLst/>
+          </a:prstGeom>
+          <a:noFill/>
+          <a:ln w="9525">
+            <a:noFill/>
+            <a:headEnd/>
+            <a:tailEnd/>
+          </a:ln>
+        </p:spPr>
+      </p:pic>
       <p:sp>
         <p:nvSpPr>
-          <p:cNvPr id="3" name="Content Placeholder 2"/>
-          <p:cNvSpPr>
-            <a:spLocks noGrp="1"/>
-          </p:cNvSpPr>
-          <p:nvPr>
-            <p:ph idx="1"/>
-          </p:nvPr>
+          <p:cNvPr id="1" name="TextBox 3"/>
+          <p:cNvSpPr txBox="1"/>
+          <p:nvPr/>
         </p:nvSpPr>
-        <p:spPr/>
+        <p:spPr>
+          <a:xfrm>
+            <a:off x="457200" y="5613400"/>
+            <a:ext cx="8229600" cy="508000"/>
+          </a:xfrm>
+          <a:prstGeom prst="rect">
+            <a:avLst/>
+          </a:prstGeom>
+          <a:noFill/>
+        </p:spPr>
         <p:txBody>
           <a:bodyPr/>
           <a:lstStyle/>
           <a:p>
-            <a:pPr lvl="0" marL="0" indent="0">
+            <a:pPr lvl="0" marL="0" indent="0" algn="ctr">
               <a:buNone/>
             </a:pPr>
             <a:r>
               <a:rPr/>
-              <a:t>(To be added)</a:t>
+              <a:t>Listing</a:t>
+            </a:r>
+            <a:r>
+              <a:rPr/>
+              <a:t> </a:t>
+            </a:r>
+            <a:r>
+              <a:rPr/>
+              <a:t>of</a:t>
+            </a:r>
+            <a:r>
+              <a:rPr/>
+              <a:t> </a:t>
+            </a:r>
+            <a:r>
+              <a:rPr/>
+              <a:t>first</a:t>
+            </a:r>
+            <a:r>
+              <a:rPr/>
+              <a:t> </a:t>
+            </a:r>
+            <a:r>
+              <a:rPr/>
+              <a:t>few</a:t>
+            </a:r>
+            <a:r>
+              <a:rPr/>
+              <a:t> </a:t>
+            </a:r>
+            <a:r>
+              <a:rPr/>
+              <a:t>Altair</a:t>
+            </a:r>
+            <a:r>
+              <a:rPr/>
+              <a:t> </a:t>
+            </a:r>
+            <a:r>
+              <a:rPr/>
+              <a:t>color</a:t>
+            </a:r>
+            <a:r>
+              <a:rPr/>
+              <a:t> </a:t>
+            </a:r>
+            <a:r>
+              <a:rPr/>
+              <a:t>schemes</a:t>
             </a:r>
           </a:p>
         </p:txBody>
@@ -18334,46 +18852,131 @@
             </a:pPr>
             <a:r>
               <a:rPr/>
-              <a:t>Colors,</a:t>
-            </a:r>
-            <a:r>
-              <a:rPr/>
-              <a:t> </a:t>
-            </a:r>
-            <a:r>
-              <a:rPr/>
-              <a:t>HSV</a:t>
-            </a:r>
-            <a:r>
-              <a:rPr/>
-              <a:t> </a:t>
-            </a:r>
-            <a:r>
-              <a:rPr/>
-              <a:t>system</a:t>
+              <a:t>Python</a:t>
+            </a:r>
+            <a:r>
+              <a:rPr/>
+              <a:t> </a:t>
+            </a:r>
+            <a:r>
+              <a:rPr/>
+              <a:t>color</a:t>
+            </a:r>
+            <a:r>
+              <a:rPr/>
+              <a:t> </a:t>
+            </a:r>
+            <a:r>
+              <a:rPr/>
+              <a:t>schemes</a:t>
             </a:r>
           </a:p>
         </p:txBody>
       </p:sp>
+      <p:pic>
+        <p:nvPicPr>
+          <p:cNvPr descr="../images/python/color-schemes-3.png" id="0" name="Picture 1"/>
+          <p:cNvPicPr>
+            <a:picLocks noGrp="1" noChangeAspect="1"/>
+          </p:cNvPicPr>
+          <p:nvPr/>
+        </p:nvPicPr>
+        <p:blipFill>
+          <a:blip r:embed="rId2"/>
+          <a:stretch>
+            <a:fillRect/>
+          </a:stretch>
+        </p:blipFill>
+        <p:spPr bwMode="auto">
+          <a:xfrm>
+            <a:off x="2171700" y="1600200"/>
+            <a:ext cx="4787900" cy="4013200"/>
+          </a:xfrm>
+          <a:prstGeom prst="rect">
+            <a:avLst/>
+          </a:prstGeom>
+          <a:noFill/>
+          <a:ln w="9525">
+            <a:noFill/>
+            <a:headEnd/>
+            <a:tailEnd/>
+          </a:ln>
+        </p:spPr>
+      </p:pic>
       <p:sp>
         <p:nvSpPr>
-          <p:cNvPr id="3" name="Content Placeholder 2"/>
-          <p:cNvSpPr>
-            <a:spLocks noGrp="1"/>
-          </p:cNvSpPr>
-          <p:nvPr>
-            <p:ph idx="1"/>
-          </p:nvPr>
+          <p:cNvPr id="1" name="TextBox 3"/>
+          <p:cNvSpPr txBox="1"/>
+          <p:nvPr/>
         </p:nvSpPr>
-        <p:spPr/>
+        <p:spPr>
+          <a:xfrm>
+            <a:off x="457200" y="5613400"/>
+            <a:ext cx="8229600" cy="508000"/>
+          </a:xfrm>
+          <a:prstGeom prst="rect">
+            <a:avLst/>
+          </a:prstGeom>
+          <a:noFill/>
+        </p:spPr>
         <p:txBody>
           <a:bodyPr/>
           <a:lstStyle/>
           <a:p>
-            <a:pPr lvl="1"/>
-            <a:r>
-              <a:rPr/>
-              <a:t>(To be added)</a:t>
+            <a:pPr lvl="0" marL="0" indent="0" algn="ctr">
+              <a:buNone/>
+            </a:pPr>
+            <a:r>
+              <a:rPr/>
+              <a:t>Listing</a:t>
+            </a:r>
+            <a:r>
+              <a:rPr/>
+              <a:t> </a:t>
+            </a:r>
+            <a:r>
+              <a:rPr/>
+              <a:t>of</a:t>
+            </a:r>
+            <a:r>
+              <a:rPr/>
+              <a:t> </a:t>
+            </a:r>
+            <a:r>
+              <a:rPr/>
+              <a:t>first</a:t>
+            </a:r>
+            <a:r>
+              <a:rPr/>
+              <a:t> </a:t>
+            </a:r>
+            <a:r>
+              <a:rPr/>
+              <a:t>few</a:t>
+            </a:r>
+            <a:r>
+              <a:rPr/>
+              <a:t> </a:t>
+            </a:r>
+            <a:r>
+              <a:rPr/>
+              <a:t>Altair</a:t>
+            </a:r>
+            <a:r>
+              <a:rPr/>
+              <a:t> </a:t>
+            </a:r>
+            <a:r>
+              <a:rPr/>
+              <a:t>color</a:t>
+            </a:r>
+            <a:r>
+              <a:rPr/>
+              <a:t> </a:t>
+            </a:r>
+            <a:r>
+              <a:rPr/>
+              <a:t>schemes</a:t>
             </a:r>
           </a:p>
         </p:txBody>
@@ -18420,30 +19023,30 @@
             </a:pPr>
             <a:r>
               <a:rPr/>
-              <a:t>Colors,</a:t>
-            </a:r>
-            <a:r>
-              <a:rPr/>
-              <a:t> </a:t>
-            </a:r>
-            <a:r>
-              <a:rPr/>
-              <a:t>HSV</a:t>
-            </a:r>
-            <a:r>
-              <a:rPr/>
-              <a:t> </a:t>
-            </a:r>
-            <a:r>
-              <a:rPr/>
-              <a:t>system</a:t>
+              <a:t>Python</a:t>
+            </a:r>
+            <a:r>
+              <a:rPr/>
+              <a:t> </a:t>
+            </a:r>
+            <a:r>
+              <a:rPr/>
+              <a:t>color</a:t>
+            </a:r>
+            <a:r>
+              <a:rPr/>
+              <a:t> </a:t>
+            </a:r>
+            <a:r>
+              <a:rPr/>
+              <a:t>schemes</a:t>
             </a:r>
           </a:p>
         </p:txBody>
       </p:sp>
       <p:pic>
         <p:nvPicPr>
-          <p:cNvPr descr="../images/r/hsv-1.png" id="0" name="Picture 1"/>
+          <p:cNvPr descr="../images/python/color-schemes-4.png" id="0" name="Picture 1"/>
           <p:cNvPicPr>
             <a:picLocks noGrp="1" noChangeAspect="1"/>
           </p:cNvPicPr>
@@ -18457,8 +19060,8 @@
         </p:blipFill>
         <p:spPr bwMode="auto">
           <a:xfrm>
-            <a:off x="2311400" y="1600200"/>
-            <a:ext cx="4521200" cy="4521200"/>
+            <a:off x="2171700" y="1600200"/>
+            <a:ext cx="4787900" cy="4013200"/>
           </a:xfrm>
           <a:prstGeom prst="rect">
             <a:avLst/>
@@ -18471,6 +19074,84 @@
           </a:ln>
         </p:spPr>
       </p:pic>
+      <p:sp>
+        <p:nvSpPr>
+          <p:cNvPr id="1" name="TextBox 3"/>
+          <p:cNvSpPr txBox="1"/>
+          <p:nvPr/>
+        </p:nvSpPr>
+        <p:spPr>
+          <a:xfrm>
+            <a:off x="457200" y="5613400"/>
+            <a:ext cx="8229600" cy="508000"/>
+          </a:xfrm>
+          <a:prstGeom prst="rect">
+            <a:avLst/>
+          </a:prstGeom>
+          <a:noFill/>
+        </p:spPr>
+        <p:txBody>
+          <a:bodyPr/>
+          <a:lstStyle/>
+          <a:p>
+            <a:pPr lvl="0" marL="0" indent="0" algn="ctr">
+              <a:buNone/>
+            </a:pPr>
+            <a:r>
+              <a:rPr/>
+              <a:t>Listing</a:t>
+            </a:r>
+            <a:r>
+              <a:rPr/>
+              <a:t> </a:t>
+            </a:r>
+            <a:r>
+              <a:rPr/>
+              <a:t>of</a:t>
+            </a:r>
+            <a:r>
+              <a:rPr/>
+              <a:t> </a:t>
+            </a:r>
+            <a:r>
+              <a:rPr/>
+              <a:t>first</a:t>
+            </a:r>
+            <a:r>
+              <a:rPr/>
+              <a:t> </a:t>
+            </a:r>
+            <a:r>
+              <a:rPr/>
+              <a:t>few</a:t>
+            </a:r>
+            <a:r>
+              <a:rPr/>
+              <a:t> </a:t>
+            </a:r>
+            <a:r>
+              <a:rPr/>
+              <a:t>Altair</a:t>
+            </a:r>
+            <a:r>
+              <a:rPr/>
+              <a:t> </a:t>
+            </a:r>
+            <a:r>
+              <a:rPr/>
+              <a:t>color</a:t>
+            </a:r>
+            <a:r>
+              <a:rPr/>
+              <a:t> </a:t>
+            </a:r>
+            <a:r>
+              <a:rPr/>
+              <a:t>schemes</a:t>
+            </a:r>
+          </a:p>
+        </p:txBody>
+      </p:sp>
     </p:spTree>
   </p:cSld>
 </p:sld>
@@ -18662,46 +19343,30 @@
             </a:pPr>
             <a:r>
               <a:rPr/>
-              <a:t>Colors,</a:t>
-            </a:r>
-            <a:r>
-              <a:rPr/>
-              <a:t> </a:t>
-            </a:r>
-            <a:r>
-              <a:rPr/>
-              <a:t>HSV</a:t>
-            </a:r>
-            <a:r>
-              <a:rPr/>
-              <a:t> </a:t>
-            </a:r>
-            <a:r>
-              <a:rPr/>
-              <a:t>system,</a:t>
-            </a:r>
-            <a:r>
-              <a:rPr/>
-              <a:t> </a:t>
-            </a:r>
-            <a:r>
-              <a:rPr/>
-              <a:t>hue</a:t>
-            </a:r>
-            <a:r>
-              <a:rPr/>
-              <a:t> </a:t>
-            </a:r>
-            <a:r>
-              <a:rPr/>
-              <a:t>only</a:t>
+              <a:t>Python</a:t>
+            </a:r>
+            <a:r>
+              <a:rPr/>
+              <a:t> </a:t>
+            </a:r>
+            <a:r>
+              <a:rPr/>
+              <a:t>change</a:t>
+            </a:r>
+            <a:r>
+              <a:rPr/>
+              <a:t> </a:t>
+            </a:r>
+            <a:r>
+              <a:rPr/>
+              <a:t>colors</a:t>
             </a:r>
           </a:p>
         </p:txBody>
       </p:sp>
       <p:pic>
         <p:nvPicPr>
-          <p:cNvPr descr="../images/r/hsv-2.png" id="0" name="Picture 1"/>
+          <p:cNvPr descr="../images/python/change-colors.png" id="0" name="Picture 1"/>
           <p:cNvPicPr>
             <a:picLocks noGrp="1" noChangeAspect="1"/>
           </p:cNvPicPr>
@@ -18715,8 +19380,8 @@
         </p:blipFill>
         <p:spPr bwMode="auto">
           <a:xfrm>
-            <a:off x="2311400" y="1600200"/>
-            <a:ext cx="4521200" cy="4521200"/>
+            <a:off x="1409700" y="1600200"/>
+            <a:ext cx="6311900" cy="4013200"/>
           </a:xfrm>
           <a:prstGeom prst="rect">
             <a:avLst/>
@@ -18729,6 +19394,68 @@
           </a:ln>
         </p:spPr>
       </p:pic>
+      <p:sp>
+        <p:nvSpPr>
+          <p:cNvPr id="1" name="TextBox 3"/>
+          <p:cNvSpPr txBox="1"/>
+          <p:nvPr/>
+        </p:nvSpPr>
+        <p:spPr>
+          <a:xfrm>
+            <a:off x="457200" y="5613400"/>
+            <a:ext cx="8229600" cy="508000"/>
+          </a:xfrm>
+          <a:prstGeom prst="rect">
+            <a:avLst/>
+          </a:prstGeom>
+          <a:noFill/>
+        </p:spPr>
+        <p:txBody>
+          <a:bodyPr/>
+          <a:lstStyle/>
+          <a:p>
+            <a:pPr lvl="0" marL="0" indent="0" algn="ctr">
+              <a:buNone/>
+            </a:pPr>
+            <a:r>
+              <a:rPr/>
+              <a:t>Python</a:t>
+            </a:r>
+            <a:r>
+              <a:rPr/>
+              <a:t> </a:t>
+            </a:r>
+            <a:r>
+              <a:rPr/>
+              <a:t>scatterplot</a:t>
+            </a:r>
+            <a:r>
+              <a:rPr/>
+              <a:t> </a:t>
+            </a:r>
+            <a:r>
+              <a:rPr/>
+              <a:t>using</a:t>
+            </a:r>
+            <a:r>
+              <a:rPr/>
+              <a:t> </a:t>
+            </a:r>
+            <a:r>
+              <a:rPr/>
+              <a:t>red</a:t>
+            </a:r>
+            <a:r>
+              <a:rPr/>
+              <a:t> </a:t>
+            </a:r>
+            <a:r>
+              <a:rPr/>
+              <a:t>gradient</a:t>
+            </a:r>
+          </a:p>
+        </p:txBody>
+      </p:sp>
     </p:spTree>
   </p:cSld>
 </p:sld>
@@ -18771,73 +19498,52 @@
             </a:pPr>
             <a:r>
               <a:rPr/>
-              <a:t>Colors,</a:t>
-            </a:r>
-            <a:r>
-              <a:rPr/>
-              <a:t> </a:t>
-            </a:r>
-            <a:r>
-              <a:rPr/>
-              <a:t>HSV</a:t>
-            </a:r>
-            <a:r>
-              <a:rPr/>
-              <a:t> </a:t>
-            </a:r>
-            <a:r>
-              <a:rPr/>
-              <a:t>system,</a:t>
-            </a:r>
-            <a:r>
-              <a:rPr/>
-              <a:t> </a:t>
-            </a:r>
-            <a:r>
-              <a:rPr/>
-              <a:t>saturation</a:t>
-            </a:r>
-            <a:r>
-              <a:rPr/>
-              <a:t> </a:t>
-            </a:r>
-            <a:r>
-              <a:rPr/>
-              <a:t>only</a:t>
+              <a:t>Gradients</a:t>
+            </a:r>
+            <a:r>
+              <a:rPr/>
+              <a:t> </a:t>
+            </a:r>
+            <a:r>
+              <a:rPr/>
+              <a:t>in</a:t>
+            </a:r>
+            <a:r>
+              <a:rPr/>
+              <a:t> </a:t>
+            </a:r>
+            <a:r>
+              <a:rPr/>
+              <a:t>R</a:t>
             </a:r>
           </a:p>
         </p:txBody>
       </p:sp>
-      <p:pic>
-        <p:nvPicPr>
-          <p:cNvPr descr="../images/r/hsv-3.png" id="0" name="Picture 1"/>
-          <p:cNvPicPr>
-            <a:picLocks noGrp="1" noChangeAspect="1"/>
-          </p:cNvPicPr>
-          <p:nvPr/>
-        </p:nvPicPr>
-        <p:blipFill>
-          <a:blip r:embed="rId2"/>
-          <a:stretch>
-            <a:fillRect/>
-          </a:stretch>
-        </p:blipFill>
-        <p:spPr bwMode="auto">
-          <a:xfrm>
-            <a:off x="2311400" y="1600200"/>
-            <a:ext cx="4521200" cy="4521200"/>
-          </a:xfrm>
-          <a:prstGeom prst="rect">
-            <a:avLst/>
-          </a:prstGeom>
-          <a:noFill/>
-          <a:ln w="9525">
-            <a:noFill/>
-            <a:headEnd/>
-            <a:tailEnd/>
-          </a:ln>
-        </p:spPr>
-      </p:pic>
+      <p:sp>
+        <p:nvSpPr>
+          <p:cNvPr id="3" name="Content Placeholder 2"/>
+          <p:cNvSpPr>
+            <a:spLocks noGrp="1"/>
+          </p:cNvSpPr>
+          <p:nvPr>
+            <p:ph idx="1"/>
+          </p:nvPr>
+        </p:nvSpPr>
+        <p:spPr/>
+        <p:txBody>
+          <a:bodyPr/>
+          <a:lstStyle/>
+          <a:p>
+            <a:pPr lvl="0" marL="0" indent="0">
+              <a:buNone/>
+            </a:pPr>
+            <a:r>
+              <a:rPr/>
+              <a:t>(To be added)</a:t>
+            </a:r>
+          </a:p>
+        </p:txBody>
+      </p:sp>
     </p:spTree>
   </p:cSld>
 </p:sld>
@@ -18880,61 +19586,45 @@
             </a:pPr>
             <a:r>
               <a:rPr/>
-              <a:t>Colors,</a:t>
-            </a:r>
-            <a:r>
-              <a:rPr/>
-              <a:t> </a:t>
-            </a:r>
-            <a:r>
-              <a:rPr/>
-              <a:t>HSV</a:t>
-            </a:r>
-            <a:r>
-              <a:rPr/>
-              <a:t> </a:t>
-            </a:r>
-            <a:r>
-              <a:rPr/>
-              <a:t>system,</a:t>
-            </a:r>
-            <a:r>
-              <a:rPr/>
-              <a:t> </a:t>
-            </a:r>
-            <a:r>
-              <a:rPr/>
-              <a:t>value</a:t>
-            </a:r>
-            <a:r>
-              <a:rPr/>
-              <a:t> </a:t>
-            </a:r>
-            <a:r>
-              <a:rPr/>
-              <a:t>only</a:t>
+              <a:t>Gradients</a:t>
+            </a:r>
+            <a:r>
+              <a:rPr/>
+              <a:t> </a:t>
+            </a:r>
+            <a:r>
+              <a:rPr/>
+              <a:t>in</a:t>
+            </a:r>
+            <a:r>
+              <a:rPr/>
+              <a:t> </a:t>
+            </a:r>
+            <a:r>
+              <a:rPr/>
+              <a:t>Tableau</a:t>
             </a:r>
           </a:p>
         </p:txBody>
       </p:sp>
       <p:pic>
         <p:nvPicPr>
-          <p:cNvPr descr="../images/r/hsv-4.png" id="0" name="Picture 1"/>
+          <p:cNvPr descr="../images/tableau/gradient-options.png" id="0" name="Picture 1"/>
           <p:cNvPicPr>
             <a:picLocks noGrp="1" noChangeAspect="1"/>
           </p:cNvPicPr>
           <p:nvPr/>
         </p:nvPicPr>
         <p:blipFill>
-          <a:blip r:embed="rId2"/>
+          <a:blip r:embed="rId3"/>
           <a:stretch>
             <a:fillRect/>
           </a:stretch>
         </p:blipFill>
         <p:spPr bwMode="auto">
           <a:xfrm>
-            <a:off x="2311400" y="1600200"/>
-            <a:ext cx="4521200" cy="4521200"/>
+            <a:off x="3213100" y="1600200"/>
+            <a:ext cx="2705100" cy="4013200"/>
           </a:xfrm>
           <a:prstGeom prst="rect">
             <a:avLst/>
@@ -18947,6 +19637,68 @@
           </a:ln>
         </p:spPr>
       </p:pic>
+      <p:sp>
+        <p:nvSpPr>
+          <p:cNvPr id="1" name="TextBox 3"/>
+          <p:cNvSpPr txBox="1"/>
+          <p:nvPr/>
+        </p:nvSpPr>
+        <p:spPr>
+          <a:xfrm>
+            <a:off x="457200" y="5613400"/>
+            <a:ext cx="8229600" cy="508000"/>
+          </a:xfrm>
+          <a:prstGeom prst="rect">
+            <a:avLst/>
+          </a:prstGeom>
+          <a:noFill/>
+        </p:spPr>
+        <p:txBody>
+          <a:bodyPr/>
+          <a:lstStyle/>
+          <a:p>
+            <a:pPr lvl="0" marL="0" indent="0" algn="ctr">
+              <a:buNone/>
+            </a:pPr>
+            <a:r>
+              <a:rPr/>
+              <a:t>Gradient</a:t>
+            </a:r>
+            <a:r>
+              <a:rPr/>
+              <a:t> </a:t>
+            </a:r>
+            <a:r>
+              <a:rPr/>
+              <a:t>drop-down</a:t>
+            </a:r>
+            <a:r>
+              <a:rPr/>
+              <a:t> </a:t>
+            </a:r>
+            <a:r>
+              <a:rPr/>
+              <a:t>menu</a:t>
+            </a:r>
+            <a:r>
+              <a:rPr/>
+              <a:t> </a:t>
+            </a:r>
+            <a:r>
+              <a:rPr/>
+              <a:t>in</a:t>
+            </a:r>
+            <a:r>
+              <a:rPr/>
+              <a:t> </a:t>
+            </a:r>
+            <a:r>
+              <a:rPr/>
+              <a:t>Tableau</a:t>
+            </a:r>
+          </a:p>
+        </p:txBody>
+      </p:sp>
     </p:spTree>
   </p:cSld>
 </p:sld>
@@ -18989,88 +19741,139 @@
             </a:pPr>
             <a:r>
               <a:rPr/>
-              <a:t>Colors,</a:t>
-            </a:r>
-            <a:r>
-              <a:rPr/>
-              <a:t> </a:t>
-            </a:r>
-            <a:r>
-              <a:rPr/>
-              <a:t>HCL</a:t>
-            </a:r>
-            <a:r>
-              <a:rPr/>
-              <a:t> </a:t>
-            </a:r>
-            <a:r>
-              <a:rPr/>
-              <a:t>system</a:t>
+              <a:t>Discrete</a:t>
+            </a:r>
+            <a:r>
+              <a:rPr/>
+              <a:t> </a:t>
+            </a:r>
+            <a:r>
+              <a:rPr/>
+              <a:t>color</a:t>
+            </a:r>
+            <a:r>
+              <a:rPr/>
+              <a:t> </a:t>
+            </a:r>
+            <a:r>
+              <a:rPr/>
+              <a:t>options</a:t>
+            </a:r>
+            <a:r>
+              <a:rPr/>
+              <a:t> </a:t>
+            </a:r>
+            <a:r>
+              <a:rPr/>
+              <a:t>in</a:t>
+            </a:r>
+            <a:r>
+              <a:rPr/>
+              <a:t> </a:t>
+            </a:r>
+            <a:r>
+              <a:rPr/>
+              <a:t>Tableau</a:t>
             </a:r>
           </a:p>
         </p:txBody>
       </p:sp>
+      <p:pic>
+        <p:nvPicPr>
+          <p:cNvPr descr="../images/tableau/discrete-color-options.png" id="0" name="Picture 1"/>
+          <p:cNvPicPr>
+            <a:picLocks noGrp="1" noChangeAspect="1"/>
+          </p:cNvPicPr>
+          <p:nvPr/>
+        </p:nvPicPr>
+        <p:blipFill>
+          <a:blip r:embed="rId3"/>
+          <a:stretch>
+            <a:fillRect/>
+          </a:stretch>
+        </p:blipFill>
+        <p:spPr bwMode="auto">
+          <a:xfrm>
+            <a:off x="2832100" y="1600200"/>
+            <a:ext cx="3492500" cy="4013200"/>
+          </a:xfrm>
+          <a:prstGeom prst="rect">
+            <a:avLst/>
+          </a:prstGeom>
+          <a:noFill/>
+          <a:ln w="9525">
+            <a:noFill/>
+            <a:headEnd/>
+            <a:tailEnd/>
+          </a:ln>
+        </p:spPr>
+      </p:pic>
       <p:sp>
         <p:nvSpPr>
-          <p:cNvPr id="3" name="Content Placeholder 2"/>
-          <p:cNvSpPr>
-            <a:spLocks noGrp="1"/>
-          </p:cNvSpPr>
-          <p:nvPr>
-            <p:ph idx="1"/>
-          </p:nvPr>
+          <p:cNvPr id="1" name="TextBox 3"/>
+          <p:cNvSpPr txBox="1"/>
+          <p:nvPr/>
         </p:nvSpPr>
-        <p:spPr/>
+        <p:spPr>
+          <a:xfrm>
+            <a:off x="457200" y="5613400"/>
+            <a:ext cx="8229600" cy="508000"/>
+          </a:xfrm>
+          <a:prstGeom prst="rect">
+            <a:avLst/>
+          </a:prstGeom>
+          <a:noFill/>
+        </p:spPr>
         <p:txBody>
           <a:bodyPr/>
           <a:lstStyle/>
           <a:p>
-            <a:pPr lvl="1"/>
-            <a:r>
-              <a:rPr/>
-              <a:t>H = hue</a:t>
-            </a:r>
-          </a:p>
-          <a:p>
-            <a:pPr lvl="2"/>
-            <a:r>
-              <a:rPr/>
-              <a:t>arranged on a wheel 0-360 degrees</a:t>
-            </a:r>
-          </a:p>
-          <a:p>
-            <a:pPr lvl="1"/>
-            <a:r>
-              <a:rPr/>
-              <a:t>C = chroma</a:t>
-            </a:r>
-          </a:p>
-          <a:p>
-            <a:pPr lvl="2"/>
-            <a:r>
-              <a:rPr/>
-              <a:t>colorfulness relative to a gray of equal luminence</a:t>
-            </a:r>
-          </a:p>
-          <a:p>
-            <a:pPr lvl="2"/>
-            <a:r>
-              <a:rPr/>
-              <a:t>not quite same as saturation</a:t>
-            </a:r>
-          </a:p>
-          <a:p>
-            <a:pPr lvl="1"/>
-            <a:r>
-              <a:rPr/>
-              <a:t>L = luminence</a:t>
-            </a:r>
-          </a:p>
-          <a:p>
-            <a:pPr lvl="2"/>
-            <a:r>
-              <a:rPr/>
-              <a:t>brightness, lightness</a:t>
+            <a:pPr lvl="0" marL="0" indent="0" algn="ctr">
+              <a:buNone/>
+            </a:pPr>
+            <a:r>
+              <a:rPr/>
+              <a:t>Discrete</a:t>
+            </a:r>
+            <a:r>
+              <a:rPr/>
+              <a:t> </a:t>
+            </a:r>
+            <a:r>
+              <a:rPr/>
+              <a:t>color</a:t>
+            </a:r>
+            <a:r>
+              <a:rPr/>
+              <a:t> </a:t>
+            </a:r>
+            <a:r>
+              <a:rPr/>
+              <a:t>drop-down</a:t>
+            </a:r>
+            <a:r>
+              <a:rPr/>
+              <a:t> </a:t>
+            </a:r>
+            <a:r>
+              <a:rPr/>
+              <a:t>menu</a:t>
+            </a:r>
+            <a:r>
+              <a:rPr/>
+              <a:t> </a:t>
+            </a:r>
+            <a:r>
+              <a:rPr/>
+              <a:t>in</a:t>
+            </a:r>
+            <a:r>
+              <a:rPr/>
+              <a:t> </a:t>
+            </a:r>
+            <a:r>
+              <a:rPr/>
+              <a:t>Tableau</a:t>
             </a:r>
           </a:p>
         </p:txBody>
@@ -19125,57 +19928,42 @@
             </a:r>
             <a:r>
               <a:rPr/>
-              <a:t>Luminance</a:t>
-            </a:r>
-            <a:r>
-              <a:rPr/>
-              <a:t> </a:t>
-            </a:r>
-            <a:r>
-              <a:rPr/>
-              <a:t>=</a:t>
-            </a:r>
-            <a:r>
-              <a:rPr/>
-              <a:t> </a:t>
-            </a:r>
-            <a:r>
-              <a:rPr/>
-              <a:t>90%</a:t>
+              <a:t>HSV</a:t>
+            </a:r>
+            <a:r>
+              <a:rPr/>
+              <a:t> </a:t>
+            </a:r>
+            <a:r>
+              <a:rPr/>
+              <a:t>system</a:t>
             </a:r>
           </a:p>
         </p:txBody>
       </p:sp>
-      <p:pic>
-        <p:nvPicPr>
-          <p:cNvPr descr="../images/r/hcl-90.png" id="0" name="Picture 1"/>
-          <p:cNvPicPr>
-            <a:picLocks noGrp="1" noChangeAspect="1"/>
-          </p:cNvPicPr>
-          <p:nvPr/>
-        </p:nvPicPr>
-        <p:blipFill>
-          <a:blip r:embed="rId2"/>
-          <a:stretch>
-            <a:fillRect/>
-          </a:stretch>
-        </p:blipFill>
-        <p:spPr bwMode="auto">
-          <a:xfrm>
-            <a:off x="2311400" y="1600200"/>
-            <a:ext cx="4521200" cy="4521200"/>
-          </a:xfrm>
-          <a:prstGeom prst="rect">
-            <a:avLst/>
-          </a:prstGeom>
-          <a:noFill/>
-          <a:ln w="9525">
-            <a:noFill/>
-            <a:headEnd/>
-            <a:tailEnd/>
-          </a:ln>
-        </p:spPr>
-      </p:pic>
+      <p:sp>
+        <p:nvSpPr>
+          <p:cNvPr id="3" name="Content Placeholder 2"/>
+          <p:cNvSpPr>
+            <a:spLocks noGrp="1"/>
+          </p:cNvSpPr>
+          <p:nvPr>
+            <p:ph idx="1"/>
+          </p:nvPr>
+        </p:nvSpPr>
+        <p:spPr/>
+        <p:txBody>
+          <a:bodyPr/>
+          <a:lstStyle/>
+          <a:p>
+            <a:pPr lvl="1"/>
+            <a:r>
+              <a:rPr/>
+              <a:t>(To be added)</a:t>
+            </a:r>
+          </a:p>
+        </p:txBody>
+      </p:sp>
     </p:spTree>
   </p:cSld>
 </p:sld>
@@ -19226,14 +20014,22 @@
             </a:r>
             <a:r>
               <a:rPr/>
-              <a:t>Luminance=70%</a:t>
+              <a:t>HSV</a:t>
+            </a:r>
+            <a:r>
+              <a:rPr/>
+              <a:t> </a:t>
+            </a:r>
+            <a:r>
+              <a:rPr/>
+              <a:t>system</a:t>
             </a:r>
           </a:p>
         </p:txBody>
       </p:sp>
       <p:pic>
         <p:nvPicPr>
-          <p:cNvPr descr="../images/r/hcl-70.png" id="0" name="Picture 1"/>
+          <p:cNvPr descr="../images/r/hsv-1.png" id="0" name="Picture 1"/>
           <p:cNvPicPr>
             <a:picLocks noGrp="1" noChangeAspect="1"/>
           </p:cNvPicPr>
@@ -19311,14 +20107,38 @@
             </a:r>
             <a:r>
               <a:rPr/>
-              <a:t>Luminance=50%</a:t>
+              <a:t>HSV</a:t>
+            </a:r>
+            <a:r>
+              <a:rPr/>
+              <a:t> </a:t>
+            </a:r>
+            <a:r>
+              <a:rPr/>
+              <a:t>system,</a:t>
+            </a:r>
+            <a:r>
+              <a:rPr/>
+              <a:t> </a:t>
+            </a:r>
+            <a:r>
+              <a:rPr/>
+              <a:t>hue</a:t>
+            </a:r>
+            <a:r>
+              <a:rPr/>
+              <a:t> </a:t>
+            </a:r>
+            <a:r>
+              <a:rPr/>
+              <a:t>only</a:t>
             </a:r>
           </a:p>
         </p:txBody>
       </p:sp>
       <p:pic>
         <p:nvPicPr>
-          <p:cNvPr descr="../images/r/hcl-50.png" id="0" name="Picture 1"/>
+          <p:cNvPr descr="../images/r/hsv-2.png" id="0" name="Picture 1"/>
           <p:cNvPicPr>
             <a:picLocks noGrp="1" noChangeAspect="1"/>
           </p:cNvPicPr>
@@ -19396,14 +20216,38 @@
             </a:r>
             <a:r>
               <a:rPr/>
-              <a:t>Luminance=30%</a:t>
+              <a:t>HSV</a:t>
+            </a:r>
+            <a:r>
+              <a:rPr/>
+              <a:t> </a:t>
+            </a:r>
+            <a:r>
+              <a:rPr/>
+              <a:t>system,</a:t>
+            </a:r>
+            <a:r>
+              <a:rPr/>
+              <a:t> </a:t>
+            </a:r>
+            <a:r>
+              <a:rPr/>
+              <a:t>saturation</a:t>
+            </a:r>
+            <a:r>
+              <a:rPr/>
+              <a:t> </a:t>
+            </a:r>
+            <a:r>
+              <a:rPr/>
+              <a:t>only</a:t>
             </a:r>
           </a:p>
         </p:txBody>
       </p:sp>
       <p:pic>
         <p:nvPicPr>
-          <p:cNvPr descr="../images/r/hcl-30.png" id="0" name="Picture 1"/>
+          <p:cNvPr descr="../images/r/hsv-3.png" id="0" name="Picture 1"/>
           <p:cNvPicPr>
             <a:picLocks noGrp="1" noChangeAspect="1"/>
           </p:cNvPicPr>
@@ -19481,37 +20325,53 @@
             </a:r>
             <a:r>
               <a:rPr/>
-              <a:t>CMYK</a:t>
-            </a:r>
-            <a:r>
-              <a:rPr/>
-              <a:t> </a:t>
-            </a:r>
-            <a:r>
-              <a:rPr/>
-              <a:t>system</a:t>
+              <a:t>HSV</a:t>
+            </a:r>
+            <a:r>
+              <a:rPr/>
+              <a:t> </a:t>
+            </a:r>
+            <a:r>
+              <a:rPr/>
+              <a:t>system,</a:t>
+            </a:r>
+            <a:r>
+              <a:rPr/>
+              <a:t> </a:t>
+            </a:r>
+            <a:r>
+              <a:rPr/>
+              <a:t>value</a:t>
+            </a:r>
+            <a:r>
+              <a:rPr/>
+              <a:t> </a:t>
+            </a:r>
+            <a:r>
+              <a:rPr/>
+              <a:t>only</a:t>
             </a:r>
           </a:p>
         </p:txBody>
       </p:sp>
       <p:pic>
         <p:nvPicPr>
-          <p:cNvPr descr="../images/external/cymk-subtractive.png" id="0" name="Picture 1"/>
+          <p:cNvPr descr="../images/r/hsv-4.png" id="0" name="Picture 1"/>
           <p:cNvPicPr>
             <a:picLocks noGrp="1" noChangeAspect="1"/>
           </p:cNvPicPr>
           <p:nvPr/>
         </p:nvPicPr>
         <p:blipFill>
-          <a:blip r:embed="rId3"/>
+          <a:blip r:embed="rId2"/>
           <a:stretch>
             <a:fillRect/>
           </a:stretch>
         </p:blipFill>
         <p:spPr bwMode="auto">
           <a:xfrm>
-            <a:off x="2565400" y="1600200"/>
-            <a:ext cx="4013200" cy="4013200"/>
+            <a:off x="2311400" y="1600200"/>
+            <a:ext cx="4521200" cy="4521200"/>
           </a:xfrm>
           <a:prstGeom prst="rect">
             <a:avLst/>
@@ -19524,68 +20384,6 @@
           </a:ln>
         </p:spPr>
       </p:pic>
-      <p:sp>
-        <p:nvSpPr>
-          <p:cNvPr id="1" name="TextBox 3"/>
-          <p:cNvSpPr txBox="1"/>
-          <p:nvPr/>
-        </p:nvSpPr>
-        <p:spPr>
-          <a:xfrm>
-            <a:off x="457200" y="5613400"/>
-            <a:ext cx="8229600" cy="508000"/>
-          </a:xfrm>
-          <a:prstGeom prst="rect">
-            <a:avLst/>
-          </a:prstGeom>
-          <a:noFill/>
-        </p:spPr>
-        <p:txBody>
-          <a:bodyPr/>
-          <a:lstStyle/>
-          <a:p>
-            <a:pPr lvl="0" marL="0" indent="0" algn="ctr">
-              <a:buNone/>
-            </a:pPr>
-            <a:r>
-              <a:rPr/>
-              <a:t>Illustration</a:t>
-            </a:r>
-            <a:r>
-              <a:rPr/>
-              <a:t> </a:t>
-            </a:r>
-            <a:r>
-              <a:rPr/>
-              <a:t>of</a:t>
-            </a:r>
-            <a:r>
-              <a:rPr/>
-              <a:t> </a:t>
-            </a:r>
-            <a:r>
-              <a:rPr/>
-              <a:t>subtractive</a:t>
-            </a:r>
-            <a:r>
-              <a:rPr/>
-              <a:t> </a:t>
-            </a:r>
-            <a:r>
-              <a:rPr/>
-              <a:t>color</a:t>
-            </a:r>
-            <a:r>
-              <a:rPr/>
-              <a:t> </a:t>
-            </a:r>
-            <a:r>
-              <a:rPr/>
-              <a:t>scheme</a:t>
-            </a:r>
-          </a:p>
-        </p:txBody>
-      </p:sp>
     </p:spTree>
   </p:cSld>
 </p:sld>
@@ -19636,23 +20434,15 @@
             </a:r>
             <a:r>
               <a:rPr/>
-              <a:t>CMYK</a:t>
-            </a:r>
-            <a:r>
-              <a:rPr/>
-              <a:t> </a:t>
-            </a:r>
-            <a:r>
-              <a:rPr/>
-              <a:t>system,</a:t>
-            </a:r>
-            <a:r>
-              <a:rPr/>
-              <a:t> </a:t>
-            </a:r>
-            <a:r>
-              <a:rPr/>
-              <a:t>combinations</a:t>
+              <a:t>HCL</a:t>
+            </a:r>
+            <a:r>
+              <a:rPr/>
+              <a:t> </a:t>
+            </a:r>
+            <a:r>
+              <a:rPr/>
+              <a:t>system</a:t>
             </a:r>
           </a:p>
         </p:txBody>
@@ -19675,35 +20465,77 @@
             <a:pPr lvl="1"/>
             <a:r>
               <a:rPr/>
-              <a:t>Building blocks Cyan (C), Magenta (M), Yellow (Y), Black (K).</a:t>
+              <a:t>H = hue</a:t>
+            </a:r>
+          </a:p>
+          <a:p>
+            <a:pPr lvl="2"/>
+            <a:r>
+              <a:rPr/>
+              <a:t>arranged on a wheel 0-360 degrees</a:t>
+            </a:r>
+          </a:p>
+          <a:p>
+            <a:pPr lvl="2"/>
+            <a:r>
+              <a:rPr/>
+              <a:t>0 = red, 120 = green, 240 = blue</a:t>
+            </a:r>
+          </a:p>
+          <a:p>
+            <a:pPr lvl="2"/>
+            <a:r>
+              <a:rPr/>
+              <a:t>60 = yellow, 180 = cyan, 240 = magenta</a:t>
             </a:r>
           </a:p>
           <a:p>
             <a:pPr lvl="1"/>
             <a:r>
               <a:rPr/>
-              <a:t>Cyan plus Magenta equals Blue</a:t>
+              <a:t>C = chroma</a:t>
+            </a:r>
+          </a:p>
+          <a:p>
+            <a:pPr lvl="2"/>
+            <a:r>
+              <a:rPr/>
+              <a:t>colorfulness relative to a gray of equal luminence</a:t>
+            </a:r>
+          </a:p>
+          <a:p>
+            <a:pPr lvl="2"/>
+            <a:r>
+              <a:rPr/>
+              <a:t>not quite same as saturation</a:t>
             </a:r>
           </a:p>
           <a:p>
             <a:pPr lvl="1"/>
             <a:r>
               <a:rPr/>
-              <a:t>Cyan plus Yellow equals Green</a:t>
+              <a:t>L = luminence</a:t>
+            </a:r>
+          </a:p>
+          <a:p>
+            <a:pPr lvl="2"/>
+            <a:r>
+              <a:rPr/>
+              <a:t>brightness, lightness</a:t>
             </a:r>
           </a:p>
           <a:p>
             <a:pPr lvl="1"/>
             <a:r>
               <a:rPr/>
-              <a:t>Magenta plus Yellow equals Red</a:t>
+              <a:t>Not all combinations of HCL work</a:t>
             </a:r>
           </a:p>
           <a:p>
             <a:pPr lvl="1"/>
             <a:r>
               <a:rPr/>
-              <a:t>All three combined equals Black</a:t>
+              <a:t>Very similar systems are CIE-LUV, CIE-LAB</a:t>
             </a:r>
           </a:p>
         </p:txBody>
@@ -20045,6 +20877,362 @@
             </a:r>
             <a:r>
               <a:rPr/>
+              <a:t>Luminance</a:t>
+            </a:r>
+            <a:r>
+              <a:rPr/>
+              <a:t> </a:t>
+            </a:r>
+            <a:r>
+              <a:rPr/>
+              <a:t>=</a:t>
+            </a:r>
+            <a:r>
+              <a:rPr/>
+              <a:t> </a:t>
+            </a:r>
+            <a:r>
+              <a:rPr/>
+              <a:t>90%</a:t>
+            </a:r>
+          </a:p>
+        </p:txBody>
+      </p:sp>
+      <p:pic>
+        <p:nvPicPr>
+          <p:cNvPr descr="../images/r/hcl-90.png" id="0" name="Picture 1"/>
+          <p:cNvPicPr>
+            <a:picLocks noGrp="1" noChangeAspect="1"/>
+          </p:cNvPicPr>
+          <p:nvPr/>
+        </p:nvPicPr>
+        <p:blipFill>
+          <a:blip r:embed="rId2"/>
+          <a:stretch>
+            <a:fillRect/>
+          </a:stretch>
+        </p:blipFill>
+        <p:spPr bwMode="auto">
+          <a:xfrm>
+            <a:off x="2311400" y="1600200"/>
+            <a:ext cx="4521200" cy="4521200"/>
+          </a:xfrm>
+          <a:prstGeom prst="rect">
+            <a:avLst/>
+          </a:prstGeom>
+          <a:noFill/>
+          <a:ln w="9525">
+            <a:noFill/>
+            <a:headEnd/>
+            <a:tailEnd/>
+          </a:ln>
+        </p:spPr>
+      </p:pic>
+    </p:spTree>
+  </p:cSld>
+</p:sld>
+</file>
+
+<file path=ppt/slides/slide41.xml><?xml version="1.0" encoding="utf-8"?>
+<p:sld xmlns:a="http://schemas.openxmlformats.org/drawingml/2006/main" xmlns:r="http://schemas.openxmlformats.org/officeDocument/2006/relationships" xmlns:p="http://schemas.openxmlformats.org/presentationml/2006/main">
+  <p:cSld>
+    <p:spTree>
+      <p:nvGrpSpPr>
+        <p:cNvPr id="1" name=""/>
+        <p:cNvGrpSpPr/>
+        <p:nvPr/>
+      </p:nvGrpSpPr>
+      <p:grpSpPr>
+        <a:xfrm>
+          <a:off x="0" y="0"/>
+          <a:ext cx="0" cy="0"/>
+          <a:chOff x="0" y="0"/>
+          <a:chExt cx="0" cy="0"/>
+        </a:xfrm>
+      </p:grpSpPr>
+      <p:sp>
+        <p:nvSpPr>
+          <p:cNvPr id="2" name="Title 1"/>
+          <p:cNvSpPr>
+            <a:spLocks noGrp="1"/>
+          </p:cNvSpPr>
+          <p:nvPr>
+            <p:ph type="title"/>
+          </p:nvPr>
+        </p:nvSpPr>
+        <p:spPr/>
+        <p:txBody>
+          <a:bodyPr/>
+          <a:lstStyle/>
+          <a:p>
+            <a:pPr lvl="0" marL="0" indent="0">
+              <a:buNone/>
+            </a:pPr>
+            <a:r>
+              <a:rPr/>
+              <a:t>Colors,</a:t>
+            </a:r>
+            <a:r>
+              <a:rPr/>
+              <a:t> </a:t>
+            </a:r>
+            <a:r>
+              <a:rPr/>
+              <a:t>Luminance=70%</a:t>
+            </a:r>
+          </a:p>
+        </p:txBody>
+      </p:sp>
+      <p:pic>
+        <p:nvPicPr>
+          <p:cNvPr descr="../images/r/hcl-70.png" id="0" name="Picture 1"/>
+          <p:cNvPicPr>
+            <a:picLocks noGrp="1" noChangeAspect="1"/>
+          </p:cNvPicPr>
+          <p:nvPr/>
+        </p:nvPicPr>
+        <p:blipFill>
+          <a:blip r:embed="rId2"/>
+          <a:stretch>
+            <a:fillRect/>
+          </a:stretch>
+        </p:blipFill>
+        <p:spPr bwMode="auto">
+          <a:xfrm>
+            <a:off x="2311400" y="1600200"/>
+            <a:ext cx="4521200" cy="4521200"/>
+          </a:xfrm>
+          <a:prstGeom prst="rect">
+            <a:avLst/>
+          </a:prstGeom>
+          <a:noFill/>
+          <a:ln w="9525">
+            <a:noFill/>
+            <a:headEnd/>
+            <a:tailEnd/>
+          </a:ln>
+        </p:spPr>
+      </p:pic>
+    </p:spTree>
+  </p:cSld>
+</p:sld>
+</file>
+
+<file path=ppt/slides/slide42.xml><?xml version="1.0" encoding="utf-8"?>
+<p:sld xmlns:a="http://schemas.openxmlformats.org/drawingml/2006/main" xmlns:r="http://schemas.openxmlformats.org/officeDocument/2006/relationships" xmlns:p="http://schemas.openxmlformats.org/presentationml/2006/main">
+  <p:cSld>
+    <p:spTree>
+      <p:nvGrpSpPr>
+        <p:cNvPr id="1" name=""/>
+        <p:cNvGrpSpPr/>
+        <p:nvPr/>
+      </p:nvGrpSpPr>
+      <p:grpSpPr>
+        <a:xfrm>
+          <a:off x="0" y="0"/>
+          <a:ext cx="0" cy="0"/>
+          <a:chOff x="0" y="0"/>
+          <a:chExt cx="0" cy="0"/>
+        </a:xfrm>
+      </p:grpSpPr>
+      <p:sp>
+        <p:nvSpPr>
+          <p:cNvPr id="2" name="Title 1"/>
+          <p:cNvSpPr>
+            <a:spLocks noGrp="1"/>
+          </p:cNvSpPr>
+          <p:nvPr>
+            <p:ph type="title"/>
+          </p:nvPr>
+        </p:nvSpPr>
+        <p:spPr/>
+        <p:txBody>
+          <a:bodyPr/>
+          <a:lstStyle/>
+          <a:p>
+            <a:pPr lvl="0" marL="0" indent="0">
+              <a:buNone/>
+            </a:pPr>
+            <a:r>
+              <a:rPr/>
+              <a:t>Colors,</a:t>
+            </a:r>
+            <a:r>
+              <a:rPr/>
+              <a:t> </a:t>
+            </a:r>
+            <a:r>
+              <a:rPr/>
+              <a:t>Luminance=50%</a:t>
+            </a:r>
+          </a:p>
+        </p:txBody>
+      </p:sp>
+      <p:pic>
+        <p:nvPicPr>
+          <p:cNvPr descr="../images/r/hcl-50.png" id="0" name="Picture 1"/>
+          <p:cNvPicPr>
+            <a:picLocks noGrp="1" noChangeAspect="1"/>
+          </p:cNvPicPr>
+          <p:nvPr/>
+        </p:nvPicPr>
+        <p:blipFill>
+          <a:blip r:embed="rId2"/>
+          <a:stretch>
+            <a:fillRect/>
+          </a:stretch>
+        </p:blipFill>
+        <p:spPr bwMode="auto">
+          <a:xfrm>
+            <a:off x="2311400" y="1600200"/>
+            <a:ext cx="4521200" cy="4521200"/>
+          </a:xfrm>
+          <a:prstGeom prst="rect">
+            <a:avLst/>
+          </a:prstGeom>
+          <a:noFill/>
+          <a:ln w="9525">
+            <a:noFill/>
+            <a:headEnd/>
+            <a:tailEnd/>
+          </a:ln>
+        </p:spPr>
+      </p:pic>
+    </p:spTree>
+  </p:cSld>
+</p:sld>
+</file>
+
+<file path=ppt/slides/slide43.xml><?xml version="1.0" encoding="utf-8"?>
+<p:sld xmlns:a="http://schemas.openxmlformats.org/drawingml/2006/main" xmlns:r="http://schemas.openxmlformats.org/officeDocument/2006/relationships" xmlns:p="http://schemas.openxmlformats.org/presentationml/2006/main">
+  <p:cSld>
+    <p:spTree>
+      <p:nvGrpSpPr>
+        <p:cNvPr id="1" name=""/>
+        <p:cNvGrpSpPr/>
+        <p:nvPr/>
+      </p:nvGrpSpPr>
+      <p:grpSpPr>
+        <a:xfrm>
+          <a:off x="0" y="0"/>
+          <a:ext cx="0" cy="0"/>
+          <a:chOff x="0" y="0"/>
+          <a:chExt cx="0" cy="0"/>
+        </a:xfrm>
+      </p:grpSpPr>
+      <p:sp>
+        <p:nvSpPr>
+          <p:cNvPr id="2" name="Title 1"/>
+          <p:cNvSpPr>
+            <a:spLocks noGrp="1"/>
+          </p:cNvSpPr>
+          <p:nvPr>
+            <p:ph type="title"/>
+          </p:nvPr>
+        </p:nvSpPr>
+        <p:spPr/>
+        <p:txBody>
+          <a:bodyPr/>
+          <a:lstStyle/>
+          <a:p>
+            <a:pPr lvl="0" marL="0" indent="0">
+              <a:buNone/>
+            </a:pPr>
+            <a:r>
+              <a:rPr/>
+              <a:t>Colors,</a:t>
+            </a:r>
+            <a:r>
+              <a:rPr/>
+              <a:t> </a:t>
+            </a:r>
+            <a:r>
+              <a:rPr/>
+              <a:t>Luminance=30%</a:t>
+            </a:r>
+          </a:p>
+        </p:txBody>
+      </p:sp>
+      <p:pic>
+        <p:nvPicPr>
+          <p:cNvPr descr="../images/r/hcl-30.png" id="0" name="Picture 1"/>
+          <p:cNvPicPr>
+            <a:picLocks noGrp="1" noChangeAspect="1"/>
+          </p:cNvPicPr>
+          <p:nvPr/>
+        </p:nvPicPr>
+        <p:blipFill>
+          <a:blip r:embed="rId2"/>
+          <a:stretch>
+            <a:fillRect/>
+          </a:stretch>
+        </p:blipFill>
+        <p:spPr bwMode="auto">
+          <a:xfrm>
+            <a:off x="2311400" y="1600200"/>
+            <a:ext cx="4521200" cy="4521200"/>
+          </a:xfrm>
+          <a:prstGeom prst="rect">
+            <a:avLst/>
+          </a:prstGeom>
+          <a:noFill/>
+          <a:ln w="9525">
+            <a:noFill/>
+            <a:headEnd/>
+            <a:tailEnd/>
+          </a:ln>
+        </p:spPr>
+      </p:pic>
+    </p:spTree>
+  </p:cSld>
+</p:sld>
+</file>
+
+<file path=ppt/slides/slide44.xml><?xml version="1.0" encoding="utf-8"?>
+<p:sld xmlns:a="http://schemas.openxmlformats.org/drawingml/2006/main" xmlns:r="http://schemas.openxmlformats.org/officeDocument/2006/relationships" xmlns:p="http://schemas.openxmlformats.org/presentationml/2006/main">
+  <p:cSld>
+    <p:spTree>
+      <p:nvGrpSpPr>
+        <p:cNvPr id="1" name=""/>
+        <p:cNvGrpSpPr/>
+        <p:nvPr/>
+      </p:nvGrpSpPr>
+      <p:grpSpPr>
+        <a:xfrm>
+          <a:off x="0" y="0"/>
+          <a:ext cx="0" cy="0"/>
+          <a:chOff x="0" y="0"/>
+          <a:chExt cx="0" cy="0"/>
+        </a:xfrm>
+      </p:grpSpPr>
+      <p:sp>
+        <p:nvSpPr>
+          <p:cNvPr id="2" name="Title 1"/>
+          <p:cNvSpPr>
+            <a:spLocks noGrp="1"/>
+          </p:cNvSpPr>
+          <p:nvPr>
+            <p:ph type="title"/>
+          </p:nvPr>
+        </p:nvSpPr>
+        <p:spPr/>
+        <p:txBody>
+          <a:bodyPr/>
+          <a:lstStyle/>
+          <a:p>
+            <a:pPr lvl="0" marL="0" indent="0">
+              <a:buNone/>
+            </a:pPr>
+            <a:r>
+              <a:rPr/>
+              <a:t>Colors,</a:t>
+            </a:r>
+            <a:r>
+              <a:rPr/>
+              <a:t> </a:t>
+            </a:r>
+            <a:r>
+              <a:rPr/>
               <a:t>CMYK</a:t>
             </a:r>
             <a:r>
@@ -20053,6 +21241,161 @@
             </a:r>
             <a:r>
               <a:rPr/>
+              <a:t>system</a:t>
+            </a:r>
+          </a:p>
+        </p:txBody>
+      </p:sp>
+      <p:pic>
+        <p:nvPicPr>
+          <p:cNvPr descr="../images/external/cymk-subtractive.png" id="0" name="Picture 1"/>
+          <p:cNvPicPr>
+            <a:picLocks noGrp="1" noChangeAspect="1"/>
+          </p:cNvPicPr>
+          <p:nvPr/>
+        </p:nvPicPr>
+        <p:blipFill>
+          <a:blip r:embed="rId3"/>
+          <a:stretch>
+            <a:fillRect/>
+          </a:stretch>
+        </p:blipFill>
+        <p:spPr bwMode="auto">
+          <a:xfrm>
+            <a:off x="2565400" y="1600200"/>
+            <a:ext cx="4013200" cy="4013200"/>
+          </a:xfrm>
+          <a:prstGeom prst="rect">
+            <a:avLst/>
+          </a:prstGeom>
+          <a:noFill/>
+          <a:ln w="9525">
+            <a:noFill/>
+            <a:headEnd/>
+            <a:tailEnd/>
+          </a:ln>
+        </p:spPr>
+      </p:pic>
+      <p:sp>
+        <p:nvSpPr>
+          <p:cNvPr id="1" name="TextBox 3"/>
+          <p:cNvSpPr txBox="1"/>
+          <p:nvPr/>
+        </p:nvSpPr>
+        <p:spPr>
+          <a:xfrm>
+            <a:off x="457200" y="5613400"/>
+            <a:ext cx="8229600" cy="508000"/>
+          </a:xfrm>
+          <a:prstGeom prst="rect">
+            <a:avLst/>
+          </a:prstGeom>
+          <a:noFill/>
+        </p:spPr>
+        <p:txBody>
+          <a:bodyPr/>
+          <a:lstStyle/>
+          <a:p>
+            <a:pPr lvl="0" marL="0" indent="0" algn="ctr">
+              <a:buNone/>
+            </a:pPr>
+            <a:r>
+              <a:rPr/>
+              <a:t>Illustration</a:t>
+            </a:r>
+            <a:r>
+              <a:rPr/>
+              <a:t> </a:t>
+            </a:r>
+            <a:r>
+              <a:rPr/>
+              <a:t>of</a:t>
+            </a:r>
+            <a:r>
+              <a:rPr/>
+              <a:t> </a:t>
+            </a:r>
+            <a:r>
+              <a:rPr/>
+              <a:t>subtractive</a:t>
+            </a:r>
+            <a:r>
+              <a:rPr/>
+              <a:t> </a:t>
+            </a:r>
+            <a:r>
+              <a:rPr/>
+              <a:t>color</a:t>
+            </a:r>
+            <a:r>
+              <a:rPr/>
+              <a:t> </a:t>
+            </a:r>
+            <a:r>
+              <a:rPr/>
+              <a:t>scheme</a:t>
+            </a:r>
+          </a:p>
+        </p:txBody>
+      </p:sp>
+    </p:spTree>
+  </p:cSld>
+</p:sld>
+</file>
+
+<file path=ppt/slides/slide45.xml><?xml version="1.0" encoding="utf-8"?>
+<p:sld xmlns:a="http://schemas.openxmlformats.org/drawingml/2006/main" xmlns:r="http://schemas.openxmlformats.org/officeDocument/2006/relationships" xmlns:p="http://schemas.openxmlformats.org/presentationml/2006/main">
+  <p:cSld>
+    <p:spTree>
+      <p:nvGrpSpPr>
+        <p:cNvPr id="1" name=""/>
+        <p:cNvGrpSpPr/>
+        <p:nvPr/>
+      </p:nvGrpSpPr>
+      <p:grpSpPr>
+        <a:xfrm>
+          <a:off x="0" y="0"/>
+          <a:ext cx="0" cy="0"/>
+          <a:chOff x="0" y="0"/>
+          <a:chExt cx="0" cy="0"/>
+        </a:xfrm>
+      </p:grpSpPr>
+      <p:sp>
+        <p:nvSpPr>
+          <p:cNvPr id="2" name="Title 1"/>
+          <p:cNvSpPr>
+            <a:spLocks noGrp="1"/>
+          </p:cNvSpPr>
+          <p:nvPr>
+            <p:ph type="title"/>
+          </p:nvPr>
+        </p:nvSpPr>
+        <p:spPr/>
+        <p:txBody>
+          <a:bodyPr/>
+          <a:lstStyle/>
+          <a:p>
+            <a:pPr lvl="0" marL="0" indent="0">
+              <a:buNone/>
+            </a:pPr>
+            <a:r>
+              <a:rPr/>
+              <a:t>Colors,</a:t>
+            </a:r>
+            <a:r>
+              <a:rPr/>
+              <a:t> </a:t>
+            </a:r>
+            <a:r>
+              <a:rPr/>
+              <a:t>CMYK</a:t>
+            </a:r>
+            <a:r>
+              <a:rPr/>
+              <a:t> </a:t>
+            </a:r>
+            <a:r>
+              <a:rPr/>
               <a:t>system,</a:t>
             </a:r>
             <a:r>
@@ -20061,31 +21404,7 @@
             </a:r>
             <a:r>
               <a:rPr/>
-              <a:t>Why</a:t>
-            </a:r>
-            <a:r>
-              <a:rPr/>
-              <a:t> </a:t>
-            </a:r>
-            <a:r>
-              <a:rPr/>
-              <a:t>you</a:t>
-            </a:r>
-            <a:r>
-              <a:rPr/>
-              <a:t> </a:t>
-            </a:r>
-            <a:r>
-              <a:rPr/>
-              <a:t>need</a:t>
-            </a:r>
-            <a:r>
-              <a:rPr/>
-              <a:t> </a:t>
-            </a:r>
-            <a:r>
-              <a:rPr/>
-              <a:t>black</a:t>
+              <a:t>combinations</a:t>
             </a:r>
           </a:p>
         </p:txBody>
@@ -20108,21 +21427,35 @@
             <a:pPr lvl="1"/>
             <a:r>
               <a:rPr/>
-              <a:t>Only in theory does, C+M+Y = Black</a:t>
-            </a:r>
-          </a:p>
-          <a:p>
-            <a:pPr lvl="2"/>
-            <a:r>
-              <a:rPr/>
-              <a:t>Too much ink</a:t>
-            </a:r>
-          </a:p>
-          <a:p>
-            <a:pPr lvl="2"/>
-            <a:r>
-              <a:rPr/>
-              <a:t>Dull muddy color</a:t>
+              <a:t>Building blocks Cyan (C), Magenta (M), Yellow (Y), Black (K).</a:t>
+            </a:r>
+          </a:p>
+          <a:p>
+            <a:pPr lvl="1"/>
+            <a:r>
+              <a:rPr/>
+              <a:t>Cyan plus Magenta equals Blue</a:t>
+            </a:r>
+          </a:p>
+          <a:p>
+            <a:pPr lvl="1"/>
+            <a:r>
+              <a:rPr/>
+              <a:t>Cyan plus Yellow equals Green</a:t>
+            </a:r>
+          </a:p>
+          <a:p>
+            <a:pPr lvl="1"/>
+            <a:r>
+              <a:rPr/>
+              <a:t>Magenta plus Yellow equals Red</a:t>
+            </a:r>
+          </a:p>
+          <a:p>
+            <a:pPr lvl="1"/>
+            <a:r>
+              <a:rPr/>
+              <a:t>All three combined equals Black</a:t>
             </a:r>
           </a:p>
         </p:txBody>
@@ -20132,7 +21465,139 @@
 </p:sld>
 </file>
 
-<file path=ppt/slides/slide41.xml><?xml version="1.0" encoding="utf-8"?>
+<file path=ppt/slides/slide46.xml><?xml version="1.0" encoding="utf-8"?>
+<p:sld xmlns:a="http://schemas.openxmlformats.org/drawingml/2006/main" xmlns:r="http://schemas.openxmlformats.org/officeDocument/2006/relationships" xmlns:p="http://schemas.openxmlformats.org/presentationml/2006/main">
+  <p:cSld>
+    <p:spTree>
+      <p:nvGrpSpPr>
+        <p:cNvPr id="1" name=""/>
+        <p:cNvGrpSpPr/>
+        <p:nvPr/>
+      </p:nvGrpSpPr>
+      <p:grpSpPr>
+        <a:xfrm>
+          <a:off x="0" y="0"/>
+          <a:ext cx="0" cy="0"/>
+          <a:chOff x="0" y="0"/>
+          <a:chExt cx="0" cy="0"/>
+        </a:xfrm>
+      </p:grpSpPr>
+      <p:sp>
+        <p:nvSpPr>
+          <p:cNvPr id="2" name="Title 1"/>
+          <p:cNvSpPr>
+            <a:spLocks noGrp="1"/>
+          </p:cNvSpPr>
+          <p:nvPr>
+            <p:ph type="title"/>
+          </p:nvPr>
+        </p:nvSpPr>
+        <p:spPr/>
+        <p:txBody>
+          <a:bodyPr/>
+          <a:lstStyle/>
+          <a:p>
+            <a:pPr lvl="0" marL="0" indent="0">
+              <a:buNone/>
+            </a:pPr>
+            <a:r>
+              <a:rPr/>
+              <a:t>Colors,</a:t>
+            </a:r>
+            <a:r>
+              <a:rPr/>
+              <a:t> </a:t>
+            </a:r>
+            <a:r>
+              <a:rPr/>
+              <a:t>CMYK</a:t>
+            </a:r>
+            <a:r>
+              <a:rPr/>
+              <a:t> </a:t>
+            </a:r>
+            <a:r>
+              <a:rPr/>
+              <a:t>system,</a:t>
+            </a:r>
+            <a:r>
+              <a:rPr/>
+              <a:t> </a:t>
+            </a:r>
+            <a:r>
+              <a:rPr/>
+              <a:t>Why</a:t>
+            </a:r>
+            <a:r>
+              <a:rPr/>
+              <a:t> </a:t>
+            </a:r>
+            <a:r>
+              <a:rPr/>
+              <a:t>you</a:t>
+            </a:r>
+            <a:r>
+              <a:rPr/>
+              <a:t> </a:t>
+            </a:r>
+            <a:r>
+              <a:rPr/>
+              <a:t>need</a:t>
+            </a:r>
+            <a:r>
+              <a:rPr/>
+              <a:t> </a:t>
+            </a:r>
+            <a:r>
+              <a:rPr/>
+              <a:t>black</a:t>
+            </a:r>
+          </a:p>
+        </p:txBody>
+      </p:sp>
+      <p:sp>
+        <p:nvSpPr>
+          <p:cNvPr id="3" name="Content Placeholder 2"/>
+          <p:cNvSpPr>
+            <a:spLocks noGrp="1"/>
+          </p:cNvSpPr>
+          <p:nvPr>
+            <p:ph idx="1"/>
+          </p:nvPr>
+        </p:nvSpPr>
+        <p:spPr/>
+        <p:txBody>
+          <a:bodyPr/>
+          <a:lstStyle/>
+          <a:p>
+            <a:pPr lvl="1"/>
+            <a:r>
+              <a:rPr/>
+              <a:t>Only in theory does, C+M+Y = Black</a:t>
+            </a:r>
+          </a:p>
+          <a:p>
+            <a:pPr lvl="2"/>
+            <a:r>
+              <a:rPr/>
+              <a:t>Too much ink</a:t>
+            </a:r>
+          </a:p>
+          <a:p>
+            <a:pPr lvl="2"/>
+            <a:r>
+              <a:rPr/>
+              <a:t>Dull muddy color</a:t>
+            </a:r>
+          </a:p>
+        </p:txBody>
+      </p:sp>
+    </p:spTree>
+  </p:cSld>
+</p:sld>
+</file>
+
+<file path=ppt/slides/slide47.xml><?xml version="1.0" encoding="utf-8"?>
 <p:sld xmlns:a="http://schemas.openxmlformats.org/drawingml/2006/main" xmlns:r="http://schemas.openxmlformats.org/officeDocument/2006/relationships" xmlns:p="http://schemas.openxmlformats.org/presentationml/2006/main">
   <p:cSld>
     <p:spTree>

</xml_diff>

<commit_message>
Work on R gradients
</commit_message>
<xml_diff>
--- a/data-viz-02/component/tutorial-colors.pptx
+++ b/data-viz-02/component/tutorial-colors.pptx
@@ -5,7 +5,7 @@
     <p:sldMasterId id="2147483648" r:id="rId1"/>
   </p:sldMasterIdLst>
   <p:notesMasterIdLst>
-    <p:NotesMasterId r:id="rId49"/>
+    <p:NotesMasterId r:id="rId51"/>
   </p:notesMasterIdLst>
   <p:sldIdLst>
     <p:sldId id="256" r:id="rId2"/>
@@ -55,6 +55,8 @@
     <p:sldId id="300" r:id="rId46"/>
     <p:sldId id="301" r:id="rId47"/>
     <p:sldId id="302" r:id="rId48"/>
+    <p:sldId id="303" r:id="rId49"/>
+    <p:sldId id="304" r:id="rId50"/>
   </p:sldIdLst>
   <p:sldSz cx="9144000" cy="6858000" type="screen4x3"/>
   <p:notesSz cx="6858000" cy="9144000"/>
@@ -6465,7 +6467,7 @@
           <a:p>
             <a:fld id="{18BDFEC3-8487-43E8-A154-7C12CBC1FFF2}" type="slidenum">
               <a:rPr lang="en-US"/>
-              <a:t>31</a:t>
+              <a:t>32</a:t>
             </a:fld>
             <a:endParaRPr lang="en-US"/>
           </a:p>
@@ -6547,7 +6549,7 @@
           <a:p>
             <a:fld id="{18BDFEC3-8487-43E8-A154-7C12CBC1FFF2}" type="slidenum">
               <a:rPr lang="en-US"/>
-              <a:t>32</a:t>
+              <a:t>34</a:t>
             </a:fld>
             <a:endParaRPr lang="en-US"/>
           </a:p>
@@ -6629,7 +6631,7 @@
           <a:p>
             <a:fld id="{18BDFEC3-8487-43E8-A154-7C12CBC1FFF2}" type="slidenum">
               <a:rPr lang="en-US"/>
-              <a:t>33</a:t>
+              <a:t>35</a:t>
             </a:fld>
             <a:endParaRPr lang="en-US"/>
           </a:p>
@@ -6893,7 +6895,7 @@
           <a:p>
             <a:fld id="{18BDFEC3-8487-43E8-A154-7C12CBC1FFF2}" type="slidenum">
               <a:rPr lang="en-US"/>
-              <a:t>39</a:t>
+              <a:t>41</a:t>
             </a:fld>
             <a:endParaRPr lang="en-US"/>
           </a:p>
@@ -7487,7 +7489,7 @@
           <a:p>
             <a:fld id="{18BDFEC3-8487-43E8-A154-7C12CBC1FFF2}" type="slidenum">
               <a:rPr lang="en-US"/>
-              <a:t>44</a:t>
+              <a:t>46</a:t>
             </a:fld>
             <a:endParaRPr lang="en-US"/>
           </a:p>
@@ -8057,7 +8059,7 @@
           <a:p>
             <a:fld id="{18BDFEC3-8487-43E8-A154-7C12CBC1FFF2}" type="slidenum">
               <a:rPr lang="en-US"/>
-              <a:t>47</a:t>
+              <a:t>49</a:t>
             </a:fld>
             <a:endParaRPr lang="en-US"/>
           </a:p>
@@ -19380,8 +19382,8 @@
         </p:blipFill>
         <p:spPr bwMode="auto">
           <a:xfrm>
-            <a:off x="1409700" y="1600200"/>
-            <a:ext cx="6311900" cy="4013200"/>
+            <a:off x="1447800" y="1600200"/>
+            <a:ext cx="6248400" cy="4013200"/>
           </a:xfrm>
           <a:prstGeom prst="rect">
             <a:avLst/>
@@ -19519,14 +19521,66 @@
           </a:p>
         </p:txBody>
       </p:sp>
+      <p:pic>
+        <p:nvPicPr>
+          <p:cNvPr descr="../images/r/heat-colors.png" id="0" name="Picture 1"/>
+          <p:cNvPicPr>
+            <a:picLocks noGrp="1" noChangeAspect="1"/>
+          </p:cNvPicPr>
+          <p:nvPr/>
+        </p:nvPicPr>
+        <p:blipFill>
+          <a:blip r:embed="rId2"/>
+          <a:stretch>
+            <a:fillRect/>
+          </a:stretch>
+        </p:blipFill>
+        <p:spPr bwMode="auto">
+          <a:xfrm>
+            <a:off x="2311400" y="1600200"/>
+            <a:ext cx="4521200" cy="4521200"/>
+          </a:xfrm>
+          <a:prstGeom prst="rect">
+            <a:avLst/>
+          </a:prstGeom>
+          <a:noFill/>
+          <a:ln w="9525">
+            <a:noFill/>
+            <a:headEnd/>
+            <a:tailEnd/>
+          </a:ln>
+        </p:spPr>
+      </p:pic>
+    </p:spTree>
+  </p:cSld>
+</p:sld>
+</file>
+
+<file path=ppt/slides/slide32.xml><?xml version="1.0" encoding="utf-8"?>
+<p:sld xmlns:a="http://schemas.openxmlformats.org/drawingml/2006/main" xmlns:r="http://schemas.openxmlformats.org/officeDocument/2006/relationships" xmlns:p="http://schemas.openxmlformats.org/presentationml/2006/main">
+  <p:cSld>
+    <p:spTree>
+      <p:nvGrpSpPr>
+        <p:cNvPr id="1" name=""/>
+        <p:cNvGrpSpPr/>
+        <p:nvPr/>
+      </p:nvGrpSpPr>
+      <p:grpSpPr>
+        <a:xfrm>
+          <a:off x="0" y="0"/>
+          <a:ext cx="0" cy="0"/>
+          <a:chOff x="0" y="0"/>
+          <a:chExt cx="0" cy="0"/>
+        </a:xfrm>
+      </p:grpSpPr>
       <p:sp>
         <p:nvSpPr>
-          <p:cNvPr id="3" name="Content Placeholder 2"/>
+          <p:cNvPr id="2" name="Title 1"/>
           <p:cNvSpPr>
             <a:spLocks noGrp="1"/>
           </p:cNvSpPr>
           <p:nvPr>
-            <p:ph idx="1"/>
+            <p:ph type="title"/>
           </p:nvPr>
         </p:nvSpPr>
         <p:spPr/>
@@ -19539,17 +19593,140 @@
             </a:pPr>
             <a:r>
               <a:rPr/>
-              <a:t>(To be added)</a:t>
+              <a:t>Gradients</a:t>
+            </a:r>
+            <a:r>
+              <a:rPr/>
+              <a:t> </a:t>
+            </a:r>
+            <a:r>
+              <a:rPr/>
+              <a:t>in</a:t>
+            </a:r>
+            <a:r>
+              <a:rPr/>
+              <a:t> </a:t>
+            </a:r>
+            <a:r>
+              <a:rPr/>
+              <a:t>R</a:t>
             </a:r>
           </a:p>
         </p:txBody>
       </p:sp>
+      <p:pic>
+        <p:nvPicPr>
+          <p:cNvPr descr="../images/r/virdis-colors.png" id="0" name="Picture 1"/>
+          <p:cNvPicPr>
+            <a:picLocks noGrp="1" noChangeAspect="1"/>
+          </p:cNvPicPr>
+          <p:nvPr/>
+        </p:nvPicPr>
+        <p:blipFill>
+          <a:blip r:embed="rId3"/>
+          <a:stretch>
+            <a:fillRect/>
+          </a:stretch>
+        </p:blipFill>
+        <p:spPr bwMode="auto">
+          <a:xfrm>
+            <a:off x="2311400" y="1600200"/>
+            <a:ext cx="4521200" cy="4521200"/>
+          </a:xfrm>
+          <a:prstGeom prst="rect">
+            <a:avLst/>
+          </a:prstGeom>
+          <a:noFill/>
+          <a:ln w="9525">
+            <a:noFill/>
+            <a:headEnd/>
+            <a:tailEnd/>
+          </a:ln>
+        </p:spPr>
+      </p:pic>
     </p:spTree>
   </p:cSld>
 </p:sld>
 </file>
 
-<file path=ppt/slides/slide32.xml><?xml version="1.0" encoding="utf-8"?>
+<file path=ppt/slides/slide33.xml><?xml version="1.0" encoding="utf-8"?>
+<p:sld xmlns:a="http://schemas.openxmlformats.org/drawingml/2006/main" xmlns:r="http://schemas.openxmlformats.org/officeDocument/2006/relationships" xmlns:p="http://schemas.openxmlformats.org/presentationml/2006/main">
+  <p:cSld>
+    <p:spTree>
+      <p:nvGrpSpPr>
+        <p:cNvPr id="1" name=""/>
+        <p:cNvGrpSpPr/>
+        <p:nvPr/>
+      </p:nvGrpSpPr>
+      <p:grpSpPr>
+        <a:xfrm>
+          <a:off x="0" y="0"/>
+          <a:ext cx="0" cy="0"/>
+          <a:chOff x="0" y="0"/>
+          <a:chExt cx="0" cy="0"/>
+        </a:xfrm>
+      </p:grpSpPr>
+      <p:sp>
+        <p:nvSpPr>
+          <p:cNvPr id="2" name="Title 1"/>
+          <p:cNvSpPr>
+            <a:spLocks noGrp="1"/>
+          </p:cNvSpPr>
+          <p:nvPr>
+            <p:ph type="title"/>
+          </p:nvPr>
+        </p:nvSpPr>
+        <p:spPr/>
+        <p:txBody>
+          <a:bodyPr/>
+          <a:lstStyle/>
+          <a:p>
+            <a:pPr lvl="0" marL="0" indent="0">
+              <a:buNone/>
+            </a:pPr>
+            <a:r>
+              <a:rPr/>
+              <a:t>Gradients</a:t>
+            </a:r>
+          </a:p>
+        </p:txBody>
+      </p:sp>
+      <p:pic>
+        <p:nvPicPr>
+          <p:cNvPr descr="../images/r/rainbow-gradient.png" id="0" name="Picture 1"/>
+          <p:cNvPicPr>
+            <a:picLocks noGrp="1" noChangeAspect="1"/>
+          </p:cNvPicPr>
+          <p:nvPr/>
+        </p:nvPicPr>
+        <p:blipFill>
+          <a:blip r:embed="rId2"/>
+          <a:stretch>
+            <a:fillRect/>
+          </a:stretch>
+        </p:blipFill>
+        <p:spPr bwMode="auto">
+          <a:xfrm>
+            <a:off x="2311400" y="1600200"/>
+            <a:ext cx="4521200" cy="4521200"/>
+          </a:xfrm>
+          <a:prstGeom prst="rect">
+            <a:avLst/>
+          </a:prstGeom>
+          <a:noFill/>
+          <a:ln w="9525">
+            <a:noFill/>
+            <a:headEnd/>
+            <a:tailEnd/>
+          </a:ln>
+        </p:spPr>
+      </p:pic>
+    </p:spTree>
+  </p:cSld>
+</p:sld>
+</file>
+
+<file path=ppt/slides/slide34.xml><?xml version="1.0" encoding="utf-8"?>
 <p:sld xmlns:a="http://schemas.openxmlformats.org/drawingml/2006/main" xmlns:r="http://schemas.openxmlformats.org/officeDocument/2006/relationships" xmlns:p="http://schemas.openxmlformats.org/presentationml/2006/main">
   <p:cSld>
     <p:spTree>
@@ -19704,7 +19881,7 @@
 </p:sld>
 </file>
 
-<file path=ppt/slides/slide33.xml><?xml version="1.0" encoding="utf-8"?>
+<file path=ppt/slides/slide35.xml><?xml version="1.0" encoding="utf-8"?>
 <p:sld xmlns:a="http://schemas.openxmlformats.org/drawingml/2006/main" xmlns:r="http://schemas.openxmlformats.org/officeDocument/2006/relationships" xmlns:p="http://schemas.openxmlformats.org/presentationml/2006/main">
   <p:cSld>
     <p:spTree>
@@ -19883,185 +20060,6 @@
 </p:sld>
 </file>
 
-<file path=ppt/slides/slide34.xml><?xml version="1.0" encoding="utf-8"?>
-<p:sld xmlns:a="http://schemas.openxmlformats.org/drawingml/2006/main" xmlns:r="http://schemas.openxmlformats.org/officeDocument/2006/relationships" xmlns:p="http://schemas.openxmlformats.org/presentationml/2006/main">
-  <p:cSld>
-    <p:spTree>
-      <p:nvGrpSpPr>
-        <p:cNvPr id="1" name=""/>
-        <p:cNvGrpSpPr/>
-        <p:nvPr/>
-      </p:nvGrpSpPr>
-      <p:grpSpPr>
-        <a:xfrm>
-          <a:off x="0" y="0"/>
-          <a:ext cx="0" cy="0"/>
-          <a:chOff x="0" y="0"/>
-          <a:chExt cx="0" cy="0"/>
-        </a:xfrm>
-      </p:grpSpPr>
-      <p:sp>
-        <p:nvSpPr>
-          <p:cNvPr id="2" name="Title 1"/>
-          <p:cNvSpPr>
-            <a:spLocks noGrp="1"/>
-          </p:cNvSpPr>
-          <p:nvPr>
-            <p:ph type="title"/>
-          </p:nvPr>
-        </p:nvSpPr>
-        <p:spPr/>
-        <p:txBody>
-          <a:bodyPr/>
-          <a:lstStyle/>
-          <a:p>
-            <a:pPr lvl="0" marL="0" indent="0">
-              <a:buNone/>
-            </a:pPr>
-            <a:r>
-              <a:rPr/>
-              <a:t>Colors,</a:t>
-            </a:r>
-            <a:r>
-              <a:rPr/>
-              <a:t> </a:t>
-            </a:r>
-            <a:r>
-              <a:rPr/>
-              <a:t>HSV</a:t>
-            </a:r>
-            <a:r>
-              <a:rPr/>
-              <a:t> </a:t>
-            </a:r>
-            <a:r>
-              <a:rPr/>
-              <a:t>system</a:t>
-            </a:r>
-          </a:p>
-        </p:txBody>
-      </p:sp>
-      <p:sp>
-        <p:nvSpPr>
-          <p:cNvPr id="3" name="Content Placeholder 2"/>
-          <p:cNvSpPr>
-            <a:spLocks noGrp="1"/>
-          </p:cNvSpPr>
-          <p:nvPr>
-            <p:ph idx="1"/>
-          </p:nvPr>
-        </p:nvSpPr>
-        <p:spPr/>
-        <p:txBody>
-          <a:bodyPr/>
-          <a:lstStyle/>
-          <a:p>
-            <a:pPr lvl="1"/>
-            <a:r>
-              <a:rPr/>
-              <a:t>(To be added)</a:t>
-            </a:r>
-          </a:p>
-        </p:txBody>
-      </p:sp>
-    </p:spTree>
-  </p:cSld>
-</p:sld>
-</file>
-
-<file path=ppt/slides/slide35.xml><?xml version="1.0" encoding="utf-8"?>
-<p:sld xmlns:a="http://schemas.openxmlformats.org/drawingml/2006/main" xmlns:r="http://schemas.openxmlformats.org/officeDocument/2006/relationships" xmlns:p="http://schemas.openxmlformats.org/presentationml/2006/main">
-  <p:cSld>
-    <p:spTree>
-      <p:nvGrpSpPr>
-        <p:cNvPr id="1" name=""/>
-        <p:cNvGrpSpPr/>
-        <p:nvPr/>
-      </p:nvGrpSpPr>
-      <p:grpSpPr>
-        <a:xfrm>
-          <a:off x="0" y="0"/>
-          <a:ext cx="0" cy="0"/>
-          <a:chOff x="0" y="0"/>
-          <a:chExt cx="0" cy="0"/>
-        </a:xfrm>
-      </p:grpSpPr>
-      <p:sp>
-        <p:nvSpPr>
-          <p:cNvPr id="2" name="Title 1"/>
-          <p:cNvSpPr>
-            <a:spLocks noGrp="1"/>
-          </p:cNvSpPr>
-          <p:nvPr>
-            <p:ph type="title"/>
-          </p:nvPr>
-        </p:nvSpPr>
-        <p:spPr/>
-        <p:txBody>
-          <a:bodyPr/>
-          <a:lstStyle/>
-          <a:p>
-            <a:pPr lvl="0" marL="0" indent="0">
-              <a:buNone/>
-            </a:pPr>
-            <a:r>
-              <a:rPr/>
-              <a:t>Colors,</a:t>
-            </a:r>
-            <a:r>
-              <a:rPr/>
-              <a:t> </a:t>
-            </a:r>
-            <a:r>
-              <a:rPr/>
-              <a:t>HSV</a:t>
-            </a:r>
-            <a:r>
-              <a:rPr/>
-              <a:t> </a:t>
-            </a:r>
-            <a:r>
-              <a:rPr/>
-              <a:t>system</a:t>
-            </a:r>
-          </a:p>
-        </p:txBody>
-      </p:sp>
-      <p:pic>
-        <p:nvPicPr>
-          <p:cNvPr descr="../images/r/hsv-1.png" id="0" name="Picture 1"/>
-          <p:cNvPicPr>
-            <a:picLocks noGrp="1" noChangeAspect="1"/>
-          </p:cNvPicPr>
-          <p:nvPr/>
-        </p:nvPicPr>
-        <p:blipFill>
-          <a:blip r:embed="rId2"/>
-          <a:stretch>
-            <a:fillRect/>
-          </a:stretch>
-        </p:blipFill>
-        <p:spPr bwMode="auto">
-          <a:xfrm>
-            <a:off x="2311400" y="1600200"/>
-            <a:ext cx="4521200" cy="4521200"/>
-          </a:xfrm>
-          <a:prstGeom prst="rect">
-            <a:avLst/>
-          </a:prstGeom>
-          <a:noFill/>
-          <a:ln w="9525">
-            <a:noFill/>
-            <a:headEnd/>
-            <a:tailEnd/>
-          </a:ln>
-        </p:spPr>
-      </p:pic>
-    </p:spTree>
-  </p:cSld>
-</p:sld>
-</file>
-
 <file path=ppt/slides/slide36.xml><?xml version="1.0" encoding="utf-8"?>
 <p:sld xmlns:a="http://schemas.openxmlformats.org/drawingml/2006/main" xmlns:r="http://schemas.openxmlformats.org/officeDocument/2006/relationships" xmlns:p="http://schemas.openxmlformats.org/presentationml/2006/main">
   <p:cSld>
@@ -20115,57 +20113,34 @@
             </a:r>
             <a:r>
               <a:rPr/>
-              <a:t>system,</a:t>
-            </a:r>
-            <a:r>
-              <a:rPr/>
-              <a:t> </a:t>
-            </a:r>
-            <a:r>
-              <a:rPr/>
-              <a:t>hue</a:t>
-            </a:r>
-            <a:r>
-              <a:rPr/>
-              <a:t> </a:t>
-            </a:r>
-            <a:r>
-              <a:rPr/>
-              <a:t>only</a:t>
+              <a:t>system</a:t>
             </a:r>
           </a:p>
         </p:txBody>
       </p:sp>
-      <p:pic>
-        <p:nvPicPr>
-          <p:cNvPr descr="../images/r/hsv-2.png" id="0" name="Picture 1"/>
-          <p:cNvPicPr>
-            <a:picLocks noGrp="1" noChangeAspect="1"/>
-          </p:cNvPicPr>
-          <p:nvPr/>
-        </p:nvPicPr>
-        <p:blipFill>
-          <a:blip r:embed="rId2"/>
-          <a:stretch>
-            <a:fillRect/>
-          </a:stretch>
-        </p:blipFill>
-        <p:spPr bwMode="auto">
-          <a:xfrm>
-            <a:off x="2311400" y="1600200"/>
-            <a:ext cx="4521200" cy="4521200"/>
-          </a:xfrm>
-          <a:prstGeom prst="rect">
-            <a:avLst/>
-          </a:prstGeom>
-          <a:noFill/>
-          <a:ln w="9525">
-            <a:noFill/>
-            <a:headEnd/>
-            <a:tailEnd/>
-          </a:ln>
-        </p:spPr>
-      </p:pic>
+      <p:sp>
+        <p:nvSpPr>
+          <p:cNvPr id="3" name="Content Placeholder 2"/>
+          <p:cNvSpPr>
+            <a:spLocks noGrp="1"/>
+          </p:cNvSpPr>
+          <p:nvPr>
+            <p:ph idx="1"/>
+          </p:nvPr>
+        </p:nvSpPr>
+        <p:spPr/>
+        <p:txBody>
+          <a:bodyPr/>
+          <a:lstStyle/>
+          <a:p>
+            <a:pPr lvl="1"/>
+            <a:r>
+              <a:rPr/>
+              <a:t>(To be added)</a:t>
+            </a:r>
+          </a:p>
+        </p:txBody>
+      </p:sp>
     </p:spTree>
   </p:cSld>
 </p:sld>
@@ -20224,30 +20199,14 @@
             </a:r>
             <a:r>
               <a:rPr/>
-              <a:t>system,</a:t>
-            </a:r>
-            <a:r>
-              <a:rPr/>
-              <a:t> </a:t>
-            </a:r>
-            <a:r>
-              <a:rPr/>
-              <a:t>saturation</a:t>
-            </a:r>
-            <a:r>
-              <a:rPr/>
-              <a:t> </a:t>
-            </a:r>
-            <a:r>
-              <a:rPr/>
-              <a:t>only</a:t>
+              <a:t>system</a:t>
             </a:r>
           </a:p>
         </p:txBody>
       </p:sp>
       <p:pic>
         <p:nvPicPr>
-          <p:cNvPr descr="../images/r/hsv-3.png" id="0" name="Picture 1"/>
+          <p:cNvPr descr="../images/r/hsv-1.png" id="0" name="Picture 1"/>
           <p:cNvPicPr>
             <a:picLocks noGrp="1" noChangeAspect="1"/>
           </p:cNvPicPr>
@@ -20341,7 +20300,7 @@
             </a:r>
             <a:r>
               <a:rPr/>
-              <a:t>value</a:t>
+              <a:t>hue</a:t>
             </a:r>
             <a:r>
               <a:rPr/>
@@ -20356,7 +20315,7 @@
       </p:sp>
       <p:pic>
         <p:nvPicPr>
-          <p:cNvPr descr="../images/r/hsv-4.png" id="0" name="Picture 1"/>
+          <p:cNvPr descr="../images/r/hsv-2.png" id="0" name="Picture 1"/>
           <p:cNvPicPr>
             <a:picLocks noGrp="1" noChangeAspect="1"/>
           </p:cNvPicPr>
@@ -20434,112 +20393,65 @@
             </a:r>
             <a:r>
               <a:rPr/>
-              <a:t>HCL</a:t>
-            </a:r>
-            <a:r>
-              <a:rPr/>
-              <a:t> </a:t>
-            </a:r>
-            <a:r>
-              <a:rPr/>
-              <a:t>system</a:t>
+              <a:t>HSV</a:t>
+            </a:r>
+            <a:r>
+              <a:rPr/>
+              <a:t> </a:t>
+            </a:r>
+            <a:r>
+              <a:rPr/>
+              <a:t>system,</a:t>
+            </a:r>
+            <a:r>
+              <a:rPr/>
+              <a:t> </a:t>
+            </a:r>
+            <a:r>
+              <a:rPr/>
+              <a:t>saturation</a:t>
+            </a:r>
+            <a:r>
+              <a:rPr/>
+              <a:t> </a:t>
+            </a:r>
+            <a:r>
+              <a:rPr/>
+              <a:t>only</a:t>
             </a:r>
           </a:p>
         </p:txBody>
       </p:sp>
-      <p:sp>
-        <p:nvSpPr>
-          <p:cNvPr id="3" name="Content Placeholder 2"/>
-          <p:cNvSpPr>
-            <a:spLocks noGrp="1"/>
-          </p:cNvSpPr>
-          <p:nvPr>
-            <p:ph idx="1"/>
-          </p:nvPr>
-        </p:nvSpPr>
-        <p:spPr/>
-        <p:txBody>
-          <a:bodyPr/>
-          <a:lstStyle/>
-          <a:p>
-            <a:pPr lvl="1"/>
-            <a:r>
-              <a:rPr/>
-              <a:t>H = hue</a:t>
-            </a:r>
-          </a:p>
-          <a:p>
-            <a:pPr lvl="2"/>
-            <a:r>
-              <a:rPr/>
-              <a:t>arranged on a wheel 0-360 degrees</a:t>
-            </a:r>
-          </a:p>
-          <a:p>
-            <a:pPr lvl="2"/>
-            <a:r>
-              <a:rPr/>
-              <a:t>0 = red, 120 = green, 240 = blue</a:t>
-            </a:r>
-          </a:p>
-          <a:p>
-            <a:pPr lvl="2"/>
-            <a:r>
-              <a:rPr/>
-              <a:t>60 = yellow, 180 = cyan, 240 = magenta</a:t>
-            </a:r>
-          </a:p>
-          <a:p>
-            <a:pPr lvl="1"/>
-            <a:r>
-              <a:rPr/>
-              <a:t>C = chroma</a:t>
-            </a:r>
-          </a:p>
-          <a:p>
-            <a:pPr lvl="2"/>
-            <a:r>
-              <a:rPr/>
-              <a:t>colorfulness relative to a gray of equal luminence</a:t>
-            </a:r>
-          </a:p>
-          <a:p>
-            <a:pPr lvl="2"/>
-            <a:r>
-              <a:rPr/>
-              <a:t>not quite same as saturation</a:t>
-            </a:r>
-          </a:p>
-          <a:p>
-            <a:pPr lvl="1"/>
-            <a:r>
-              <a:rPr/>
-              <a:t>L = luminence</a:t>
-            </a:r>
-          </a:p>
-          <a:p>
-            <a:pPr lvl="2"/>
-            <a:r>
-              <a:rPr/>
-              <a:t>brightness, lightness</a:t>
-            </a:r>
-          </a:p>
-          <a:p>
-            <a:pPr lvl="1"/>
-            <a:r>
-              <a:rPr/>
-              <a:t>Not all combinations of HCL work</a:t>
-            </a:r>
-          </a:p>
-          <a:p>
-            <a:pPr lvl="1"/>
-            <a:r>
-              <a:rPr/>
-              <a:t>Very similar systems are CIE-LUV, CIE-LAB</a:t>
-            </a:r>
-          </a:p>
-        </p:txBody>
-      </p:sp>
+      <p:pic>
+        <p:nvPicPr>
+          <p:cNvPr descr="../images/r/hsv-3.png" id="0" name="Picture 1"/>
+          <p:cNvPicPr>
+            <a:picLocks noGrp="1" noChangeAspect="1"/>
+          </p:cNvPicPr>
+          <p:nvPr/>
+        </p:nvPicPr>
+        <p:blipFill>
+          <a:blip r:embed="rId2"/>
+          <a:stretch>
+            <a:fillRect/>
+          </a:stretch>
+        </p:blipFill>
+        <p:spPr bwMode="auto">
+          <a:xfrm>
+            <a:off x="2311400" y="1600200"/>
+            <a:ext cx="4521200" cy="4521200"/>
+          </a:xfrm>
+          <a:prstGeom prst="rect">
+            <a:avLst/>
+          </a:prstGeom>
+          <a:noFill/>
+          <a:ln w="9525">
+            <a:noFill/>
+            <a:headEnd/>
+            <a:tailEnd/>
+          </a:ln>
+        </p:spPr>
+      </p:pic>
     </p:spTree>
   </p:cSld>
 </p:sld>
@@ -20877,30 +20789,38 @@
             </a:r>
             <a:r>
               <a:rPr/>
-              <a:t>Luminance</a:t>
-            </a:r>
-            <a:r>
-              <a:rPr/>
-              <a:t> </a:t>
-            </a:r>
-            <a:r>
-              <a:rPr/>
-              <a:t>=</a:t>
-            </a:r>
-            <a:r>
-              <a:rPr/>
-              <a:t> </a:t>
-            </a:r>
-            <a:r>
-              <a:rPr/>
-              <a:t>90%</a:t>
+              <a:t>HSV</a:t>
+            </a:r>
+            <a:r>
+              <a:rPr/>
+              <a:t> </a:t>
+            </a:r>
+            <a:r>
+              <a:rPr/>
+              <a:t>system,</a:t>
+            </a:r>
+            <a:r>
+              <a:rPr/>
+              <a:t> </a:t>
+            </a:r>
+            <a:r>
+              <a:rPr/>
+              <a:t>value</a:t>
+            </a:r>
+            <a:r>
+              <a:rPr/>
+              <a:t> </a:t>
+            </a:r>
+            <a:r>
+              <a:rPr/>
+              <a:t>only</a:t>
             </a:r>
           </a:p>
         </p:txBody>
       </p:sp>
       <p:pic>
         <p:nvPicPr>
-          <p:cNvPr descr="../images/r/hcl-90.png" id="0" name="Picture 1"/>
+          <p:cNvPr descr="../images/r/hsv-4.png" id="0" name="Picture 1"/>
           <p:cNvPicPr>
             <a:picLocks noGrp="1" noChangeAspect="1"/>
           </p:cNvPicPr>
@@ -20978,41 +20898,112 @@
             </a:r>
             <a:r>
               <a:rPr/>
-              <a:t>Luminance=70%</a:t>
+              <a:t>HCL</a:t>
+            </a:r>
+            <a:r>
+              <a:rPr/>
+              <a:t> </a:t>
+            </a:r>
+            <a:r>
+              <a:rPr/>
+              <a:t>system</a:t>
             </a:r>
           </a:p>
         </p:txBody>
       </p:sp>
-      <p:pic>
-        <p:nvPicPr>
-          <p:cNvPr descr="../images/r/hcl-70.png" id="0" name="Picture 1"/>
-          <p:cNvPicPr>
-            <a:picLocks noGrp="1" noChangeAspect="1"/>
-          </p:cNvPicPr>
-          <p:nvPr/>
-        </p:nvPicPr>
-        <p:blipFill>
-          <a:blip r:embed="rId2"/>
-          <a:stretch>
-            <a:fillRect/>
-          </a:stretch>
-        </p:blipFill>
-        <p:spPr bwMode="auto">
-          <a:xfrm>
-            <a:off x="2311400" y="1600200"/>
-            <a:ext cx="4521200" cy="4521200"/>
-          </a:xfrm>
-          <a:prstGeom prst="rect">
-            <a:avLst/>
-          </a:prstGeom>
-          <a:noFill/>
-          <a:ln w="9525">
-            <a:noFill/>
-            <a:headEnd/>
-            <a:tailEnd/>
-          </a:ln>
-        </p:spPr>
-      </p:pic>
+      <p:sp>
+        <p:nvSpPr>
+          <p:cNvPr id="3" name="Content Placeholder 2"/>
+          <p:cNvSpPr>
+            <a:spLocks noGrp="1"/>
+          </p:cNvSpPr>
+          <p:nvPr>
+            <p:ph idx="1"/>
+          </p:nvPr>
+        </p:nvSpPr>
+        <p:spPr/>
+        <p:txBody>
+          <a:bodyPr/>
+          <a:lstStyle/>
+          <a:p>
+            <a:pPr lvl="1"/>
+            <a:r>
+              <a:rPr/>
+              <a:t>H = hue</a:t>
+            </a:r>
+          </a:p>
+          <a:p>
+            <a:pPr lvl="2"/>
+            <a:r>
+              <a:rPr/>
+              <a:t>arranged on a wheel 0-360 degrees</a:t>
+            </a:r>
+          </a:p>
+          <a:p>
+            <a:pPr lvl="2"/>
+            <a:r>
+              <a:rPr/>
+              <a:t>0 = red, 120 = green, 240 = blue</a:t>
+            </a:r>
+          </a:p>
+          <a:p>
+            <a:pPr lvl="2"/>
+            <a:r>
+              <a:rPr/>
+              <a:t>60 = yellow, 180 = cyan, 240 = magenta</a:t>
+            </a:r>
+          </a:p>
+          <a:p>
+            <a:pPr lvl="1"/>
+            <a:r>
+              <a:rPr/>
+              <a:t>C = chroma</a:t>
+            </a:r>
+          </a:p>
+          <a:p>
+            <a:pPr lvl="2"/>
+            <a:r>
+              <a:rPr/>
+              <a:t>colorfulness relative to a gray of equal luminence</a:t>
+            </a:r>
+          </a:p>
+          <a:p>
+            <a:pPr lvl="2"/>
+            <a:r>
+              <a:rPr/>
+              <a:t>not quite same as saturation</a:t>
+            </a:r>
+          </a:p>
+          <a:p>
+            <a:pPr lvl="1"/>
+            <a:r>
+              <a:rPr/>
+              <a:t>L = luminence</a:t>
+            </a:r>
+          </a:p>
+          <a:p>
+            <a:pPr lvl="2"/>
+            <a:r>
+              <a:rPr/>
+              <a:t>brightness, lightness</a:t>
+            </a:r>
+          </a:p>
+          <a:p>
+            <a:pPr lvl="1"/>
+            <a:r>
+              <a:rPr/>
+              <a:t>Not all combinations of HCL work</a:t>
+            </a:r>
+          </a:p>
+          <a:p>
+            <a:pPr lvl="1"/>
+            <a:r>
+              <a:rPr/>
+              <a:t>Very similar systems are CIE-LUV, CIE-LAB</a:t>
+            </a:r>
+          </a:p>
+        </p:txBody>
+      </p:sp>
     </p:spTree>
   </p:cSld>
 </p:sld>
@@ -21063,14 +21054,30 @@
             </a:r>
             <a:r>
               <a:rPr/>
-              <a:t>Luminance=50%</a:t>
+              <a:t>Luminance</a:t>
+            </a:r>
+            <a:r>
+              <a:rPr/>
+              <a:t> </a:t>
+            </a:r>
+            <a:r>
+              <a:rPr/>
+              <a:t>=</a:t>
+            </a:r>
+            <a:r>
+              <a:rPr/>
+              <a:t> </a:t>
+            </a:r>
+            <a:r>
+              <a:rPr/>
+              <a:t>90%</a:t>
             </a:r>
           </a:p>
         </p:txBody>
       </p:sp>
       <p:pic>
         <p:nvPicPr>
-          <p:cNvPr descr="../images/r/hcl-50.png" id="0" name="Picture 1"/>
+          <p:cNvPr descr="../images/r/hcl-90.png" id="0" name="Picture 1"/>
           <p:cNvPicPr>
             <a:picLocks noGrp="1" noChangeAspect="1"/>
           </p:cNvPicPr>
@@ -21148,14 +21155,14 @@
             </a:r>
             <a:r>
               <a:rPr/>
-              <a:t>Luminance=30%</a:t>
+              <a:t>Luminance=70%</a:t>
             </a:r>
           </a:p>
         </p:txBody>
       </p:sp>
       <p:pic>
         <p:nvPicPr>
-          <p:cNvPr descr="../images/r/hcl-30.png" id="0" name="Picture 1"/>
+          <p:cNvPr descr="../images/r/hcl-70.png" id="0" name="Picture 1"/>
           <p:cNvPicPr>
             <a:picLocks noGrp="1" noChangeAspect="1"/>
           </p:cNvPicPr>
@@ -21233,6 +21240,176 @@
             </a:r>
             <a:r>
               <a:rPr/>
+              <a:t>Luminance=50%</a:t>
+            </a:r>
+          </a:p>
+        </p:txBody>
+      </p:sp>
+      <p:pic>
+        <p:nvPicPr>
+          <p:cNvPr descr="../images/r/hcl-50.png" id="0" name="Picture 1"/>
+          <p:cNvPicPr>
+            <a:picLocks noGrp="1" noChangeAspect="1"/>
+          </p:cNvPicPr>
+          <p:nvPr/>
+        </p:nvPicPr>
+        <p:blipFill>
+          <a:blip r:embed="rId2"/>
+          <a:stretch>
+            <a:fillRect/>
+          </a:stretch>
+        </p:blipFill>
+        <p:spPr bwMode="auto">
+          <a:xfrm>
+            <a:off x="2311400" y="1600200"/>
+            <a:ext cx="4521200" cy="4521200"/>
+          </a:xfrm>
+          <a:prstGeom prst="rect">
+            <a:avLst/>
+          </a:prstGeom>
+          <a:noFill/>
+          <a:ln w="9525">
+            <a:noFill/>
+            <a:headEnd/>
+            <a:tailEnd/>
+          </a:ln>
+        </p:spPr>
+      </p:pic>
+    </p:spTree>
+  </p:cSld>
+</p:sld>
+</file>
+
+<file path=ppt/slides/slide45.xml><?xml version="1.0" encoding="utf-8"?>
+<p:sld xmlns:a="http://schemas.openxmlformats.org/drawingml/2006/main" xmlns:r="http://schemas.openxmlformats.org/officeDocument/2006/relationships" xmlns:p="http://schemas.openxmlformats.org/presentationml/2006/main">
+  <p:cSld>
+    <p:spTree>
+      <p:nvGrpSpPr>
+        <p:cNvPr id="1" name=""/>
+        <p:cNvGrpSpPr/>
+        <p:nvPr/>
+      </p:nvGrpSpPr>
+      <p:grpSpPr>
+        <a:xfrm>
+          <a:off x="0" y="0"/>
+          <a:ext cx="0" cy="0"/>
+          <a:chOff x="0" y="0"/>
+          <a:chExt cx="0" cy="0"/>
+        </a:xfrm>
+      </p:grpSpPr>
+      <p:sp>
+        <p:nvSpPr>
+          <p:cNvPr id="2" name="Title 1"/>
+          <p:cNvSpPr>
+            <a:spLocks noGrp="1"/>
+          </p:cNvSpPr>
+          <p:nvPr>
+            <p:ph type="title"/>
+          </p:nvPr>
+        </p:nvSpPr>
+        <p:spPr/>
+        <p:txBody>
+          <a:bodyPr/>
+          <a:lstStyle/>
+          <a:p>
+            <a:pPr lvl="0" marL="0" indent="0">
+              <a:buNone/>
+            </a:pPr>
+            <a:r>
+              <a:rPr/>
+              <a:t>Colors,</a:t>
+            </a:r>
+            <a:r>
+              <a:rPr/>
+              <a:t> </a:t>
+            </a:r>
+            <a:r>
+              <a:rPr/>
+              <a:t>Luminance=30%</a:t>
+            </a:r>
+          </a:p>
+        </p:txBody>
+      </p:sp>
+      <p:pic>
+        <p:nvPicPr>
+          <p:cNvPr descr="../images/r/hcl-30.png" id="0" name="Picture 1"/>
+          <p:cNvPicPr>
+            <a:picLocks noGrp="1" noChangeAspect="1"/>
+          </p:cNvPicPr>
+          <p:nvPr/>
+        </p:nvPicPr>
+        <p:blipFill>
+          <a:blip r:embed="rId2"/>
+          <a:stretch>
+            <a:fillRect/>
+          </a:stretch>
+        </p:blipFill>
+        <p:spPr bwMode="auto">
+          <a:xfrm>
+            <a:off x="2311400" y="1600200"/>
+            <a:ext cx="4521200" cy="4521200"/>
+          </a:xfrm>
+          <a:prstGeom prst="rect">
+            <a:avLst/>
+          </a:prstGeom>
+          <a:noFill/>
+          <a:ln w="9525">
+            <a:noFill/>
+            <a:headEnd/>
+            <a:tailEnd/>
+          </a:ln>
+        </p:spPr>
+      </p:pic>
+    </p:spTree>
+  </p:cSld>
+</p:sld>
+</file>
+
+<file path=ppt/slides/slide46.xml><?xml version="1.0" encoding="utf-8"?>
+<p:sld xmlns:a="http://schemas.openxmlformats.org/drawingml/2006/main" xmlns:r="http://schemas.openxmlformats.org/officeDocument/2006/relationships" xmlns:p="http://schemas.openxmlformats.org/presentationml/2006/main">
+  <p:cSld>
+    <p:spTree>
+      <p:nvGrpSpPr>
+        <p:cNvPr id="1" name=""/>
+        <p:cNvGrpSpPr/>
+        <p:nvPr/>
+      </p:nvGrpSpPr>
+      <p:grpSpPr>
+        <a:xfrm>
+          <a:off x="0" y="0"/>
+          <a:ext cx="0" cy="0"/>
+          <a:chOff x="0" y="0"/>
+          <a:chExt cx="0" cy="0"/>
+        </a:xfrm>
+      </p:grpSpPr>
+      <p:sp>
+        <p:nvSpPr>
+          <p:cNvPr id="2" name="Title 1"/>
+          <p:cNvSpPr>
+            <a:spLocks noGrp="1"/>
+          </p:cNvSpPr>
+          <p:nvPr>
+            <p:ph type="title"/>
+          </p:nvPr>
+        </p:nvSpPr>
+        <p:spPr/>
+        <p:txBody>
+          <a:bodyPr/>
+          <a:lstStyle/>
+          <a:p>
+            <a:pPr lvl="0" marL="0" indent="0">
+              <a:buNone/>
+            </a:pPr>
+            <a:r>
+              <a:rPr/>
+              <a:t>Colors,</a:t>
+            </a:r>
+            <a:r>
+              <a:rPr/>
+              <a:t> </a:t>
+            </a:r>
+            <a:r>
+              <a:rPr/>
               <a:t>CMYK</a:t>
             </a:r>
             <a:r>
@@ -21343,7 +21520,7 @@
 </p:sld>
 </file>
 
-<file path=ppt/slides/slide45.xml><?xml version="1.0" encoding="utf-8"?>
+<file path=ppt/slides/slide47.xml><?xml version="1.0" encoding="utf-8"?>
 <p:sld xmlns:a="http://schemas.openxmlformats.org/drawingml/2006/main" xmlns:r="http://schemas.openxmlformats.org/officeDocument/2006/relationships" xmlns:p="http://schemas.openxmlformats.org/presentationml/2006/main">
   <p:cSld>
     <p:spTree>
@@ -21465,7 +21642,7 @@
 </p:sld>
 </file>
 
-<file path=ppt/slides/slide46.xml><?xml version="1.0" encoding="utf-8"?>
+<file path=ppt/slides/slide48.xml><?xml version="1.0" encoding="utf-8"?>
 <p:sld xmlns:a="http://schemas.openxmlformats.org/drawingml/2006/main" xmlns:r="http://schemas.openxmlformats.org/officeDocument/2006/relationships" xmlns:p="http://schemas.openxmlformats.org/presentationml/2006/main">
   <p:cSld>
     <p:spTree>
@@ -21597,7 +21774,7 @@
 </p:sld>
 </file>
 
-<file path=ppt/slides/slide47.xml><?xml version="1.0" encoding="utf-8"?>
+<file path=ppt/slides/slide49.xml><?xml version="1.0" encoding="utf-8"?>
 <p:sld xmlns:a="http://schemas.openxmlformats.org/drawingml/2006/main" xmlns:r="http://schemas.openxmlformats.org/officeDocument/2006/relationships" xmlns:p="http://schemas.openxmlformats.org/presentationml/2006/main">
   <p:cSld>
     <p:spTree>

</xml_diff>

<commit_message>
Revised R code in colors tutorial
</commit_message>
<xml_diff>
--- a/data-viz-02/component/tutorial-colors.pptx
+++ b/data-viz-02/component/tutorial-colors.pptx
@@ -5,7 +5,7 @@
     <p:sldMasterId id="2147483648" r:id="rId1"/>
   </p:sldMasterIdLst>
   <p:notesMasterIdLst>
-    <p:NotesMasterId r:id="rId49"/>
+    <p:NotesMasterId r:id="rId50"/>
   </p:notesMasterIdLst>
   <p:sldIdLst>
     <p:sldId id="256" r:id="rId2"/>
@@ -55,6 +55,7 @@
     <p:sldId id="300" r:id="rId46"/>
     <p:sldId id="301" r:id="rId47"/>
     <p:sldId id="302" r:id="rId48"/>
+    <p:sldId id="303" r:id="rId49"/>
   </p:sldIdLst>
   <p:sldSz cx="9144000" cy="6858000" type="screen4x3"/>
   <p:notesSz cx="6858000" cy="9144000"/>
@@ -6571,7 +6572,7 @@
           <a:p>
             <a:fld id="{18BDFEC3-8487-43E8-A154-7C12CBC1FFF2}" type="slidenum">
               <a:rPr lang="en-US"/>
-              <a:t>32</a:t>
+              <a:t>33</a:t>
             </a:fld>
             <a:endParaRPr lang="en-US"/>
           </a:p>
@@ -6653,7 +6654,7 @@
           <a:p>
             <a:fld id="{18BDFEC3-8487-43E8-A154-7C12CBC1FFF2}" type="slidenum">
               <a:rPr lang="en-US"/>
-              <a:t>33</a:t>
+              <a:t>34</a:t>
             </a:fld>
             <a:endParaRPr lang="en-US"/>
           </a:p>
@@ -7207,7 +7208,7 @@
           <a:p>
             <a:fld id="{18BDFEC3-8487-43E8-A154-7C12CBC1FFF2}" type="slidenum">
               <a:rPr lang="en-US"/>
-              <a:t>34</a:t>
+              <a:t>35</a:t>
             </a:fld>
             <a:endParaRPr lang="en-US"/>
           </a:p>
@@ -8745,7 +8746,7 @@
           <a:p>
             <a:fld id="{18BDFEC3-8487-43E8-A154-7C12CBC1FFF2}" type="slidenum">
               <a:rPr lang="en-US"/>
-              <a:t>39</a:t>
+              <a:t>40</a:t>
             </a:fld>
             <a:endParaRPr lang="en-US"/>
           </a:p>
@@ -8987,7 +8988,7 @@
           <a:p>
             <a:fld id="{18BDFEC3-8487-43E8-A154-7C12CBC1FFF2}" type="slidenum">
               <a:rPr lang="en-US"/>
-              <a:t>40</a:t>
+              <a:t>41</a:t>
             </a:fld>
             <a:endParaRPr lang="en-US"/>
           </a:p>
@@ -9581,7 +9582,7 @@
           <a:p>
             <a:fld id="{18BDFEC3-8487-43E8-A154-7C12CBC1FFF2}" type="slidenum">
               <a:rPr lang="en-US"/>
-              <a:t>44</a:t>
+              <a:t>45</a:t>
             </a:fld>
             <a:endParaRPr lang="en-US"/>
           </a:p>
@@ -10773,7 +10774,7 @@
           <a:p>
             <a:fld id="{18BDFEC3-8487-43E8-A154-7C12CBC1FFF2}" type="slidenum">
               <a:rPr lang="en-US"/>
-              <a:t>47</a:t>
+              <a:t>48</a:t>
             </a:fld>
             <a:endParaRPr lang="en-US"/>
           </a:p>
@@ -21811,6 +21812,58 @@
           <a:chExt cx="0" cy="0"/>
         </a:xfrm>
       </p:grpSpPr>
+      <p:pic>
+        <p:nvPicPr>
+          <p:cNvPr descr="../images/r/change-gradient.png" id="0" name="Picture 1"/>
+          <p:cNvPicPr>
+            <a:picLocks noGrp="1" noChangeAspect="1"/>
+          </p:cNvPicPr>
+          <p:nvPr/>
+        </p:nvPicPr>
+        <p:blipFill>
+          <a:blip r:embed="rId2"/>
+          <a:stretch>
+            <a:fillRect/>
+          </a:stretch>
+        </p:blipFill>
+        <p:spPr bwMode="auto">
+          <a:xfrm>
+            <a:off x="2311400" y="1600200"/>
+            <a:ext cx="4521200" cy="4521200"/>
+          </a:xfrm>
+          <a:prstGeom prst="rect">
+            <a:avLst/>
+          </a:prstGeom>
+          <a:noFill/>
+          <a:ln w="9525">
+            <a:noFill/>
+            <a:headEnd/>
+            <a:tailEnd/>
+          </a:ln>
+        </p:spPr>
+      </p:pic>
+    </p:spTree>
+  </p:cSld>
+</p:sld>
+</file>
+
+<file path=ppt/slides/slide33.xml><?xml version="1.0" encoding="utf-8"?>
+<p:sld xmlns:a="http://schemas.openxmlformats.org/drawingml/2006/main" xmlns:r="http://schemas.openxmlformats.org/officeDocument/2006/relationships" xmlns:p="http://schemas.openxmlformats.org/presentationml/2006/main">
+  <p:cSld>
+    <p:spTree>
+      <p:nvGrpSpPr>
+        <p:cNvPr id="1" name=""/>
+        <p:cNvGrpSpPr/>
+        <p:nvPr/>
+      </p:nvGrpSpPr>
+      <p:grpSpPr>
+        <a:xfrm>
+          <a:off x="0" y="0"/>
+          <a:ext cx="0" cy="0"/>
+          <a:chOff x="0" y="0"/>
+          <a:chExt cx="0" cy="0"/>
+        </a:xfrm>
+      </p:grpSpPr>
       <p:sp>
         <p:nvSpPr>
           <p:cNvPr id="2" name="Title 1"/>
@@ -21949,7 +22002,7 @@
 </p:sld>
 </file>
 
-<file path=ppt/slides/slide33.xml><?xml version="1.0" encoding="utf-8"?>
+<file path=ppt/slides/slide34.xml><?xml version="1.0" encoding="utf-8"?>
 <p:sld xmlns:a="http://schemas.openxmlformats.org/drawingml/2006/main" xmlns:r="http://schemas.openxmlformats.org/officeDocument/2006/relationships" xmlns:p="http://schemas.openxmlformats.org/presentationml/2006/main">
   <p:cSld>
     <p:spTree>
@@ -22128,155 +22181,6 @@
 </p:sld>
 </file>
 
-<file path=ppt/slides/slide34.xml><?xml version="1.0" encoding="utf-8"?>
-<p:sld xmlns:a="http://schemas.openxmlformats.org/drawingml/2006/main" xmlns:r="http://schemas.openxmlformats.org/officeDocument/2006/relationships" xmlns:p="http://schemas.openxmlformats.org/presentationml/2006/main">
-  <p:cSld>
-    <p:spTree>
-      <p:nvGrpSpPr>
-        <p:cNvPr id="1" name=""/>
-        <p:cNvGrpSpPr/>
-        <p:nvPr/>
-      </p:nvGrpSpPr>
-      <p:grpSpPr>
-        <a:xfrm>
-          <a:off x="0" y="0"/>
-          <a:ext cx="0" cy="0"/>
-          <a:chOff x="0" y="0"/>
-          <a:chExt cx="0" cy="0"/>
-        </a:xfrm>
-      </p:grpSpPr>
-      <p:sp>
-        <p:nvSpPr>
-          <p:cNvPr id="2" name="Title 1"/>
-          <p:cNvSpPr>
-            <a:spLocks noGrp="1"/>
-          </p:cNvSpPr>
-          <p:nvPr>
-            <p:ph type="title"/>
-          </p:nvPr>
-        </p:nvSpPr>
-        <p:spPr/>
-        <p:txBody>
-          <a:bodyPr/>
-          <a:lstStyle/>
-          <a:p>
-            <a:pPr lvl="0" marL="0" indent="0">
-              <a:buNone/>
-            </a:pPr>
-            <a:r>
-              <a:rPr/>
-              <a:t>Colors,</a:t>
-            </a:r>
-            <a:r>
-              <a:rPr/>
-              <a:t> </a:t>
-            </a:r>
-            <a:r>
-              <a:rPr/>
-              <a:t>HSV</a:t>
-            </a:r>
-            <a:r>
-              <a:rPr/>
-              <a:t> </a:t>
-            </a:r>
-            <a:r>
-              <a:rPr/>
-              <a:t>system</a:t>
-            </a:r>
-          </a:p>
-        </p:txBody>
-      </p:sp>
-      <p:sp>
-        <p:nvSpPr>
-          <p:cNvPr id="3" name="Content Placeholder 2"/>
-          <p:cNvSpPr>
-            <a:spLocks noGrp="1"/>
-          </p:cNvSpPr>
-          <p:nvPr>
-            <p:ph idx="1"/>
-          </p:nvPr>
-        </p:nvSpPr>
-        <p:spPr/>
-        <p:txBody>
-          <a:bodyPr/>
-          <a:lstStyle/>
-          <a:p>
-            <a:pPr lvl="1"/>
-            <a:r>
-              <a:rPr/>
-              <a:t>H = Hue</a:t>
-            </a:r>
-          </a:p>
-          <a:p>
-            <a:pPr lvl="2"/>
-            <a:r>
-              <a:rPr/>
-              <a:t>Color wheel</a:t>
-            </a:r>
-          </a:p>
-          <a:p>
-            <a:pPr lvl="2"/>
-            <a:r>
-              <a:rPr/>
-              <a:t>Red, yellow, green, cyan, blue, and magenta</a:t>
-            </a:r>
-          </a:p>
-          <a:p>
-            <a:pPr lvl="1"/>
-            <a:r>
-              <a:rPr/>
-              <a:t>Saturation</a:t>
-            </a:r>
-          </a:p>
-          <a:p>
-            <a:pPr lvl="2"/>
-            <a:r>
-              <a:rPr/>
-              <a:t>How colorful</a:t>
-            </a:r>
-          </a:p>
-          <a:p>
-            <a:pPr lvl="2"/>
-            <a:r>
-              <a:rPr/>
-              <a:t>Low saturation produces white or various shades of gray</a:t>
-            </a:r>
-          </a:p>
-          <a:p>
-            <a:pPr lvl="1"/>
-            <a:r>
-              <a:rPr/>
-              <a:t>Value</a:t>
-            </a:r>
-          </a:p>
-          <a:p>
-            <a:pPr lvl="2"/>
-            <a:r>
-              <a:rPr/>
-              <a:t>How dark</a:t>
-            </a:r>
-          </a:p>
-          <a:p>
-            <a:pPr lvl="2"/>
-            <a:r>
-              <a:rPr/>
-              <a:t>Low values produce dark color</a:t>
-            </a:r>
-          </a:p>
-          <a:p>
-            <a:pPr lvl="2"/>
-            <a:r>
-              <a:rPr/>
-              <a:t>0 produces black</a:t>
-            </a:r>
-          </a:p>
-        </p:txBody>
-      </p:sp>
-    </p:spTree>
-  </p:cSld>
-</p:sld>
-</file>
-
 <file path=ppt/slides/slide35.xml><?xml version="1.0" encoding="utf-8"?>
 <p:sld xmlns:a="http://schemas.openxmlformats.org/drawingml/2006/main" xmlns:r="http://schemas.openxmlformats.org/officeDocument/2006/relationships" xmlns:p="http://schemas.openxmlformats.org/presentationml/2006/main">
   <p:cSld>
@@ -22335,36 +22239,92 @@
           </a:p>
         </p:txBody>
       </p:sp>
-      <p:pic>
-        <p:nvPicPr>
-          <p:cNvPr descr="../images/r/hsv-1.png" id="0" name="Picture 1"/>
-          <p:cNvPicPr>
-            <a:picLocks noGrp="1" noChangeAspect="1"/>
-          </p:cNvPicPr>
-          <p:nvPr/>
-        </p:nvPicPr>
-        <p:blipFill>
-          <a:blip r:embed="rId2"/>
-          <a:stretch>
-            <a:fillRect/>
-          </a:stretch>
-        </p:blipFill>
-        <p:spPr bwMode="auto">
-          <a:xfrm>
-            <a:off x="2311400" y="1600200"/>
-            <a:ext cx="4521200" cy="4521200"/>
-          </a:xfrm>
-          <a:prstGeom prst="rect">
-            <a:avLst/>
-          </a:prstGeom>
-          <a:noFill/>
-          <a:ln w="9525">
-            <a:noFill/>
-            <a:headEnd/>
-            <a:tailEnd/>
-          </a:ln>
-        </p:spPr>
-      </p:pic>
+      <p:sp>
+        <p:nvSpPr>
+          <p:cNvPr id="3" name="Content Placeholder 2"/>
+          <p:cNvSpPr>
+            <a:spLocks noGrp="1"/>
+          </p:cNvSpPr>
+          <p:nvPr>
+            <p:ph idx="1"/>
+          </p:nvPr>
+        </p:nvSpPr>
+        <p:spPr/>
+        <p:txBody>
+          <a:bodyPr/>
+          <a:lstStyle/>
+          <a:p>
+            <a:pPr lvl="1"/>
+            <a:r>
+              <a:rPr/>
+              <a:t>H = Hue</a:t>
+            </a:r>
+          </a:p>
+          <a:p>
+            <a:pPr lvl="2"/>
+            <a:r>
+              <a:rPr/>
+              <a:t>Color wheel</a:t>
+            </a:r>
+          </a:p>
+          <a:p>
+            <a:pPr lvl="2"/>
+            <a:r>
+              <a:rPr/>
+              <a:t>Red, yellow, green, cyan, blue, and magenta</a:t>
+            </a:r>
+          </a:p>
+          <a:p>
+            <a:pPr lvl="1"/>
+            <a:r>
+              <a:rPr/>
+              <a:t>Saturation</a:t>
+            </a:r>
+          </a:p>
+          <a:p>
+            <a:pPr lvl="2"/>
+            <a:r>
+              <a:rPr/>
+              <a:t>How colorful</a:t>
+            </a:r>
+          </a:p>
+          <a:p>
+            <a:pPr lvl="2"/>
+            <a:r>
+              <a:rPr/>
+              <a:t>Low saturation produces white or various shades of gray</a:t>
+            </a:r>
+          </a:p>
+          <a:p>
+            <a:pPr lvl="1"/>
+            <a:r>
+              <a:rPr/>
+              <a:t>Value</a:t>
+            </a:r>
+          </a:p>
+          <a:p>
+            <a:pPr lvl="2"/>
+            <a:r>
+              <a:rPr/>
+              <a:t>How dark</a:t>
+            </a:r>
+          </a:p>
+          <a:p>
+            <a:pPr lvl="2"/>
+            <a:r>
+              <a:rPr/>
+              <a:t>Low values produce dark color</a:t>
+            </a:r>
+          </a:p>
+          <a:p>
+            <a:pPr lvl="2"/>
+            <a:r>
+              <a:rPr/>
+              <a:t>0 produces black</a:t>
+            </a:r>
+          </a:p>
+        </p:txBody>
+      </p:sp>
     </p:spTree>
   </p:cSld>
 </p:sld>
@@ -22423,30 +22383,14 @@
             </a:r>
             <a:r>
               <a:rPr/>
-              <a:t>system,</a:t>
-            </a:r>
-            <a:r>
-              <a:rPr/>
-              <a:t> </a:t>
-            </a:r>
-            <a:r>
-              <a:rPr/>
-              <a:t>hue</a:t>
-            </a:r>
-            <a:r>
-              <a:rPr/>
-              <a:t> </a:t>
-            </a:r>
-            <a:r>
-              <a:rPr/>
-              <a:t>only</a:t>
+              <a:t>system</a:t>
             </a:r>
           </a:p>
         </p:txBody>
       </p:sp>
       <p:pic>
         <p:nvPicPr>
-          <p:cNvPr descr="../images/r/hsv-2.png" id="0" name="Picture 1"/>
+          <p:cNvPr descr="../images/r/hsv-1.png" id="0" name="Picture 1"/>
           <p:cNvPicPr>
             <a:picLocks noGrp="1" noChangeAspect="1"/>
           </p:cNvPicPr>
@@ -22540,7 +22484,7 @@
             </a:r>
             <a:r>
               <a:rPr/>
-              <a:t>saturation</a:t>
+              <a:t>hue</a:t>
             </a:r>
             <a:r>
               <a:rPr/>
@@ -22555,7 +22499,7 @@
       </p:sp>
       <p:pic>
         <p:nvPicPr>
-          <p:cNvPr descr="../images/r/hsv-3.png" id="0" name="Picture 1"/>
+          <p:cNvPr descr="../images/r/hsv-2.png" id="0" name="Picture 1"/>
           <p:cNvPicPr>
             <a:picLocks noGrp="1" noChangeAspect="1"/>
           </p:cNvPicPr>
@@ -22649,7 +22593,7 @@
             </a:r>
             <a:r>
               <a:rPr/>
-              <a:t>value</a:t>
+              <a:t>saturation</a:t>
             </a:r>
             <a:r>
               <a:rPr/>
@@ -22664,7 +22608,7 @@
       </p:sp>
       <p:pic>
         <p:nvPicPr>
-          <p:cNvPr descr="../images/r/hsv-4.png" id="0" name="Picture 1"/>
+          <p:cNvPr descr="../images/r/hsv-3.png" id="0" name="Picture 1"/>
           <p:cNvPicPr>
             <a:picLocks noGrp="1" noChangeAspect="1"/>
           </p:cNvPicPr>
@@ -22742,112 +22686,65 @@
             </a:r>
             <a:r>
               <a:rPr/>
-              <a:t>HCL</a:t>
-            </a:r>
-            <a:r>
-              <a:rPr/>
-              <a:t> </a:t>
-            </a:r>
-            <a:r>
-              <a:rPr/>
-              <a:t>system</a:t>
+              <a:t>HSV</a:t>
+            </a:r>
+            <a:r>
+              <a:rPr/>
+              <a:t> </a:t>
+            </a:r>
+            <a:r>
+              <a:rPr/>
+              <a:t>system,</a:t>
+            </a:r>
+            <a:r>
+              <a:rPr/>
+              <a:t> </a:t>
+            </a:r>
+            <a:r>
+              <a:rPr/>
+              <a:t>value</a:t>
+            </a:r>
+            <a:r>
+              <a:rPr/>
+              <a:t> </a:t>
+            </a:r>
+            <a:r>
+              <a:rPr/>
+              <a:t>only</a:t>
             </a:r>
           </a:p>
         </p:txBody>
       </p:sp>
-      <p:sp>
-        <p:nvSpPr>
-          <p:cNvPr id="3" name="Content Placeholder 2"/>
-          <p:cNvSpPr>
-            <a:spLocks noGrp="1"/>
-          </p:cNvSpPr>
-          <p:nvPr>
-            <p:ph idx="1"/>
-          </p:nvPr>
-        </p:nvSpPr>
-        <p:spPr/>
-        <p:txBody>
-          <a:bodyPr/>
-          <a:lstStyle/>
-          <a:p>
-            <a:pPr lvl="1"/>
-            <a:r>
-              <a:rPr/>
-              <a:t>H = hue</a:t>
-            </a:r>
-          </a:p>
-          <a:p>
-            <a:pPr lvl="2"/>
-            <a:r>
-              <a:rPr/>
-              <a:t>arranged on a wheel 0-360 degrees</a:t>
-            </a:r>
-          </a:p>
-          <a:p>
-            <a:pPr lvl="2"/>
-            <a:r>
-              <a:rPr/>
-              <a:t>0 = red, 120 = green, 240 = blue</a:t>
-            </a:r>
-          </a:p>
-          <a:p>
-            <a:pPr lvl="2"/>
-            <a:r>
-              <a:rPr/>
-              <a:t>60 = yellow, 180 = cyan, 240 = magenta</a:t>
-            </a:r>
-          </a:p>
-          <a:p>
-            <a:pPr lvl="1"/>
-            <a:r>
-              <a:rPr/>
-              <a:t>C = chroma</a:t>
-            </a:r>
-          </a:p>
-          <a:p>
-            <a:pPr lvl="2"/>
-            <a:r>
-              <a:rPr/>
-              <a:t>colorfulness relative to a gray of equal luminence</a:t>
-            </a:r>
-          </a:p>
-          <a:p>
-            <a:pPr lvl="2"/>
-            <a:r>
-              <a:rPr/>
-              <a:t>not quite same as saturation</a:t>
-            </a:r>
-          </a:p>
-          <a:p>
-            <a:pPr lvl="1"/>
-            <a:r>
-              <a:rPr/>
-              <a:t>L = luminence</a:t>
-            </a:r>
-          </a:p>
-          <a:p>
-            <a:pPr lvl="2"/>
-            <a:r>
-              <a:rPr/>
-              <a:t>brightness, lightness</a:t>
-            </a:r>
-          </a:p>
-          <a:p>
-            <a:pPr lvl="1"/>
-            <a:r>
-              <a:rPr/>
-              <a:t>Not all combinations of HCL work</a:t>
-            </a:r>
-          </a:p>
-          <a:p>
-            <a:pPr lvl="1"/>
-            <a:r>
-              <a:rPr/>
-              <a:t>Very similar systems are CIE-LUV, CIE-LAB</a:t>
-            </a:r>
-          </a:p>
-        </p:txBody>
-      </p:sp>
+      <p:pic>
+        <p:nvPicPr>
+          <p:cNvPr descr="../images/r/hsv-4.png" id="0" name="Picture 1"/>
+          <p:cNvPicPr>
+            <a:picLocks noGrp="1" noChangeAspect="1"/>
+          </p:cNvPicPr>
+          <p:nvPr/>
+        </p:nvPicPr>
+        <p:blipFill>
+          <a:blip r:embed="rId2"/>
+          <a:stretch>
+            <a:fillRect/>
+          </a:stretch>
+        </p:blipFill>
+        <p:spPr bwMode="auto">
+          <a:xfrm>
+            <a:off x="2311400" y="1600200"/>
+            <a:ext cx="4521200" cy="4521200"/>
+          </a:xfrm>
+          <a:prstGeom prst="rect">
+            <a:avLst/>
+          </a:prstGeom>
+          <a:noFill/>
+          <a:ln w="9525">
+            <a:noFill/>
+            <a:headEnd/>
+            <a:tailEnd/>
+          </a:ln>
+        </p:spPr>
+      </p:pic>
     </p:spTree>
   </p:cSld>
 </p:sld>
@@ -23185,57 +23082,112 @@
             </a:r>
             <a:r>
               <a:rPr/>
-              <a:t>Luminance</a:t>
-            </a:r>
-            <a:r>
-              <a:rPr/>
-              <a:t> </a:t>
-            </a:r>
-            <a:r>
-              <a:rPr/>
-              <a:t>=</a:t>
-            </a:r>
-            <a:r>
-              <a:rPr/>
-              <a:t> </a:t>
-            </a:r>
-            <a:r>
-              <a:rPr/>
-              <a:t>90%</a:t>
+              <a:t>HCL</a:t>
+            </a:r>
+            <a:r>
+              <a:rPr/>
+              <a:t> </a:t>
+            </a:r>
+            <a:r>
+              <a:rPr/>
+              <a:t>system</a:t>
             </a:r>
           </a:p>
         </p:txBody>
       </p:sp>
-      <p:pic>
-        <p:nvPicPr>
-          <p:cNvPr descr="../images/r/hcl-90.png" id="0" name="Picture 1"/>
-          <p:cNvPicPr>
-            <a:picLocks noGrp="1" noChangeAspect="1"/>
-          </p:cNvPicPr>
-          <p:nvPr/>
-        </p:nvPicPr>
-        <p:blipFill>
-          <a:blip r:embed="rId3"/>
-          <a:stretch>
-            <a:fillRect/>
-          </a:stretch>
-        </p:blipFill>
-        <p:spPr bwMode="auto">
-          <a:xfrm>
-            <a:off x="2311400" y="1600200"/>
-            <a:ext cx="4521200" cy="4521200"/>
-          </a:xfrm>
-          <a:prstGeom prst="rect">
-            <a:avLst/>
-          </a:prstGeom>
-          <a:noFill/>
-          <a:ln w="9525">
-            <a:noFill/>
-            <a:headEnd/>
-            <a:tailEnd/>
-          </a:ln>
-        </p:spPr>
-      </p:pic>
+      <p:sp>
+        <p:nvSpPr>
+          <p:cNvPr id="3" name="Content Placeholder 2"/>
+          <p:cNvSpPr>
+            <a:spLocks noGrp="1"/>
+          </p:cNvSpPr>
+          <p:nvPr>
+            <p:ph idx="1"/>
+          </p:nvPr>
+        </p:nvSpPr>
+        <p:spPr/>
+        <p:txBody>
+          <a:bodyPr/>
+          <a:lstStyle/>
+          <a:p>
+            <a:pPr lvl="1"/>
+            <a:r>
+              <a:rPr/>
+              <a:t>H = hue</a:t>
+            </a:r>
+          </a:p>
+          <a:p>
+            <a:pPr lvl="2"/>
+            <a:r>
+              <a:rPr/>
+              <a:t>arranged on a wheel 0-360 degrees</a:t>
+            </a:r>
+          </a:p>
+          <a:p>
+            <a:pPr lvl="2"/>
+            <a:r>
+              <a:rPr/>
+              <a:t>0 = red, 120 = green, 240 = blue</a:t>
+            </a:r>
+          </a:p>
+          <a:p>
+            <a:pPr lvl="2"/>
+            <a:r>
+              <a:rPr/>
+              <a:t>60 = yellow, 180 = cyan, 240 = magenta</a:t>
+            </a:r>
+          </a:p>
+          <a:p>
+            <a:pPr lvl="1"/>
+            <a:r>
+              <a:rPr/>
+              <a:t>C = chroma</a:t>
+            </a:r>
+          </a:p>
+          <a:p>
+            <a:pPr lvl="2"/>
+            <a:r>
+              <a:rPr/>
+              <a:t>colorfulness relative to a gray of equal luminence</a:t>
+            </a:r>
+          </a:p>
+          <a:p>
+            <a:pPr lvl="2"/>
+            <a:r>
+              <a:rPr/>
+              <a:t>not quite same as saturation</a:t>
+            </a:r>
+          </a:p>
+          <a:p>
+            <a:pPr lvl="1"/>
+            <a:r>
+              <a:rPr/>
+              <a:t>L = luminence</a:t>
+            </a:r>
+          </a:p>
+          <a:p>
+            <a:pPr lvl="2"/>
+            <a:r>
+              <a:rPr/>
+              <a:t>brightness, lightness</a:t>
+            </a:r>
+          </a:p>
+          <a:p>
+            <a:pPr lvl="1"/>
+            <a:r>
+              <a:rPr/>
+              <a:t>Not all combinations of HCL work</a:t>
+            </a:r>
+          </a:p>
+          <a:p>
+            <a:pPr lvl="1"/>
+            <a:r>
+              <a:rPr/>
+              <a:t>Very similar systems are CIE-LUV, CIE-LAB</a:t>
+            </a:r>
+          </a:p>
+        </p:txBody>
+      </p:sp>
     </p:spTree>
   </p:cSld>
 </p:sld>
@@ -23286,21 +23238,37 @@
             </a:r>
             <a:r>
               <a:rPr/>
-              <a:t>Luminance=70%</a:t>
+              <a:t>Luminance</a:t>
+            </a:r>
+            <a:r>
+              <a:rPr/>
+              <a:t> </a:t>
+            </a:r>
+            <a:r>
+              <a:rPr/>
+              <a:t>=</a:t>
+            </a:r>
+            <a:r>
+              <a:rPr/>
+              <a:t> </a:t>
+            </a:r>
+            <a:r>
+              <a:rPr/>
+              <a:t>90%</a:t>
             </a:r>
           </a:p>
         </p:txBody>
       </p:sp>
       <p:pic>
         <p:nvPicPr>
-          <p:cNvPr descr="../images/r/hcl-70.png" id="0" name="Picture 1"/>
+          <p:cNvPr descr="../images/r/hcl-90.png" id="0" name="Picture 1"/>
           <p:cNvPicPr>
             <a:picLocks noGrp="1" noChangeAspect="1"/>
           </p:cNvPicPr>
           <p:nvPr/>
         </p:nvPicPr>
         <p:blipFill>
-          <a:blip r:embed="rId2"/>
+          <a:blip r:embed="rId3"/>
           <a:stretch>
             <a:fillRect/>
           </a:stretch>
@@ -23371,14 +23339,14 @@
             </a:r>
             <a:r>
               <a:rPr/>
-              <a:t>Luminance=50%</a:t>
+              <a:t>Luminance=70%</a:t>
             </a:r>
           </a:p>
         </p:txBody>
       </p:sp>
       <p:pic>
         <p:nvPicPr>
-          <p:cNvPr descr="../images/r/hcl-50.png" id="0" name="Picture 1"/>
+          <p:cNvPr descr="../images/r/hcl-70.png" id="0" name="Picture 1"/>
           <p:cNvPicPr>
             <a:picLocks noGrp="1" noChangeAspect="1"/>
           </p:cNvPicPr>
@@ -23456,14 +23424,14 @@
             </a:r>
             <a:r>
               <a:rPr/>
-              <a:t>Luminance=30%</a:t>
+              <a:t>Luminance=50%</a:t>
             </a:r>
           </a:p>
         </p:txBody>
       </p:sp>
       <p:pic>
         <p:nvPicPr>
-          <p:cNvPr descr="../images/r/hcl-30.png" id="0" name="Picture 1"/>
+          <p:cNvPr descr="../images/r/hcl-50.png" id="0" name="Picture 1"/>
           <p:cNvPicPr>
             <a:picLocks noGrp="1" noChangeAspect="1"/>
           </p:cNvPicPr>
@@ -23541,6 +23509,91 @@
             </a:r>
             <a:r>
               <a:rPr/>
+              <a:t>Luminance=30%</a:t>
+            </a:r>
+          </a:p>
+        </p:txBody>
+      </p:sp>
+      <p:pic>
+        <p:nvPicPr>
+          <p:cNvPr descr="../images/r/hcl-30.png" id="0" name="Picture 1"/>
+          <p:cNvPicPr>
+            <a:picLocks noGrp="1" noChangeAspect="1"/>
+          </p:cNvPicPr>
+          <p:nvPr/>
+        </p:nvPicPr>
+        <p:blipFill>
+          <a:blip r:embed="rId2"/>
+          <a:stretch>
+            <a:fillRect/>
+          </a:stretch>
+        </p:blipFill>
+        <p:spPr bwMode="auto">
+          <a:xfrm>
+            <a:off x="2311400" y="1600200"/>
+            <a:ext cx="4521200" cy="4521200"/>
+          </a:xfrm>
+          <a:prstGeom prst="rect">
+            <a:avLst/>
+          </a:prstGeom>
+          <a:noFill/>
+          <a:ln w="9525">
+            <a:noFill/>
+            <a:headEnd/>
+            <a:tailEnd/>
+          </a:ln>
+        </p:spPr>
+      </p:pic>
+    </p:spTree>
+  </p:cSld>
+</p:sld>
+</file>
+
+<file path=ppt/slides/slide45.xml><?xml version="1.0" encoding="utf-8"?>
+<p:sld xmlns:a="http://schemas.openxmlformats.org/drawingml/2006/main" xmlns:r="http://schemas.openxmlformats.org/officeDocument/2006/relationships" xmlns:p="http://schemas.openxmlformats.org/presentationml/2006/main">
+  <p:cSld>
+    <p:spTree>
+      <p:nvGrpSpPr>
+        <p:cNvPr id="1" name=""/>
+        <p:cNvGrpSpPr/>
+        <p:nvPr/>
+      </p:nvGrpSpPr>
+      <p:grpSpPr>
+        <a:xfrm>
+          <a:off x="0" y="0"/>
+          <a:ext cx="0" cy="0"/>
+          <a:chOff x="0" y="0"/>
+          <a:chExt cx="0" cy="0"/>
+        </a:xfrm>
+      </p:grpSpPr>
+      <p:sp>
+        <p:nvSpPr>
+          <p:cNvPr id="2" name="Title 1"/>
+          <p:cNvSpPr>
+            <a:spLocks noGrp="1"/>
+          </p:cNvSpPr>
+          <p:nvPr>
+            <p:ph type="title"/>
+          </p:nvPr>
+        </p:nvSpPr>
+        <p:spPr/>
+        <p:txBody>
+          <a:bodyPr/>
+          <a:lstStyle/>
+          <a:p>
+            <a:pPr lvl="0" marL="0" indent="0">
+              <a:buNone/>
+            </a:pPr>
+            <a:r>
+              <a:rPr/>
+              <a:t>Colors,</a:t>
+            </a:r>
+            <a:r>
+              <a:rPr/>
+              <a:t> </a:t>
+            </a:r>
+            <a:r>
+              <a:rPr/>
               <a:t>CMYK</a:t>
             </a:r>
             <a:r>
@@ -23651,128 +23704,6 @@
 </p:sld>
 </file>
 
-<file path=ppt/slides/slide45.xml><?xml version="1.0" encoding="utf-8"?>
-<p:sld xmlns:a="http://schemas.openxmlformats.org/drawingml/2006/main" xmlns:r="http://schemas.openxmlformats.org/officeDocument/2006/relationships" xmlns:p="http://schemas.openxmlformats.org/presentationml/2006/main">
-  <p:cSld>
-    <p:spTree>
-      <p:nvGrpSpPr>
-        <p:cNvPr id="1" name=""/>
-        <p:cNvGrpSpPr/>
-        <p:nvPr/>
-      </p:nvGrpSpPr>
-      <p:grpSpPr>
-        <a:xfrm>
-          <a:off x="0" y="0"/>
-          <a:ext cx="0" cy="0"/>
-          <a:chOff x="0" y="0"/>
-          <a:chExt cx="0" cy="0"/>
-        </a:xfrm>
-      </p:grpSpPr>
-      <p:sp>
-        <p:nvSpPr>
-          <p:cNvPr id="2" name="Title 1"/>
-          <p:cNvSpPr>
-            <a:spLocks noGrp="1"/>
-          </p:cNvSpPr>
-          <p:nvPr>
-            <p:ph type="title"/>
-          </p:nvPr>
-        </p:nvSpPr>
-        <p:spPr/>
-        <p:txBody>
-          <a:bodyPr/>
-          <a:lstStyle/>
-          <a:p>
-            <a:pPr lvl="0" marL="0" indent="0">
-              <a:buNone/>
-            </a:pPr>
-            <a:r>
-              <a:rPr/>
-              <a:t>Colors,</a:t>
-            </a:r>
-            <a:r>
-              <a:rPr/>
-              <a:t> </a:t>
-            </a:r>
-            <a:r>
-              <a:rPr/>
-              <a:t>CMYK</a:t>
-            </a:r>
-            <a:r>
-              <a:rPr/>
-              <a:t> </a:t>
-            </a:r>
-            <a:r>
-              <a:rPr/>
-              <a:t>system,</a:t>
-            </a:r>
-            <a:r>
-              <a:rPr/>
-              <a:t> </a:t>
-            </a:r>
-            <a:r>
-              <a:rPr/>
-              <a:t>combinations</a:t>
-            </a:r>
-          </a:p>
-        </p:txBody>
-      </p:sp>
-      <p:sp>
-        <p:nvSpPr>
-          <p:cNvPr id="3" name="Content Placeholder 2"/>
-          <p:cNvSpPr>
-            <a:spLocks noGrp="1"/>
-          </p:cNvSpPr>
-          <p:nvPr>
-            <p:ph idx="1"/>
-          </p:nvPr>
-        </p:nvSpPr>
-        <p:spPr/>
-        <p:txBody>
-          <a:bodyPr/>
-          <a:lstStyle/>
-          <a:p>
-            <a:pPr lvl="1"/>
-            <a:r>
-              <a:rPr/>
-              <a:t>Building blocks Cyan (C), Magenta (M), Yellow (Y), Black (K).</a:t>
-            </a:r>
-          </a:p>
-          <a:p>
-            <a:pPr lvl="1"/>
-            <a:r>
-              <a:rPr/>
-              <a:t>Cyan plus Magenta equals Blue</a:t>
-            </a:r>
-          </a:p>
-          <a:p>
-            <a:pPr lvl="1"/>
-            <a:r>
-              <a:rPr/>
-              <a:t>Cyan plus Yellow equals Green</a:t>
-            </a:r>
-          </a:p>
-          <a:p>
-            <a:pPr lvl="1"/>
-            <a:r>
-              <a:rPr/>
-              <a:t>Magenta plus Yellow equals Red</a:t>
-            </a:r>
-          </a:p>
-          <a:p>
-            <a:pPr lvl="1"/>
-            <a:r>
-              <a:rPr/>
-              <a:t>All three combined equals Black</a:t>
-            </a:r>
-          </a:p>
-        </p:txBody>
-      </p:sp>
-    </p:spTree>
-  </p:cSld>
-</p:sld>
-</file>
-
 <file path=ppt/slides/slide46.xml><?xml version="1.0" encoding="utf-8"?>
 <p:sld xmlns:a="http://schemas.openxmlformats.org/drawingml/2006/main" xmlns:r="http://schemas.openxmlformats.org/officeDocument/2006/relationships" xmlns:p="http://schemas.openxmlformats.org/presentationml/2006/main">
   <p:cSld>
@@ -23834,31 +23765,7 @@
             </a:r>
             <a:r>
               <a:rPr/>
-              <a:t>Why</a:t>
-            </a:r>
-            <a:r>
-              <a:rPr/>
-              <a:t> </a:t>
-            </a:r>
-            <a:r>
-              <a:rPr/>
-              <a:t>you</a:t>
-            </a:r>
-            <a:r>
-              <a:rPr/>
-              <a:t> </a:t>
-            </a:r>
-            <a:r>
-              <a:rPr/>
-              <a:t>need</a:t>
-            </a:r>
-            <a:r>
-              <a:rPr/>
-              <a:t> </a:t>
-            </a:r>
-            <a:r>
-              <a:rPr/>
-              <a:t>black</a:t>
+              <a:t>combinations</a:t>
             </a:r>
           </a:p>
         </p:txBody>
@@ -23881,21 +23788,35 @@
             <a:pPr lvl="1"/>
             <a:r>
               <a:rPr/>
-              <a:t>Only in theory does, C+M+Y = Black</a:t>
-            </a:r>
-          </a:p>
-          <a:p>
-            <a:pPr lvl="2"/>
-            <a:r>
-              <a:rPr/>
-              <a:t>Too much ink</a:t>
-            </a:r>
-          </a:p>
-          <a:p>
-            <a:pPr lvl="2"/>
-            <a:r>
-              <a:rPr/>
-              <a:t>Dull muddy color</a:t>
+              <a:t>Building blocks Cyan (C), Magenta (M), Yellow (Y), Black (K).</a:t>
+            </a:r>
+          </a:p>
+          <a:p>
+            <a:pPr lvl="1"/>
+            <a:r>
+              <a:rPr/>
+              <a:t>Cyan plus Magenta equals Blue</a:t>
+            </a:r>
+          </a:p>
+          <a:p>
+            <a:pPr lvl="1"/>
+            <a:r>
+              <a:rPr/>
+              <a:t>Cyan plus Yellow equals Green</a:t>
+            </a:r>
+          </a:p>
+          <a:p>
+            <a:pPr lvl="1"/>
+            <a:r>
+              <a:rPr/>
+              <a:t>Magenta plus Yellow equals Red</a:t>
+            </a:r>
+          </a:p>
+          <a:p>
+            <a:pPr lvl="1"/>
+            <a:r>
+              <a:rPr/>
+              <a:t>All three combined equals Black</a:t>
             </a:r>
           </a:p>
         </p:txBody>
@@ -23906,6 +23827,138 @@
 </file>
 
 <file path=ppt/slides/slide47.xml><?xml version="1.0" encoding="utf-8"?>
+<p:sld xmlns:a="http://schemas.openxmlformats.org/drawingml/2006/main" xmlns:r="http://schemas.openxmlformats.org/officeDocument/2006/relationships" xmlns:p="http://schemas.openxmlformats.org/presentationml/2006/main">
+  <p:cSld>
+    <p:spTree>
+      <p:nvGrpSpPr>
+        <p:cNvPr id="1" name=""/>
+        <p:cNvGrpSpPr/>
+        <p:nvPr/>
+      </p:nvGrpSpPr>
+      <p:grpSpPr>
+        <a:xfrm>
+          <a:off x="0" y="0"/>
+          <a:ext cx="0" cy="0"/>
+          <a:chOff x="0" y="0"/>
+          <a:chExt cx="0" cy="0"/>
+        </a:xfrm>
+      </p:grpSpPr>
+      <p:sp>
+        <p:nvSpPr>
+          <p:cNvPr id="2" name="Title 1"/>
+          <p:cNvSpPr>
+            <a:spLocks noGrp="1"/>
+          </p:cNvSpPr>
+          <p:nvPr>
+            <p:ph type="title"/>
+          </p:nvPr>
+        </p:nvSpPr>
+        <p:spPr/>
+        <p:txBody>
+          <a:bodyPr/>
+          <a:lstStyle/>
+          <a:p>
+            <a:pPr lvl="0" marL="0" indent="0">
+              <a:buNone/>
+            </a:pPr>
+            <a:r>
+              <a:rPr/>
+              <a:t>Colors,</a:t>
+            </a:r>
+            <a:r>
+              <a:rPr/>
+              <a:t> </a:t>
+            </a:r>
+            <a:r>
+              <a:rPr/>
+              <a:t>CMYK</a:t>
+            </a:r>
+            <a:r>
+              <a:rPr/>
+              <a:t> </a:t>
+            </a:r>
+            <a:r>
+              <a:rPr/>
+              <a:t>system,</a:t>
+            </a:r>
+            <a:r>
+              <a:rPr/>
+              <a:t> </a:t>
+            </a:r>
+            <a:r>
+              <a:rPr/>
+              <a:t>Why</a:t>
+            </a:r>
+            <a:r>
+              <a:rPr/>
+              <a:t> </a:t>
+            </a:r>
+            <a:r>
+              <a:rPr/>
+              <a:t>you</a:t>
+            </a:r>
+            <a:r>
+              <a:rPr/>
+              <a:t> </a:t>
+            </a:r>
+            <a:r>
+              <a:rPr/>
+              <a:t>need</a:t>
+            </a:r>
+            <a:r>
+              <a:rPr/>
+              <a:t> </a:t>
+            </a:r>
+            <a:r>
+              <a:rPr/>
+              <a:t>black</a:t>
+            </a:r>
+          </a:p>
+        </p:txBody>
+      </p:sp>
+      <p:sp>
+        <p:nvSpPr>
+          <p:cNvPr id="3" name="Content Placeholder 2"/>
+          <p:cNvSpPr>
+            <a:spLocks noGrp="1"/>
+          </p:cNvSpPr>
+          <p:nvPr>
+            <p:ph idx="1"/>
+          </p:nvPr>
+        </p:nvSpPr>
+        <p:spPr/>
+        <p:txBody>
+          <a:bodyPr/>
+          <a:lstStyle/>
+          <a:p>
+            <a:pPr lvl="1"/>
+            <a:r>
+              <a:rPr/>
+              <a:t>Only in theory does, C+M+Y = Black</a:t>
+            </a:r>
+          </a:p>
+          <a:p>
+            <a:pPr lvl="2"/>
+            <a:r>
+              <a:rPr/>
+              <a:t>Too much ink</a:t>
+            </a:r>
+          </a:p>
+          <a:p>
+            <a:pPr lvl="2"/>
+            <a:r>
+              <a:rPr/>
+              <a:t>Dull muddy color</a:t>
+            </a:r>
+          </a:p>
+        </p:txBody>
+      </p:sp>
+    </p:spTree>
+  </p:cSld>
+</p:sld>
+</file>
+
+<file path=ppt/slides/slide48.xml><?xml version="1.0" encoding="utf-8"?>
 <p:sld xmlns:a="http://schemas.openxmlformats.org/drawingml/2006/main" xmlns:r="http://schemas.openxmlformats.org/officeDocument/2006/relationships" xmlns:p="http://schemas.openxmlformats.org/presentationml/2006/main">
   <p:cSld>
     <p:spTree>

</xml_diff>